<commit_message>
Ajout de multiple falls et modify excel
</commit_message>
<xml_diff>
--- a/Design/designs.pptx
+++ b/Design/designs.pptx
@@ -8,11 +8,12 @@
     <p:sldId id="256" r:id="rId2"/>
     <p:sldId id="257" r:id="rId3"/>
     <p:sldId id="258" r:id="rId4"/>
-    <p:sldId id="259" r:id="rId5"/>
-    <p:sldId id="260" r:id="rId6"/>
-    <p:sldId id="261" r:id="rId7"/>
-    <p:sldId id="262" r:id="rId8"/>
-    <p:sldId id="263" r:id="rId9"/>
+    <p:sldId id="264" r:id="rId5"/>
+    <p:sldId id="259" r:id="rId6"/>
+    <p:sldId id="260" r:id="rId7"/>
+    <p:sldId id="261" r:id="rId8"/>
+    <p:sldId id="262" r:id="rId9"/>
+    <p:sldId id="263" r:id="rId10"/>
   </p:sldIdLst>
   <p:sldSz cx="9144000" cy="6858000" type="screen4x3"/>
   <p:notesSz cx="6858000" cy="9144000"/>
@@ -295,7 +296,7 @@
           <a:p>
             <a:fld id="{413F1F3B-E996-4BC2-9DDB-E8032D8CD442}" type="datetimeFigureOut">
               <a:rPr lang="en-AU" smtClean="0"/>
-              <a:t>4/07/2016</a:t>
+              <a:t>04/07/16</a:t>
             </a:fld>
             <a:endParaRPr lang="en-AU"/>
           </a:p>
@@ -337,7 +338,7 @@
           <a:p>
             <a:fld id="{65ECEF50-5677-4203-A235-5BEB76343BDA}" type="slidenum">
               <a:rPr lang="en-AU" smtClean="0"/>
-              <a:t>‹N°›</a:t>
+              <a:t>‹#›</a:t>
             </a:fld>
             <a:endParaRPr lang="en-AU"/>
           </a:p>
@@ -465,7 +466,7 @@
           <a:p>
             <a:fld id="{413F1F3B-E996-4BC2-9DDB-E8032D8CD442}" type="datetimeFigureOut">
               <a:rPr lang="en-AU" smtClean="0"/>
-              <a:t>4/07/2016</a:t>
+              <a:t>04/07/16</a:t>
             </a:fld>
             <a:endParaRPr lang="en-AU"/>
           </a:p>
@@ -507,7 +508,7 @@
           <a:p>
             <a:fld id="{65ECEF50-5677-4203-A235-5BEB76343BDA}" type="slidenum">
               <a:rPr lang="en-AU" smtClean="0"/>
-              <a:t>‹N°›</a:t>
+              <a:t>‹#›</a:t>
             </a:fld>
             <a:endParaRPr lang="en-AU"/>
           </a:p>
@@ -645,7 +646,7 @@
           <a:p>
             <a:fld id="{413F1F3B-E996-4BC2-9DDB-E8032D8CD442}" type="datetimeFigureOut">
               <a:rPr lang="en-AU" smtClean="0"/>
-              <a:t>4/07/2016</a:t>
+              <a:t>04/07/16</a:t>
             </a:fld>
             <a:endParaRPr lang="en-AU"/>
           </a:p>
@@ -687,7 +688,7 @@
           <a:p>
             <a:fld id="{65ECEF50-5677-4203-A235-5BEB76343BDA}" type="slidenum">
               <a:rPr lang="en-AU" smtClean="0"/>
-              <a:t>‹N°›</a:t>
+              <a:t>‹#›</a:t>
             </a:fld>
             <a:endParaRPr lang="en-AU"/>
           </a:p>
@@ -815,7 +816,7 @@
           <a:p>
             <a:fld id="{413F1F3B-E996-4BC2-9DDB-E8032D8CD442}" type="datetimeFigureOut">
               <a:rPr lang="en-AU" smtClean="0"/>
-              <a:t>4/07/2016</a:t>
+              <a:t>04/07/16</a:t>
             </a:fld>
             <a:endParaRPr lang="en-AU"/>
           </a:p>
@@ -857,7 +858,7 @@
           <a:p>
             <a:fld id="{65ECEF50-5677-4203-A235-5BEB76343BDA}" type="slidenum">
               <a:rPr lang="en-AU" smtClean="0"/>
-              <a:t>‹N°›</a:t>
+              <a:t>‹#›</a:t>
             </a:fld>
             <a:endParaRPr lang="en-AU"/>
           </a:p>
@@ -1061,7 +1062,7 @@
           <a:p>
             <a:fld id="{413F1F3B-E996-4BC2-9DDB-E8032D8CD442}" type="datetimeFigureOut">
               <a:rPr lang="en-AU" smtClean="0"/>
-              <a:t>4/07/2016</a:t>
+              <a:t>04/07/16</a:t>
             </a:fld>
             <a:endParaRPr lang="en-AU"/>
           </a:p>
@@ -1103,7 +1104,7 @@
           <a:p>
             <a:fld id="{65ECEF50-5677-4203-A235-5BEB76343BDA}" type="slidenum">
               <a:rPr lang="en-AU" smtClean="0"/>
-              <a:t>‹N°›</a:t>
+              <a:t>‹#›</a:t>
             </a:fld>
             <a:endParaRPr lang="en-AU"/>
           </a:p>
@@ -1349,7 +1350,7 @@
           <a:p>
             <a:fld id="{413F1F3B-E996-4BC2-9DDB-E8032D8CD442}" type="datetimeFigureOut">
               <a:rPr lang="en-AU" smtClean="0"/>
-              <a:t>4/07/2016</a:t>
+              <a:t>04/07/16</a:t>
             </a:fld>
             <a:endParaRPr lang="en-AU"/>
           </a:p>
@@ -1391,7 +1392,7 @@
           <a:p>
             <a:fld id="{65ECEF50-5677-4203-A235-5BEB76343BDA}" type="slidenum">
               <a:rPr lang="en-AU" smtClean="0"/>
-              <a:t>‹N°›</a:t>
+              <a:t>‹#›</a:t>
             </a:fld>
             <a:endParaRPr lang="en-AU"/>
           </a:p>
@@ -1771,7 +1772,7 @@
           <a:p>
             <a:fld id="{413F1F3B-E996-4BC2-9DDB-E8032D8CD442}" type="datetimeFigureOut">
               <a:rPr lang="en-AU" smtClean="0"/>
-              <a:t>4/07/2016</a:t>
+              <a:t>04/07/16</a:t>
             </a:fld>
             <a:endParaRPr lang="en-AU"/>
           </a:p>
@@ -1813,7 +1814,7 @@
           <a:p>
             <a:fld id="{65ECEF50-5677-4203-A235-5BEB76343BDA}" type="slidenum">
               <a:rPr lang="en-AU" smtClean="0"/>
-              <a:t>‹N°›</a:t>
+              <a:t>‹#›</a:t>
             </a:fld>
             <a:endParaRPr lang="en-AU"/>
           </a:p>
@@ -1889,7 +1890,7 @@
           <a:p>
             <a:fld id="{413F1F3B-E996-4BC2-9DDB-E8032D8CD442}" type="datetimeFigureOut">
               <a:rPr lang="en-AU" smtClean="0"/>
-              <a:t>4/07/2016</a:t>
+              <a:t>04/07/16</a:t>
             </a:fld>
             <a:endParaRPr lang="en-AU"/>
           </a:p>
@@ -1931,7 +1932,7 @@
           <a:p>
             <a:fld id="{65ECEF50-5677-4203-A235-5BEB76343BDA}" type="slidenum">
               <a:rPr lang="en-AU" smtClean="0"/>
-              <a:t>‹N°›</a:t>
+              <a:t>‹#›</a:t>
             </a:fld>
             <a:endParaRPr lang="en-AU"/>
           </a:p>
@@ -1984,7 +1985,7 @@
           <a:p>
             <a:fld id="{413F1F3B-E996-4BC2-9DDB-E8032D8CD442}" type="datetimeFigureOut">
               <a:rPr lang="en-AU" smtClean="0"/>
-              <a:t>4/07/2016</a:t>
+              <a:t>04/07/16</a:t>
             </a:fld>
             <a:endParaRPr lang="en-AU"/>
           </a:p>
@@ -2026,7 +2027,7 @@
           <a:p>
             <a:fld id="{65ECEF50-5677-4203-A235-5BEB76343BDA}" type="slidenum">
               <a:rPr lang="en-AU" smtClean="0"/>
-              <a:t>‹N°›</a:t>
+              <a:t>‹#›</a:t>
             </a:fld>
             <a:endParaRPr lang="en-AU"/>
           </a:p>
@@ -2261,7 +2262,7 @@
           <a:p>
             <a:fld id="{413F1F3B-E996-4BC2-9DDB-E8032D8CD442}" type="datetimeFigureOut">
               <a:rPr lang="en-AU" smtClean="0"/>
-              <a:t>4/07/2016</a:t>
+              <a:t>04/07/16</a:t>
             </a:fld>
             <a:endParaRPr lang="en-AU"/>
           </a:p>
@@ -2303,7 +2304,7 @@
           <a:p>
             <a:fld id="{65ECEF50-5677-4203-A235-5BEB76343BDA}" type="slidenum">
               <a:rPr lang="en-AU" smtClean="0"/>
-              <a:t>‹N°›</a:t>
+              <a:t>‹#›</a:t>
             </a:fld>
             <a:endParaRPr lang="en-AU"/>
           </a:p>
@@ -2514,7 +2515,7 @@
           <a:p>
             <a:fld id="{413F1F3B-E996-4BC2-9DDB-E8032D8CD442}" type="datetimeFigureOut">
               <a:rPr lang="en-AU" smtClean="0"/>
-              <a:t>4/07/2016</a:t>
+              <a:t>04/07/16</a:t>
             </a:fld>
             <a:endParaRPr lang="en-AU"/>
           </a:p>
@@ -2556,7 +2557,7 @@
           <a:p>
             <a:fld id="{65ECEF50-5677-4203-A235-5BEB76343BDA}" type="slidenum">
               <a:rPr lang="en-AU" smtClean="0"/>
-              <a:t>‹N°›</a:t>
+              <a:t>‹#›</a:t>
             </a:fld>
             <a:endParaRPr lang="en-AU"/>
           </a:p>
@@ -2727,7 +2728,7 @@
           <a:p>
             <a:fld id="{413F1F3B-E996-4BC2-9DDB-E8032D8CD442}" type="datetimeFigureOut">
               <a:rPr lang="en-AU" smtClean="0"/>
-              <a:t>4/07/2016</a:t>
+              <a:t>04/07/16</a:t>
             </a:fld>
             <a:endParaRPr lang="en-AU"/>
           </a:p>
@@ -2805,7 +2806,7 @@
           <a:p>
             <a:fld id="{65ECEF50-5677-4203-A235-5BEB76343BDA}" type="slidenum">
               <a:rPr lang="en-AU" smtClean="0"/>
-              <a:t>‹N°›</a:t>
+              <a:t>‹#›</a:t>
             </a:fld>
             <a:endParaRPr lang="en-AU"/>
           </a:p>
@@ -3135,14 +3136,14 @@
           </a:ln>
           <a:effectLst/>
           <a:extLst>
-            <a:ext uri="{909E8E84-426E-40DD-AFC4-6F175D3DCCD1}">
+            <a:ext uri="{909E8E84-426E-40dd-AFC4-6F175D3DCCD1}">
               <a14:hiddenFill xmlns:a14="http://schemas.microsoft.com/office/drawing/2010/main">
                 <a:solidFill>
                   <a:schemeClr val="accent1"/>
                 </a:solidFill>
               </a14:hiddenFill>
             </a:ext>
-            <a:ext uri="{91240B29-F687-4F45-9708-019B960494DF}">
+            <a:ext uri="{91240B29-F687-4f45-9708-019B960494DF}">
               <a14:hiddenLine xmlns:a14="http://schemas.microsoft.com/office/drawing/2010/main" w="9525">
                 <a:solidFill>
                   <a:schemeClr val="tx1"/>
@@ -3152,7 +3153,7 @@
                 <a:tailEnd/>
               </a14:hiddenLine>
             </a:ext>
-            <a:ext uri="{AF507438-7753-43E0-B8FC-AC1667EBCBE1}">
+            <a:ext uri="{AF507438-7753-43e0-B8FC-AC1667EBCBE1}">
               <a14:hiddenEffects xmlns:a14="http://schemas.microsoft.com/office/drawing/2010/main">
                 <a:effectLst>
                   <a:outerShdw dist="35921" dir="2700000" algn="ctr" rotWithShape="0">
@@ -3817,14 +3818,14 @@
           </a:ln>
           <a:effectLst/>
           <a:extLst>
-            <a:ext uri="{909E8E84-426E-40DD-AFC4-6F175D3DCCD1}">
+            <a:ext uri="{909E8E84-426E-40dd-AFC4-6F175D3DCCD1}">
               <a14:hiddenFill xmlns:a14="http://schemas.microsoft.com/office/drawing/2010/main">
                 <a:solidFill>
                   <a:schemeClr val="accent1"/>
                 </a:solidFill>
               </a14:hiddenFill>
             </a:ext>
-            <a:ext uri="{91240B29-F687-4F45-9708-019B960494DF}">
+            <a:ext uri="{91240B29-F687-4f45-9708-019B960494DF}">
               <a14:hiddenLine xmlns:a14="http://schemas.microsoft.com/office/drawing/2010/main" w="9525">
                 <a:solidFill>
                   <a:schemeClr val="tx1"/>
@@ -3834,7 +3835,7 @@
                 <a:tailEnd/>
               </a14:hiddenLine>
             </a:ext>
-            <a:ext uri="{AF507438-7753-43E0-B8FC-AC1667EBCBE1}">
+            <a:ext uri="{AF507438-7753-43e0-B8FC-AC1667EBCBE1}">
               <a14:hiddenEffects xmlns:a14="http://schemas.microsoft.com/office/drawing/2010/main">
                 <a:effectLst>
                   <a:outerShdw dist="35921" dir="2700000" algn="ctr" rotWithShape="0">
@@ -4582,14 +4583,14 @@
           </a:ln>
           <a:effectLst/>
           <a:extLst>
-            <a:ext uri="{909E8E84-426E-40DD-AFC4-6F175D3DCCD1}">
+            <a:ext uri="{909E8E84-426E-40dd-AFC4-6F175D3DCCD1}">
               <a14:hiddenFill xmlns:a14="http://schemas.microsoft.com/office/drawing/2010/main">
                 <a:solidFill>
                   <a:schemeClr val="accent1"/>
                 </a:solidFill>
               </a14:hiddenFill>
             </a:ext>
-            <a:ext uri="{91240B29-F687-4F45-9708-019B960494DF}">
+            <a:ext uri="{91240B29-F687-4f45-9708-019B960494DF}">
               <a14:hiddenLine xmlns:a14="http://schemas.microsoft.com/office/drawing/2010/main" w="9525">
                 <a:solidFill>
                   <a:schemeClr val="tx1"/>
@@ -4599,7 +4600,7 @@
                 <a:tailEnd/>
               </a14:hiddenLine>
             </a:ext>
-            <a:ext uri="{AF507438-7753-43E0-B8FC-AC1667EBCBE1}">
+            <a:ext uri="{AF507438-7753-43e0-B8FC-AC1667EBCBE1}">
               <a14:hiddenEffects xmlns:a14="http://schemas.microsoft.com/office/drawing/2010/main">
                 <a:effectLst>
                   <a:outerShdw dist="35921" dir="2700000" algn="ctr" rotWithShape="0">
@@ -5342,13 +5343,13 @@
               </a:ext>
             </a:extLst>
           </a:blip>
-          <a:srcRect l="1494" t="22805" r="51035" b="13931"/>
+          <a:srcRect l="1494" t="52369" r="57885" b="13931"/>
           <a:stretch/>
         </p:blipFill>
         <p:spPr bwMode="auto">
           <a:xfrm>
-            <a:off x="1115616" y="908720"/>
-            <a:ext cx="6511158" cy="5423338"/>
+            <a:off x="1187624" y="1484784"/>
+            <a:ext cx="5571598" cy="2888947"/>
           </a:xfrm>
           <a:prstGeom prst="rect">
             <a:avLst/>
@@ -5359,14 +5360,14 @@
           </a:ln>
           <a:effectLst/>
           <a:extLst>
-            <a:ext uri="{909E8E84-426E-40DD-AFC4-6F175D3DCCD1}">
+            <a:ext uri="{909E8E84-426E-40dd-AFC4-6F175D3DCCD1}">
               <a14:hiddenFill xmlns:a14="http://schemas.microsoft.com/office/drawing/2010/main">
                 <a:solidFill>
                   <a:schemeClr val="accent1"/>
                 </a:solidFill>
               </a14:hiddenFill>
             </a:ext>
-            <a:ext uri="{91240B29-F687-4F45-9708-019B960494DF}">
+            <a:ext uri="{91240B29-F687-4f45-9708-019B960494DF}">
               <a14:hiddenLine xmlns:a14="http://schemas.microsoft.com/office/drawing/2010/main" w="9525">
                 <a:solidFill>
                   <a:schemeClr val="tx1"/>
@@ -5376,7 +5377,7 @@
                 <a:tailEnd/>
               </a14:hiddenLine>
             </a:ext>
-            <a:ext uri="{AF507438-7753-43E0-B8FC-AC1667EBCBE1}">
+            <a:ext uri="{AF507438-7753-43e0-B8FC-AC1667EBCBE1}">
               <a14:hiddenEffects xmlns:a14="http://schemas.microsoft.com/office/drawing/2010/main">
                 <a:effectLst>
                   <a:outerShdw dist="35921" dir="2700000" algn="ctr" rotWithShape="0">
@@ -5390,13 +5391,13 @@
       </p:pic>
       <p:sp>
         <p:nvSpPr>
-          <p:cNvPr id="5" name="TextBox 4"/>
+          <p:cNvPr id="13" name="TextBox 12"/>
           <p:cNvSpPr txBox="1"/>
           <p:nvPr/>
         </p:nvSpPr>
         <p:spPr>
           <a:xfrm>
-            <a:off x="214568" y="692696"/>
+            <a:off x="251520" y="1477397"/>
             <a:ext cx="3877985" cy="369332"/>
           </a:xfrm>
           <a:prstGeom prst="rect">
@@ -5418,7 +5419,27 @@
                   </a:schemeClr>
                 </a:solidFill>
               </a:rPr>
-              <a:t>Dots/Line DF:     0.1			</a:t>
+              <a:t>Dots/Line DF:       </a:t>
+            </a:r>
+            <a:r>
+              <a:rPr lang="en-AU" dirty="0" smtClean="0">
+                <a:solidFill>
+                  <a:schemeClr val="accent3">
+                    <a:lumMod val="50000"/>
+                  </a:schemeClr>
+                </a:solidFill>
+              </a:rPr>
+              <a:t>1</a:t>
+            </a:r>
+            <a:r>
+              <a:rPr lang="en-AU" dirty="0" smtClean="0">
+                <a:solidFill>
+                  <a:schemeClr val="accent3">
+                    <a:lumMod val="50000"/>
+                  </a:schemeClr>
+                </a:solidFill>
+              </a:rPr>
+              <a:t>			</a:t>
             </a:r>
             <a:endParaRPr lang="en-AU" dirty="0">
               <a:solidFill>
@@ -5432,14 +5453,14 @@
       </p:sp>
       <p:sp>
         <p:nvSpPr>
-          <p:cNvPr id="7" name="TextBox 6"/>
+          <p:cNvPr id="14" name="TextBox 13"/>
           <p:cNvSpPr txBox="1"/>
           <p:nvPr/>
         </p:nvSpPr>
         <p:spPr>
           <a:xfrm>
-            <a:off x="2843808" y="692696"/>
-            <a:ext cx="476412" cy="369332"/>
+            <a:off x="2880760" y="1477397"/>
+            <a:ext cx="528435" cy="369332"/>
           </a:xfrm>
           <a:prstGeom prst="rect">
             <a:avLst/>
@@ -5453,14 +5474,24 @@
           <a:lstStyle/>
           <a:p>
             <a:r>
-              <a:rPr lang="en-AU" dirty="0" smtClean="0">
+              <a:rPr lang="en-AU" dirty="0">
                 <a:solidFill>
                   <a:schemeClr val="accent3">
                     <a:lumMod val="50000"/>
                   </a:schemeClr>
                 </a:solidFill>
               </a:rPr>
-              <a:t>0.2</a:t>
+              <a:t> </a:t>
+            </a:r>
+            <a:r>
+              <a:rPr lang="en-AU" dirty="0" smtClean="0">
+                <a:solidFill>
+                  <a:schemeClr val="accent3">
+                    <a:lumMod val="50000"/>
+                  </a:schemeClr>
+                </a:solidFill>
+              </a:rPr>
+              <a:t>1,2</a:t>
             </a:r>
             <a:endParaRPr lang="en-AU" dirty="0">
               <a:solidFill>
@@ -5474,14 +5505,14 @@
       </p:sp>
       <p:sp>
         <p:nvSpPr>
-          <p:cNvPr id="8" name="TextBox 7"/>
+          <p:cNvPr id="15" name="TextBox 14"/>
           <p:cNvSpPr txBox="1"/>
           <p:nvPr/>
         </p:nvSpPr>
         <p:spPr>
           <a:xfrm>
-            <a:off x="3854347" y="692696"/>
-            <a:ext cx="476412" cy="369332"/>
+            <a:off x="3891299" y="1477397"/>
+            <a:ext cx="582211" cy="369332"/>
           </a:xfrm>
           <a:prstGeom prst="rect">
             <a:avLst/>
@@ -5495,14 +5526,89 @@
           <a:lstStyle/>
           <a:p>
             <a:r>
-              <a:rPr lang="en-AU" dirty="0" smtClean="0">
+              <a:rPr lang="en-AU" dirty="0">
                 <a:solidFill>
                   <a:schemeClr val="accent3">
                     <a:lumMod val="50000"/>
                   </a:schemeClr>
                 </a:solidFill>
               </a:rPr>
-              <a:t>0.3</a:t>
+              <a:t> </a:t>
+            </a:r>
+            <a:r>
+              <a:rPr lang="en-AU" dirty="0" smtClean="0">
+                <a:solidFill>
+                  <a:schemeClr val="accent3">
+                    <a:lumMod val="50000"/>
+                  </a:schemeClr>
+                </a:solidFill>
+              </a:rPr>
+              <a:t> </a:t>
+            </a:r>
+            <a:r>
+              <a:rPr lang="en-AU" dirty="0" smtClean="0">
+                <a:solidFill>
+                  <a:schemeClr val="accent3">
+                    <a:lumMod val="50000"/>
+                  </a:schemeClr>
+                </a:solidFill>
+              </a:rPr>
+              <a:t>1,4</a:t>
+            </a:r>
+          </a:p>
+        </p:txBody>
+      </p:sp>
+      <p:sp>
+        <p:nvSpPr>
+          <p:cNvPr id="16" name="TextBox 15"/>
+          <p:cNvSpPr txBox="1"/>
+          <p:nvPr/>
+        </p:nvSpPr>
+        <p:spPr>
+          <a:xfrm>
+            <a:off x="4907213" y="1471890"/>
+            <a:ext cx="580620" cy="369332"/>
+          </a:xfrm>
+          <a:prstGeom prst="rect">
+            <a:avLst/>
+          </a:prstGeom>
+          <a:noFill/>
+        </p:spPr>
+        <p:txBody>
+          <a:bodyPr wrap="none" rtlCol="0">
+            <a:spAutoFit/>
+          </a:bodyPr>
+          <a:lstStyle/>
+          <a:p>
+            <a:r>
+              <a:rPr lang="en-AU" dirty="0">
+                <a:solidFill>
+                  <a:schemeClr val="accent3">
+                    <a:lumMod val="50000"/>
+                  </a:schemeClr>
+                </a:solidFill>
+              </a:rPr>
+              <a:t> </a:t>
+            </a:r>
+            <a:r>
+              <a:rPr lang="en-AU" dirty="0" smtClean="0">
+                <a:solidFill>
+                  <a:schemeClr val="accent3">
+                    <a:lumMod val="50000"/>
+                  </a:schemeClr>
+                </a:solidFill>
+              </a:rPr>
+              <a:t> </a:t>
+            </a:r>
+            <a:r>
+              <a:rPr lang="en-AU" dirty="0" smtClean="0">
+                <a:solidFill>
+                  <a:schemeClr val="accent3">
+                    <a:lumMod val="50000"/>
+                  </a:schemeClr>
+                </a:solidFill>
+              </a:rPr>
+              <a:t>1,6</a:t>
             </a:r>
             <a:endParaRPr lang="en-AU" dirty="0">
               <a:solidFill>
@@ -5516,14 +5622,14 @@
       </p:sp>
       <p:sp>
         <p:nvSpPr>
-          <p:cNvPr id="9" name="TextBox 8"/>
+          <p:cNvPr id="17" name="TextBox 16"/>
           <p:cNvSpPr txBox="1"/>
           <p:nvPr/>
         </p:nvSpPr>
         <p:spPr>
           <a:xfrm>
-            <a:off x="4870261" y="687189"/>
-            <a:ext cx="476412" cy="369332"/>
+            <a:off x="6004748" y="1471890"/>
+            <a:ext cx="582211" cy="369332"/>
           </a:xfrm>
           <a:prstGeom prst="rect">
             <a:avLst/>
@@ -5537,16 +5643,36 @@
           <a:lstStyle/>
           <a:p>
             <a:r>
-              <a:rPr lang="en-AU" dirty="0" smtClean="0">
+              <a:rPr lang="en-AU" dirty="0">
                 <a:solidFill>
                   <a:schemeClr val="accent3">
                     <a:lumMod val="50000"/>
                   </a:schemeClr>
                 </a:solidFill>
               </a:rPr>
-              <a:t>0.4</a:t>
-            </a:r>
-            <a:endParaRPr lang="en-AU" dirty="0">
+              <a:t> </a:t>
+            </a:r>
+            <a:r>
+              <a:rPr lang="en-AU" dirty="0" smtClean="0">
+                <a:solidFill>
+                  <a:schemeClr val="accent3">
+                    <a:lumMod val="50000"/>
+                  </a:schemeClr>
+                </a:solidFill>
+              </a:rPr>
+              <a:t> </a:t>
+            </a:r>
+            <a:r>
+              <a:rPr lang="en-AU" dirty="0" smtClean="0">
+                <a:solidFill>
+                  <a:schemeClr val="accent3">
+                    <a:lumMod val="50000"/>
+                  </a:schemeClr>
+                </a:solidFill>
+              </a:rPr>
+              <a:t>1,8</a:t>
+            </a:r>
+            <a:endParaRPr lang="en-AU" dirty="0" smtClean="0">
               <a:solidFill>
                 <a:schemeClr val="accent3">
                   <a:lumMod val="50000"/>
@@ -5558,14 +5684,14 @@
       </p:sp>
       <p:sp>
         <p:nvSpPr>
-          <p:cNvPr id="10" name="TextBox 9"/>
+          <p:cNvPr id="4096" name="TextBox 4095"/>
           <p:cNvSpPr txBox="1"/>
           <p:nvPr/>
         </p:nvSpPr>
         <p:spPr>
           <a:xfrm>
-            <a:off x="5967796" y="687189"/>
-            <a:ext cx="476412" cy="369332"/>
+            <a:off x="5314697" y="4373732"/>
+            <a:ext cx="1351452" cy="369332"/>
           </a:xfrm>
           <a:prstGeom prst="rect">
             <a:avLst/>
@@ -5579,364 +5705,26 @@
           <a:lstStyle/>
           <a:p>
             <a:r>
-              <a:rPr lang="en-AU" dirty="0" smtClean="0">
-                <a:solidFill>
-                  <a:schemeClr val="accent3">
-                    <a:lumMod val="50000"/>
-                  </a:schemeClr>
-                </a:solidFill>
-              </a:rPr>
-              <a:t>0.6</a:t>
-            </a:r>
-          </a:p>
-        </p:txBody>
-      </p:sp>
-      <p:sp>
-        <p:nvSpPr>
-          <p:cNvPr id="11" name="TextBox 10"/>
-          <p:cNvSpPr txBox="1"/>
-          <p:nvPr/>
-        </p:nvSpPr>
-        <p:spPr>
-          <a:xfrm>
-            <a:off x="7020272" y="687189"/>
-            <a:ext cx="476412" cy="369332"/>
-          </a:xfrm>
-          <a:prstGeom prst="rect">
-            <a:avLst/>
-          </a:prstGeom>
-          <a:noFill/>
-        </p:spPr>
-        <p:txBody>
-          <a:bodyPr wrap="none" rtlCol="0">
-            <a:spAutoFit/>
-          </a:bodyPr>
-          <a:lstStyle/>
-          <a:p>
-            <a:r>
-              <a:rPr lang="en-AU" dirty="0" smtClean="0">
-                <a:solidFill>
-                  <a:schemeClr val="accent3">
-                    <a:lumMod val="50000"/>
-                  </a:schemeClr>
-                </a:solidFill>
-              </a:rPr>
-              <a:t>0.8</a:t>
-            </a:r>
-            <a:endParaRPr lang="en-AU" dirty="0">
-              <a:solidFill>
-                <a:schemeClr val="accent3">
-                  <a:lumMod val="50000"/>
-                </a:schemeClr>
-              </a:solidFill>
-            </a:endParaRPr>
-          </a:p>
-        </p:txBody>
-      </p:sp>
-      <p:sp>
-        <p:nvSpPr>
-          <p:cNvPr id="13" name="TextBox 12"/>
-          <p:cNvSpPr txBox="1"/>
-          <p:nvPr/>
-        </p:nvSpPr>
-        <p:spPr>
-          <a:xfrm>
-            <a:off x="179512" y="3435723"/>
-            <a:ext cx="3877985" cy="369332"/>
-          </a:xfrm>
-          <a:prstGeom prst="rect">
-            <a:avLst/>
-          </a:prstGeom>
-          <a:noFill/>
-        </p:spPr>
-        <p:txBody>
-          <a:bodyPr wrap="none" rtlCol="0">
-            <a:spAutoFit/>
-          </a:bodyPr>
-          <a:lstStyle/>
-          <a:p>
-            <a:r>
-              <a:rPr lang="en-AU" dirty="0" smtClean="0">
-                <a:solidFill>
-                  <a:schemeClr val="accent3">
-                    <a:lumMod val="50000"/>
-                  </a:schemeClr>
-                </a:solidFill>
-              </a:rPr>
-              <a:t>Dots/Line DF:       1			</a:t>
-            </a:r>
-            <a:endParaRPr lang="en-AU" dirty="0">
-              <a:solidFill>
-                <a:schemeClr val="accent3">
-                  <a:lumMod val="50000"/>
-                </a:schemeClr>
-              </a:solidFill>
-            </a:endParaRPr>
-          </a:p>
-        </p:txBody>
-      </p:sp>
-      <p:sp>
-        <p:nvSpPr>
-          <p:cNvPr id="14" name="TextBox 13"/>
-          <p:cNvSpPr txBox="1"/>
-          <p:nvPr/>
-        </p:nvSpPr>
-        <p:spPr>
-          <a:xfrm>
-            <a:off x="2808752" y="3435723"/>
-            <a:ext cx="354584" cy="369332"/>
-          </a:xfrm>
-          <a:prstGeom prst="rect">
-            <a:avLst/>
-          </a:prstGeom>
-          <a:noFill/>
-        </p:spPr>
-        <p:txBody>
-          <a:bodyPr wrap="none" rtlCol="0">
-            <a:spAutoFit/>
-          </a:bodyPr>
-          <a:lstStyle/>
-          <a:p>
-            <a:r>
-              <a:rPr lang="en-AU" dirty="0">
-                <a:solidFill>
-                  <a:schemeClr val="accent3">
-                    <a:lumMod val="50000"/>
-                  </a:schemeClr>
-                </a:solidFill>
-              </a:rPr>
-              <a:t> </a:t>
-            </a:r>
-            <a:r>
-              <a:rPr lang="en-AU" dirty="0" smtClean="0">
-                <a:solidFill>
-                  <a:schemeClr val="accent3">
-                    <a:lumMod val="50000"/>
-                  </a:schemeClr>
-                </a:solidFill>
-              </a:rPr>
-              <a:t>2</a:t>
-            </a:r>
-            <a:endParaRPr lang="en-AU" dirty="0">
-              <a:solidFill>
-                <a:schemeClr val="accent3">
-                  <a:lumMod val="50000"/>
-                </a:schemeClr>
-              </a:solidFill>
-            </a:endParaRPr>
-          </a:p>
-        </p:txBody>
-      </p:sp>
-      <p:sp>
-        <p:nvSpPr>
-          <p:cNvPr id="15" name="TextBox 14"/>
-          <p:cNvSpPr txBox="1"/>
-          <p:nvPr/>
-        </p:nvSpPr>
-        <p:spPr>
-          <a:xfrm>
-            <a:off x="3819291" y="3435723"/>
-            <a:ext cx="407484" cy="369332"/>
-          </a:xfrm>
-          <a:prstGeom prst="rect">
-            <a:avLst/>
-          </a:prstGeom>
-          <a:noFill/>
-        </p:spPr>
-        <p:txBody>
-          <a:bodyPr wrap="none" rtlCol="0">
-            <a:spAutoFit/>
-          </a:bodyPr>
-          <a:lstStyle/>
-          <a:p>
-            <a:r>
-              <a:rPr lang="en-AU" dirty="0">
-                <a:solidFill>
-                  <a:schemeClr val="accent3">
-                    <a:lumMod val="50000"/>
-                  </a:schemeClr>
-                </a:solidFill>
-              </a:rPr>
-              <a:t> </a:t>
-            </a:r>
-            <a:r>
-              <a:rPr lang="en-AU" dirty="0" smtClean="0">
-                <a:solidFill>
-                  <a:schemeClr val="accent3">
-                    <a:lumMod val="50000"/>
-                  </a:schemeClr>
-                </a:solidFill>
-              </a:rPr>
-              <a:t> 3</a:t>
-            </a:r>
-            <a:endParaRPr lang="en-AU" dirty="0">
-              <a:solidFill>
-                <a:schemeClr val="accent3">
-                  <a:lumMod val="50000"/>
-                </a:schemeClr>
-              </a:solidFill>
-            </a:endParaRPr>
-          </a:p>
-        </p:txBody>
-      </p:sp>
-      <p:sp>
-        <p:nvSpPr>
-          <p:cNvPr id="16" name="TextBox 15"/>
-          <p:cNvSpPr txBox="1"/>
-          <p:nvPr/>
-        </p:nvSpPr>
-        <p:spPr>
-          <a:xfrm>
-            <a:off x="4835205" y="3430216"/>
-            <a:ext cx="407484" cy="369332"/>
-          </a:xfrm>
-          <a:prstGeom prst="rect">
-            <a:avLst/>
-          </a:prstGeom>
-          <a:noFill/>
-        </p:spPr>
-        <p:txBody>
-          <a:bodyPr wrap="none" rtlCol="0">
-            <a:spAutoFit/>
-          </a:bodyPr>
-          <a:lstStyle/>
-          <a:p>
-            <a:r>
-              <a:rPr lang="en-AU" dirty="0">
-                <a:solidFill>
-                  <a:schemeClr val="accent3">
-                    <a:lumMod val="50000"/>
-                  </a:schemeClr>
-                </a:solidFill>
-              </a:rPr>
-              <a:t> </a:t>
-            </a:r>
-            <a:r>
-              <a:rPr lang="en-AU" dirty="0" smtClean="0">
-                <a:solidFill>
-                  <a:schemeClr val="accent3">
-                    <a:lumMod val="50000"/>
-                  </a:schemeClr>
-                </a:solidFill>
-              </a:rPr>
-              <a:t> 4</a:t>
-            </a:r>
-            <a:endParaRPr lang="en-AU" dirty="0">
-              <a:solidFill>
-                <a:schemeClr val="accent3">
-                  <a:lumMod val="50000"/>
-                </a:schemeClr>
-              </a:solidFill>
-            </a:endParaRPr>
-          </a:p>
-        </p:txBody>
-      </p:sp>
-      <p:sp>
-        <p:nvSpPr>
-          <p:cNvPr id="17" name="TextBox 16"/>
-          <p:cNvSpPr txBox="1"/>
-          <p:nvPr/>
-        </p:nvSpPr>
-        <p:spPr>
-          <a:xfrm>
-            <a:off x="5932740" y="3430216"/>
-            <a:ext cx="407484" cy="369332"/>
-          </a:xfrm>
-          <a:prstGeom prst="rect">
-            <a:avLst/>
-          </a:prstGeom>
-          <a:noFill/>
-        </p:spPr>
-        <p:txBody>
-          <a:bodyPr wrap="none" rtlCol="0">
-            <a:spAutoFit/>
-          </a:bodyPr>
-          <a:lstStyle/>
-          <a:p>
-            <a:r>
-              <a:rPr lang="en-AU" dirty="0">
-                <a:solidFill>
-                  <a:schemeClr val="accent3">
-                    <a:lumMod val="50000"/>
-                  </a:schemeClr>
-                </a:solidFill>
-              </a:rPr>
-              <a:t> </a:t>
-            </a:r>
-            <a:r>
-              <a:rPr lang="en-AU" dirty="0" smtClean="0">
-                <a:solidFill>
-                  <a:schemeClr val="accent3">
-                    <a:lumMod val="50000"/>
-                  </a:schemeClr>
-                </a:solidFill>
-              </a:rPr>
-              <a:t> 5</a:t>
-            </a:r>
-          </a:p>
-        </p:txBody>
-      </p:sp>
-      <p:sp>
-        <p:nvSpPr>
-          <p:cNvPr id="18" name="TextBox 17"/>
-          <p:cNvSpPr txBox="1"/>
-          <p:nvPr/>
-        </p:nvSpPr>
-        <p:spPr>
-          <a:xfrm>
-            <a:off x="6985216" y="3430216"/>
-            <a:ext cx="407484" cy="369332"/>
-          </a:xfrm>
-          <a:prstGeom prst="rect">
-            <a:avLst/>
-          </a:prstGeom>
-          <a:noFill/>
-        </p:spPr>
-        <p:txBody>
-          <a:bodyPr wrap="none" rtlCol="0">
-            <a:spAutoFit/>
-          </a:bodyPr>
-          <a:lstStyle/>
-          <a:p>
-            <a:r>
-              <a:rPr lang="en-AU" dirty="0">
-                <a:solidFill>
-                  <a:schemeClr val="accent3">
-                    <a:lumMod val="50000"/>
-                  </a:schemeClr>
-                </a:solidFill>
-              </a:rPr>
-              <a:t> </a:t>
-            </a:r>
-            <a:r>
-              <a:rPr lang="en-AU" dirty="0" smtClean="0">
-                <a:solidFill>
-                  <a:schemeClr val="accent3">
-                    <a:lumMod val="50000"/>
-                  </a:schemeClr>
-                </a:solidFill>
-              </a:rPr>
-              <a:t> 6</a:t>
-            </a:r>
-            <a:endParaRPr lang="en-AU" dirty="0">
-              <a:solidFill>
-                <a:schemeClr val="accent3">
-                  <a:lumMod val="50000"/>
-                </a:schemeClr>
-              </a:solidFill>
-            </a:endParaRPr>
+              <a:rPr lang="en-AU" b="1" dirty="0" smtClean="0"/>
+              <a:t>Multiple </a:t>
+            </a:r>
+            <a:r>
+              <a:rPr lang="en-AU" b="1" dirty="0" smtClean="0"/>
+              <a:t>fall</a:t>
+            </a:r>
+            <a:endParaRPr lang="en-AU" b="1" dirty="0"/>
           </a:p>
         </p:txBody>
       </p:sp>
       <p:cxnSp>
         <p:nvCxnSpPr>
-          <p:cNvPr id="19" name="Straight Arrow Connector 18"/>
+          <p:cNvPr id="22" name="Straight Arrow Connector 18"/>
           <p:cNvCxnSpPr/>
           <p:nvPr/>
         </p:nvCxnSpPr>
         <p:spPr>
           <a:xfrm>
-            <a:off x="8100392" y="1988840"/>
+            <a:off x="6609454" y="2708920"/>
             <a:ext cx="0" cy="432048"/>
           </a:xfrm>
           <a:prstGeom prst="straightConnector1">
@@ -5964,13 +5752,13 @@
       </p:cxnSp>
       <p:cxnSp>
         <p:nvCxnSpPr>
-          <p:cNvPr id="21" name="Straight Arrow Connector 20"/>
+          <p:cNvPr id="23" name="Straight Arrow Connector 20"/>
           <p:cNvCxnSpPr/>
           <p:nvPr/>
         </p:nvCxnSpPr>
         <p:spPr>
           <a:xfrm>
-            <a:off x="8100392" y="1124744"/>
+            <a:off x="6609454" y="1844824"/>
             <a:ext cx="0" cy="311166"/>
           </a:xfrm>
           <a:prstGeom prst="straightConnector1">
@@ -5998,13 +5786,13 @@
       </p:cxnSp>
       <p:cxnSp>
         <p:nvCxnSpPr>
-          <p:cNvPr id="25" name="Straight Arrow Connector 24"/>
+          <p:cNvPr id="24" name="Straight Arrow Connector 24"/>
           <p:cNvCxnSpPr/>
           <p:nvPr/>
         </p:nvCxnSpPr>
         <p:spPr>
           <a:xfrm>
-            <a:off x="8172400" y="1124744"/>
+            <a:off x="6681462" y="1844824"/>
             <a:ext cx="288032" cy="0"/>
           </a:xfrm>
           <a:prstGeom prst="straightConnector1">
@@ -6032,13 +5820,13 @@
       </p:cxnSp>
       <p:cxnSp>
         <p:nvCxnSpPr>
-          <p:cNvPr id="28" name="Straight Arrow Connector 27"/>
+          <p:cNvPr id="26" name="Straight Arrow Connector 27"/>
           <p:cNvCxnSpPr/>
           <p:nvPr/>
         </p:nvCxnSpPr>
         <p:spPr>
           <a:xfrm>
-            <a:off x="8172400" y="1988840"/>
+            <a:off x="6681462" y="2708920"/>
             <a:ext cx="360040" cy="0"/>
           </a:xfrm>
           <a:prstGeom prst="straightConnector1">
@@ -6066,13 +5854,13 @@
       </p:cxnSp>
       <p:sp>
         <p:nvSpPr>
-          <p:cNvPr id="30" name="TextBox 29"/>
+          <p:cNvPr id="27" name="TextBox 29"/>
           <p:cNvSpPr txBox="1"/>
           <p:nvPr/>
         </p:nvSpPr>
         <p:spPr>
           <a:xfrm>
-            <a:off x="8079162" y="2050975"/>
+            <a:off x="6588224" y="2771055"/>
             <a:ext cx="736099" cy="307777"/>
           </a:xfrm>
           <a:prstGeom prst="rect">
@@ -6104,13 +5892,13 @@
       </p:sp>
       <p:sp>
         <p:nvSpPr>
-          <p:cNvPr id="31" name="TextBox 30"/>
+          <p:cNvPr id="29" name="TextBox 30"/>
           <p:cNvSpPr txBox="1"/>
           <p:nvPr/>
         </p:nvSpPr>
         <p:spPr>
           <a:xfrm>
-            <a:off x="8100392" y="1128133"/>
+            <a:off x="6609454" y="1848213"/>
             <a:ext cx="736099" cy="307777"/>
           </a:xfrm>
           <a:prstGeom prst="rect">
@@ -6140,40 +5928,10 @@
           </a:p>
         </p:txBody>
       </p:sp>
-      <p:sp>
-        <p:nvSpPr>
-          <p:cNvPr id="4096" name="TextBox 4095"/>
-          <p:cNvSpPr txBox="1"/>
-          <p:nvPr/>
-        </p:nvSpPr>
-        <p:spPr>
-          <a:xfrm>
-            <a:off x="5242689" y="6332058"/>
-            <a:ext cx="2404954" cy="369332"/>
-          </a:xfrm>
-          <a:prstGeom prst="rect">
-            <a:avLst/>
-          </a:prstGeom>
-          <a:noFill/>
-        </p:spPr>
-        <p:txBody>
-          <a:bodyPr wrap="none" rtlCol="0">
-            <a:spAutoFit/>
-          </a:bodyPr>
-          <a:lstStyle/>
-          <a:p>
-            <a:r>
-              <a:rPr lang="en-AU" b="1" dirty="0" smtClean="0"/>
-              <a:t>Multiple fall best doses</a:t>
-            </a:r>
-            <a:endParaRPr lang="en-AU" b="1" dirty="0"/>
-          </a:p>
-        </p:txBody>
-      </p:sp>
     </p:spTree>
     <p:extLst>
       <p:ext uri="{BB962C8B-B14F-4D97-AF65-F5344CB8AC3E}">
-        <p14:creationId xmlns:p14="http://schemas.microsoft.com/office/powerpoint/2010/main" val="2955970339"/>
+        <p14:creationId xmlns:p14="http://schemas.microsoft.com/office/powerpoint/2010/main" val="3384583430"/>
       </p:ext>
     </p:extLst>
   </p:cSld>
@@ -6202,7 +5960,7 @@
       </p:grpSpPr>
       <p:pic>
         <p:nvPicPr>
-          <p:cNvPr id="5122" name="Picture 2"/>
+          <p:cNvPr id="4098" name="Picture 2"/>
           <p:cNvPicPr>
             <a:picLocks noChangeAspect="1" noChangeArrowheads="1"/>
           </p:cNvPicPr>
@@ -6216,13 +5974,13 @@
               </a:ext>
             </a:extLst>
           </a:blip>
-          <a:srcRect l="2499" t="23111" r="51251" b="10222"/>
+          <a:srcRect l="1494" t="22805" r="51035" b="13931"/>
           <a:stretch/>
         </p:blipFill>
         <p:spPr bwMode="auto">
           <a:xfrm>
-            <a:off x="971600" y="1165448"/>
-            <a:ext cx="6343650" cy="5715000"/>
+            <a:off x="1115616" y="908720"/>
+            <a:ext cx="6511158" cy="5423338"/>
           </a:xfrm>
           <a:prstGeom prst="rect">
             <a:avLst/>
@@ -6233,14 +5991,14 @@
           </a:ln>
           <a:effectLst/>
           <a:extLst>
-            <a:ext uri="{909E8E84-426E-40DD-AFC4-6F175D3DCCD1}">
+            <a:ext uri="{909E8E84-426E-40dd-AFC4-6F175D3DCCD1}">
               <a14:hiddenFill xmlns:a14="http://schemas.microsoft.com/office/drawing/2010/main">
                 <a:solidFill>
                   <a:schemeClr val="accent1"/>
                 </a:solidFill>
               </a14:hiddenFill>
             </a:ext>
-            <a:ext uri="{91240B29-F687-4F45-9708-019B960494DF}">
+            <a:ext uri="{91240B29-F687-4f45-9708-019B960494DF}">
               <a14:hiddenLine xmlns:a14="http://schemas.microsoft.com/office/drawing/2010/main" w="9525">
                 <a:solidFill>
                   <a:schemeClr val="tx1"/>
@@ -6250,7 +6008,7 @@
                 <a:tailEnd/>
               </a14:hiddenLine>
             </a:ext>
-            <a:ext uri="{AF507438-7753-43E0-B8FC-AC1667EBCBE1}">
+            <a:ext uri="{AF507438-7753-43e0-B8FC-AC1667EBCBE1}">
               <a14:hiddenEffects xmlns:a14="http://schemas.microsoft.com/office/drawing/2010/main">
                 <a:effectLst>
                   <a:outerShdw dist="35921" dir="2700000" algn="ctr" rotWithShape="0">
@@ -6270,8 +6028,8 @@
         </p:nvSpPr>
         <p:spPr>
           <a:xfrm>
-            <a:off x="6305962" y="1713580"/>
-            <a:ext cx="546670" cy="227664"/>
+            <a:off x="214568" y="692696"/>
+            <a:ext cx="3877985" cy="369332"/>
           </a:xfrm>
           <a:prstGeom prst="rect">
             <a:avLst/>
@@ -6285,16 +6043,20 @@
           <a:lstStyle/>
           <a:p>
             <a:r>
-              <a:rPr lang="en-AU" sz="1400" dirty="0" smtClean="0">
-                <a:solidFill>
-                  <a:schemeClr val="tx2"/>
+              <a:rPr lang="en-AU" dirty="0" smtClean="0">
+                <a:solidFill>
+                  <a:schemeClr val="accent3">
+                    <a:lumMod val="50000"/>
+                  </a:schemeClr>
                 </a:solidFill>
               </a:rPr>
-              <a:t>100 nm</a:t>
-            </a:r>
-            <a:endParaRPr lang="en-AU" sz="1400" dirty="0">
+              <a:t>Dots/Line DF:     0.1			</a:t>
+            </a:r>
+            <a:endParaRPr lang="en-AU" dirty="0">
               <a:solidFill>
-                <a:schemeClr val="tx2"/>
+                <a:schemeClr val="accent3">
+                  <a:lumMod val="50000"/>
+                </a:schemeClr>
               </a:solidFill>
             </a:endParaRPr>
           </a:p>
@@ -6302,14 +6064,14 @@
       </p:sp>
       <p:sp>
         <p:nvSpPr>
-          <p:cNvPr id="6" name="TextBox 5"/>
+          <p:cNvPr id="7" name="TextBox 6"/>
           <p:cNvSpPr txBox="1"/>
           <p:nvPr/>
         </p:nvSpPr>
         <p:spPr>
           <a:xfrm>
-            <a:off x="6300192" y="1897391"/>
-            <a:ext cx="546670" cy="227664"/>
+            <a:off x="2843808" y="692696"/>
+            <a:ext cx="476412" cy="369332"/>
           </a:xfrm>
           <a:prstGeom prst="rect">
             <a:avLst/>
@@ -6323,16 +6085,20 @@
           <a:lstStyle/>
           <a:p>
             <a:r>
-              <a:rPr lang="en-AU" sz="1400" dirty="0" smtClean="0">
-                <a:solidFill>
-                  <a:schemeClr val="tx2"/>
+              <a:rPr lang="en-AU" dirty="0" smtClean="0">
+                <a:solidFill>
+                  <a:schemeClr val="accent3">
+                    <a:lumMod val="50000"/>
+                  </a:schemeClr>
                 </a:solidFill>
               </a:rPr>
-              <a:t>100 nm</a:t>
-            </a:r>
-            <a:endParaRPr lang="en-AU" sz="1400" dirty="0">
+              <a:t>0.2</a:t>
+            </a:r>
+            <a:endParaRPr lang="en-AU" dirty="0">
               <a:solidFill>
-                <a:schemeClr val="tx2"/>
+                <a:schemeClr val="accent3">
+                  <a:lumMod val="50000"/>
+                </a:schemeClr>
               </a:solidFill>
             </a:endParaRPr>
           </a:p>
@@ -6340,14 +6106,14 @@
       </p:sp>
       <p:sp>
         <p:nvSpPr>
-          <p:cNvPr id="7" name="TextBox 6"/>
+          <p:cNvPr id="8" name="TextBox 7"/>
           <p:cNvSpPr txBox="1"/>
           <p:nvPr/>
         </p:nvSpPr>
         <p:spPr>
           <a:xfrm>
-            <a:off x="6365566" y="2095844"/>
-            <a:ext cx="478813" cy="227664"/>
+            <a:off x="3854347" y="692696"/>
+            <a:ext cx="476412" cy="369332"/>
           </a:xfrm>
           <a:prstGeom prst="rect">
             <a:avLst/>
@@ -6361,24 +6127,20 @@
           <a:lstStyle/>
           <a:p>
             <a:r>
-              <a:rPr lang="en-AU" sz="1400" dirty="0">
-                <a:solidFill>
-                  <a:schemeClr val="tx2"/>
+              <a:rPr lang="en-AU" dirty="0" smtClean="0">
+                <a:solidFill>
+                  <a:schemeClr val="accent3">
+                    <a:lumMod val="50000"/>
+                  </a:schemeClr>
                 </a:solidFill>
               </a:rPr>
-              <a:t>8</a:t>
-            </a:r>
-            <a:r>
-              <a:rPr lang="en-AU" sz="1400" dirty="0" smtClean="0">
-                <a:solidFill>
-                  <a:schemeClr val="tx2"/>
-                </a:solidFill>
-              </a:rPr>
-              <a:t>0 nm</a:t>
-            </a:r>
-            <a:endParaRPr lang="en-AU" sz="1400" dirty="0">
+              <a:t>0.3</a:t>
+            </a:r>
+            <a:endParaRPr lang="en-AU" dirty="0">
               <a:solidFill>
-                <a:schemeClr val="tx2"/>
+                <a:schemeClr val="accent3">
+                  <a:lumMod val="50000"/>
+                </a:schemeClr>
               </a:solidFill>
             </a:endParaRPr>
           </a:p>
@@ -6386,14 +6148,14 @@
       </p:sp>
       <p:sp>
         <p:nvSpPr>
-          <p:cNvPr id="8" name="TextBox 7"/>
+          <p:cNvPr id="9" name="TextBox 8"/>
           <p:cNvSpPr txBox="1"/>
           <p:nvPr/>
         </p:nvSpPr>
         <p:spPr>
           <a:xfrm>
-            <a:off x="6368049" y="2308902"/>
-            <a:ext cx="478813" cy="227664"/>
+            <a:off x="4870261" y="687189"/>
+            <a:ext cx="476412" cy="369332"/>
           </a:xfrm>
           <a:prstGeom prst="rect">
             <a:avLst/>
@@ -6407,24 +6169,20 @@
           <a:lstStyle/>
           <a:p>
             <a:r>
-              <a:rPr lang="en-AU" sz="1400" dirty="0">
-                <a:solidFill>
-                  <a:schemeClr val="tx2"/>
+              <a:rPr lang="en-AU" dirty="0" smtClean="0">
+                <a:solidFill>
+                  <a:schemeClr val="accent3">
+                    <a:lumMod val="50000"/>
+                  </a:schemeClr>
                 </a:solidFill>
               </a:rPr>
-              <a:t>6</a:t>
-            </a:r>
-            <a:r>
-              <a:rPr lang="en-AU" sz="1400" dirty="0" smtClean="0">
-                <a:solidFill>
-                  <a:schemeClr val="tx2"/>
-                </a:solidFill>
-              </a:rPr>
-              <a:t>0 nm</a:t>
-            </a:r>
-            <a:endParaRPr lang="en-AU" sz="1400" dirty="0">
+              <a:t>0.4</a:t>
+            </a:r>
+            <a:endParaRPr lang="en-AU" dirty="0">
               <a:solidFill>
-                <a:schemeClr val="tx2"/>
+                <a:schemeClr val="accent3">
+                  <a:lumMod val="50000"/>
+                </a:schemeClr>
               </a:solidFill>
             </a:endParaRPr>
           </a:p>
@@ -6432,14 +6190,14 @@
       </p:sp>
       <p:sp>
         <p:nvSpPr>
-          <p:cNvPr id="9" name="TextBox 8"/>
+          <p:cNvPr id="10" name="TextBox 9"/>
           <p:cNvSpPr txBox="1"/>
           <p:nvPr/>
         </p:nvSpPr>
         <p:spPr>
           <a:xfrm>
-            <a:off x="6365566" y="2735018"/>
-            <a:ext cx="478813" cy="227664"/>
+            <a:off x="5967796" y="687189"/>
+            <a:ext cx="476412" cy="369332"/>
           </a:xfrm>
           <a:prstGeom prst="rect">
             <a:avLst/>
@@ -6453,39 +6211,28 @@
           <a:lstStyle/>
           <a:p>
             <a:r>
-              <a:rPr lang="en-AU" sz="1400" dirty="0">
-                <a:solidFill>
-                  <a:schemeClr val="tx2"/>
+              <a:rPr lang="en-AU" dirty="0" smtClean="0">
+                <a:solidFill>
+                  <a:schemeClr val="accent3">
+                    <a:lumMod val="50000"/>
+                  </a:schemeClr>
                 </a:solidFill>
               </a:rPr>
-              <a:t>2</a:t>
-            </a:r>
-            <a:r>
-              <a:rPr lang="en-AU" sz="1400" dirty="0" smtClean="0">
-                <a:solidFill>
-                  <a:schemeClr val="tx2"/>
-                </a:solidFill>
-              </a:rPr>
-              <a:t>0 nm</a:t>
-            </a:r>
-            <a:endParaRPr lang="en-AU" sz="1400" dirty="0">
-              <a:solidFill>
-                <a:schemeClr val="tx2"/>
-              </a:solidFill>
-            </a:endParaRPr>
-          </a:p>
-        </p:txBody>
-      </p:sp>
-      <p:sp>
-        <p:nvSpPr>
-          <p:cNvPr id="10" name="TextBox 9"/>
+              <a:t>0.6</a:t>
+            </a:r>
+          </a:p>
+        </p:txBody>
+      </p:sp>
+      <p:sp>
+        <p:nvSpPr>
+          <p:cNvPr id="11" name="TextBox 10"/>
           <p:cNvSpPr txBox="1"/>
           <p:nvPr/>
         </p:nvSpPr>
         <p:spPr>
           <a:xfrm>
-            <a:off x="6368049" y="2521960"/>
-            <a:ext cx="478813" cy="227664"/>
+            <a:off x="7020272" y="687189"/>
+            <a:ext cx="476412" cy="369332"/>
           </a:xfrm>
           <a:prstGeom prst="rect">
             <a:avLst/>
@@ -6499,115 +6246,330 @@
           <a:lstStyle/>
           <a:p>
             <a:r>
-              <a:rPr lang="en-AU" sz="1400" dirty="0">
-                <a:solidFill>
-                  <a:schemeClr val="tx2"/>
+              <a:rPr lang="en-AU" dirty="0" smtClean="0">
+                <a:solidFill>
+                  <a:schemeClr val="accent3">
+                    <a:lumMod val="50000"/>
+                  </a:schemeClr>
                 </a:solidFill>
               </a:rPr>
-              <a:t>4</a:t>
-            </a:r>
-            <a:r>
-              <a:rPr lang="en-AU" sz="1400" dirty="0" smtClean="0">
-                <a:solidFill>
-                  <a:schemeClr val="tx2"/>
-                </a:solidFill>
-              </a:rPr>
-              <a:t>0 nm</a:t>
-            </a:r>
-            <a:endParaRPr lang="en-AU" sz="1400" dirty="0">
+              <a:t>0.8</a:t>
+            </a:r>
+            <a:endParaRPr lang="en-AU" dirty="0">
               <a:solidFill>
-                <a:schemeClr val="tx2"/>
+                <a:schemeClr val="accent3">
+                  <a:lumMod val="50000"/>
+                </a:schemeClr>
               </a:solidFill>
             </a:endParaRPr>
           </a:p>
         </p:txBody>
       </p:sp>
+      <p:sp>
+        <p:nvSpPr>
+          <p:cNvPr id="13" name="TextBox 12"/>
+          <p:cNvSpPr txBox="1"/>
+          <p:nvPr/>
+        </p:nvSpPr>
+        <p:spPr>
+          <a:xfrm>
+            <a:off x="179512" y="3435723"/>
+            <a:ext cx="3877985" cy="369332"/>
+          </a:xfrm>
+          <a:prstGeom prst="rect">
+            <a:avLst/>
+          </a:prstGeom>
+          <a:noFill/>
+        </p:spPr>
+        <p:txBody>
+          <a:bodyPr wrap="none" rtlCol="0">
+            <a:spAutoFit/>
+          </a:bodyPr>
+          <a:lstStyle/>
+          <a:p>
+            <a:r>
+              <a:rPr lang="en-AU" dirty="0" smtClean="0">
+                <a:solidFill>
+                  <a:schemeClr val="accent3">
+                    <a:lumMod val="50000"/>
+                  </a:schemeClr>
+                </a:solidFill>
+              </a:rPr>
+              <a:t>Dots/Line DF:       1			</a:t>
+            </a:r>
+            <a:endParaRPr lang="en-AU" dirty="0">
+              <a:solidFill>
+                <a:schemeClr val="accent3">
+                  <a:lumMod val="50000"/>
+                </a:schemeClr>
+              </a:solidFill>
+            </a:endParaRPr>
+          </a:p>
+        </p:txBody>
+      </p:sp>
+      <p:sp>
+        <p:nvSpPr>
+          <p:cNvPr id="14" name="TextBox 13"/>
+          <p:cNvSpPr txBox="1"/>
+          <p:nvPr/>
+        </p:nvSpPr>
+        <p:spPr>
+          <a:xfrm>
+            <a:off x="2808752" y="3435723"/>
+            <a:ext cx="354584" cy="369332"/>
+          </a:xfrm>
+          <a:prstGeom prst="rect">
+            <a:avLst/>
+          </a:prstGeom>
+          <a:noFill/>
+        </p:spPr>
+        <p:txBody>
+          <a:bodyPr wrap="none" rtlCol="0">
+            <a:spAutoFit/>
+          </a:bodyPr>
+          <a:lstStyle/>
+          <a:p>
+            <a:r>
+              <a:rPr lang="en-AU" dirty="0">
+                <a:solidFill>
+                  <a:schemeClr val="accent3">
+                    <a:lumMod val="50000"/>
+                  </a:schemeClr>
+                </a:solidFill>
+              </a:rPr>
+              <a:t> </a:t>
+            </a:r>
+            <a:r>
+              <a:rPr lang="en-AU" dirty="0" smtClean="0">
+                <a:solidFill>
+                  <a:schemeClr val="accent3">
+                    <a:lumMod val="50000"/>
+                  </a:schemeClr>
+                </a:solidFill>
+              </a:rPr>
+              <a:t>2</a:t>
+            </a:r>
+            <a:endParaRPr lang="en-AU" dirty="0">
+              <a:solidFill>
+                <a:schemeClr val="accent3">
+                  <a:lumMod val="50000"/>
+                </a:schemeClr>
+              </a:solidFill>
+            </a:endParaRPr>
+          </a:p>
+        </p:txBody>
+      </p:sp>
+      <p:sp>
+        <p:nvSpPr>
+          <p:cNvPr id="15" name="TextBox 14"/>
+          <p:cNvSpPr txBox="1"/>
+          <p:nvPr/>
+        </p:nvSpPr>
+        <p:spPr>
+          <a:xfrm>
+            <a:off x="3819291" y="3435723"/>
+            <a:ext cx="407484" cy="369332"/>
+          </a:xfrm>
+          <a:prstGeom prst="rect">
+            <a:avLst/>
+          </a:prstGeom>
+          <a:noFill/>
+        </p:spPr>
+        <p:txBody>
+          <a:bodyPr wrap="none" rtlCol="0">
+            <a:spAutoFit/>
+          </a:bodyPr>
+          <a:lstStyle/>
+          <a:p>
+            <a:r>
+              <a:rPr lang="en-AU" dirty="0">
+                <a:solidFill>
+                  <a:schemeClr val="accent3">
+                    <a:lumMod val="50000"/>
+                  </a:schemeClr>
+                </a:solidFill>
+              </a:rPr>
+              <a:t> </a:t>
+            </a:r>
+            <a:r>
+              <a:rPr lang="en-AU" dirty="0" smtClean="0">
+                <a:solidFill>
+                  <a:schemeClr val="accent3">
+                    <a:lumMod val="50000"/>
+                  </a:schemeClr>
+                </a:solidFill>
+              </a:rPr>
+              <a:t> 3</a:t>
+            </a:r>
+            <a:endParaRPr lang="en-AU" dirty="0">
+              <a:solidFill>
+                <a:schemeClr val="accent3">
+                  <a:lumMod val="50000"/>
+                </a:schemeClr>
+              </a:solidFill>
+            </a:endParaRPr>
+          </a:p>
+        </p:txBody>
+      </p:sp>
+      <p:sp>
+        <p:nvSpPr>
+          <p:cNvPr id="16" name="TextBox 15"/>
+          <p:cNvSpPr txBox="1"/>
+          <p:nvPr/>
+        </p:nvSpPr>
+        <p:spPr>
+          <a:xfrm>
+            <a:off x="4835205" y="3430216"/>
+            <a:ext cx="407484" cy="369332"/>
+          </a:xfrm>
+          <a:prstGeom prst="rect">
+            <a:avLst/>
+          </a:prstGeom>
+          <a:noFill/>
+        </p:spPr>
+        <p:txBody>
+          <a:bodyPr wrap="none" rtlCol="0">
+            <a:spAutoFit/>
+          </a:bodyPr>
+          <a:lstStyle/>
+          <a:p>
+            <a:r>
+              <a:rPr lang="en-AU" dirty="0">
+                <a:solidFill>
+                  <a:schemeClr val="accent3">
+                    <a:lumMod val="50000"/>
+                  </a:schemeClr>
+                </a:solidFill>
+              </a:rPr>
+              <a:t> </a:t>
+            </a:r>
+            <a:r>
+              <a:rPr lang="en-AU" dirty="0" smtClean="0">
+                <a:solidFill>
+                  <a:schemeClr val="accent3">
+                    <a:lumMod val="50000"/>
+                  </a:schemeClr>
+                </a:solidFill>
+              </a:rPr>
+              <a:t> 4</a:t>
+            </a:r>
+            <a:endParaRPr lang="en-AU" dirty="0">
+              <a:solidFill>
+                <a:schemeClr val="accent3">
+                  <a:lumMod val="50000"/>
+                </a:schemeClr>
+              </a:solidFill>
+            </a:endParaRPr>
+          </a:p>
+        </p:txBody>
+      </p:sp>
+      <p:sp>
+        <p:nvSpPr>
+          <p:cNvPr id="17" name="TextBox 16"/>
+          <p:cNvSpPr txBox="1"/>
+          <p:nvPr/>
+        </p:nvSpPr>
+        <p:spPr>
+          <a:xfrm>
+            <a:off x="5932740" y="3430216"/>
+            <a:ext cx="407484" cy="369332"/>
+          </a:xfrm>
+          <a:prstGeom prst="rect">
+            <a:avLst/>
+          </a:prstGeom>
+          <a:noFill/>
+        </p:spPr>
+        <p:txBody>
+          <a:bodyPr wrap="none" rtlCol="0">
+            <a:spAutoFit/>
+          </a:bodyPr>
+          <a:lstStyle/>
+          <a:p>
+            <a:r>
+              <a:rPr lang="en-AU" dirty="0">
+                <a:solidFill>
+                  <a:schemeClr val="accent3">
+                    <a:lumMod val="50000"/>
+                  </a:schemeClr>
+                </a:solidFill>
+              </a:rPr>
+              <a:t> </a:t>
+            </a:r>
+            <a:r>
+              <a:rPr lang="en-AU" dirty="0" smtClean="0">
+                <a:solidFill>
+                  <a:schemeClr val="accent3">
+                    <a:lumMod val="50000"/>
+                  </a:schemeClr>
+                </a:solidFill>
+              </a:rPr>
+              <a:t> 5</a:t>
+            </a:r>
+          </a:p>
+        </p:txBody>
+      </p:sp>
+      <p:sp>
+        <p:nvSpPr>
+          <p:cNvPr id="18" name="TextBox 17"/>
+          <p:cNvSpPr txBox="1"/>
+          <p:nvPr/>
+        </p:nvSpPr>
+        <p:spPr>
+          <a:xfrm>
+            <a:off x="6985216" y="3430216"/>
+            <a:ext cx="407484" cy="369332"/>
+          </a:xfrm>
+          <a:prstGeom prst="rect">
+            <a:avLst/>
+          </a:prstGeom>
+          <a:noFill/>
+        </p:spPr>
+        <p:txBody>
+          <a:bodyPr wrap="none" rtlCol="0">
+            <a:spAutoFit/>
+          </a:bodyPr>
+          <a:lstStyle/>
+          <a:p>
+            <a:r>
+              <a:rPr lang="en-AU" dirty="0">
+                <a:solidFill>
+                  <a:schemeClr val="accent3">
+                    <a:lumMod val="50000"/>
+                  </a:schemeClr>
+                </a:solidFill>
+              </a:rPr>
+              <a:t> </a:t>
+            </a:r>
+            <a:r>
+              <a:rPr lang="en-AU" dirty="0" smtClean="0">
+                <a:solidFill>
+                  <a:schemeClr val="accent3">
+                    <a:lumMod val="50000"/>
+                  </a:schemeClr>
+                </a:solidFill>
+              </a:rPr>
+              <a:t> 6</a:t>
+            </a:r>
+            <a:endParaRPr lang="en-AU" dirty="0">
+              <a:solidFill>
+                <a:schemeClr val="accent3">
+                  <a:lumMod val="50000"/>
+                </a:schemeClr>
+              </a:solidFill>
+            </a:endParaRPr>
+          </a:p>
+        </p:txBody>
+      </p:sp>
       <p:cxnSp>
         <p:nvCxnSpPr>
-          <p:cNvPr id="11" name="Straight Arrow Connector 10"/>
+          <p:cNvPr id="19" name="Straight Arrow Connector 18"/>
           <p:cNvCxnSpPr/>
           <p:nvPr/>
         </p:nvCxnSpPr>
         <p:spPr>
-          <a:xfrm flipH="1">
-            <a:off x="6193811" y="1827411"/>
-            <a:ext cx="202013" cy="0"/>
-          </a:xfrm>
-          <a:prstGeom prst="straightConnector1">
-            <a:avLst/>
-          </a:prstGeom>
-          <a:ln>
-            <a:headEnd type="arrow"/>
-            <a:tailEnd type="arrow"/>
-          </a:ln>
-        </p:spPr>
-        <p:style>
-          <a:lnRef idx="1">
-            <a:schemeClr val="accent1"/>
-          </a:lnRef>
-          <a:fillRef idx="0">
-            <a:schemeClr val="accent1"/>
-          </a:fillRef>
-          <a:effectRef idx="0">
-            <a:schemeClr val="accent1"/>
-          </a:effectRef>
-          <a:fontRef idx="minor">
-            <a:schemeClr val="tx1"/>
-          </a:fontRef>
-        </p:style>
-      </p:cxnSp>
-      <p:sp>
-        <p:nvSpPr>
-          <p:cNvPr id="12" name="Right Arrow 11"/>
-          <p:cNvSpPr/>
-          <p:nvPr/>
-        </p:nvSpPr>
-        <p:spPr>
-          <a:xfrm>
-            <a:off x="4716016" y="1384411"/>
-            <a:ext cx="1797136" cy="348834"/>
-          </a:xfrm>
-          <a:prstGeom prst="rightArrow">
-            <a:avLst/>
-          </a:prstGeom>
-        </p:spPr>
-        <p:style>
-          <a:lnRef idx="1">
-            <a:schemeClr val="accent3"/>
-          </a:lnRef>
-          <a:fillRef idx="2">
-            <a:schemeClr val="accent3"/>
-          </a:fillRef>
-          <a:effectRef idx="1">
-            <a:schemeClr val="accent3"/>
-          </a:effectRef>
-          <a:fontRef idx="minor">
-            <a:schemeClr val="dk1"/>
-          </a:fontRef>
-        </p:style>
-        <p:txBody>
-          <a:bodyPr rtlCol="0" anchor="ctr"/>
-          <a:lstStyle/>
-          <a:p>
-            <a:pPr algn="ctr"/>
-            <a:r>
-              <a:rPr lang="en-AU" sz="1200" dirty="0" smtClean="0"/>
-              <a:t>Dot DF: 0.6…1.4  (0.2)</a:t>
-            </a:r>
-            <a:endParaRPr lang="en-AU" sz="1200" dirty="0"/>
-          </a:p>
-        </p:txBody>
-      </p:sp>
-      <p:cxnSp>
-        <p:nvCxnSpPr>
-          <p:cNvPr id="17" name="Straight Arrow Connector 16"/>
-          <p:cNvCxnSpPr/>
-          <p:nvPr/>
-        </p:nvCxnSpPr>
-        <p:spPr>
-          <a:xfrm>
-            <a:off x="1547664" y="1821690"/>
-            <a:ext cx="0" cy="311166"/>
+          <a:xfrm>
+            <a:off x="8100392" y="1988840"/>
+            <a:ext cx="0" cy="432048"/>
           </a:xfrm>
           <a:prstGeom prst="straightConnector1">
             <a:avLst/>
@@ -6634,21 +6596,21 @@
       </p:cxnSp>
       <p:cxnSp>
         <p:nvCxnSpPr>
-          <p:cNvPr id="18" name="Straight Arrow Connector 17"/>
+          <p:cNvPr id="21" name="Straight Arrow Connector 20"/>
           <p:cNvCxnSpPr/>
           <p:nvPr/>
         </p:nvCxnSpPr>
         <p:spPr>
           <a:xfrm>
-            <a:off x="2002314" y="1384411"/>
-            <a:ext cx="200005" cy="0"/>
+            <a:off x="8100392" y="1124744"/>
+            <a:ext cx="0" cy="311166"/>
           </a:xfrm>
           <a:prstGeom prst="straightConnector1">
             <a:avLst/>
           </a:prstGeom>
           <a:ln>
-            <a:headEnd type="arrow" w="sm" len="sm"/>
-            <a:tailEnd type="arrow" w="sm" len="sm"/>
+            <a:headEnd type="arrow"/>
+            <a:tailEnd type="arrow"/>
           </a:ln>
         </p:spPr>
         <p:style>
@@ -6666,15 +6628,83 @@
           </a:fontRef>
         </p:style>
       </p:cxnSp>
-      <p:sp>
-        <p:nvSpPr>
-          <p:cNvPr id="19" name="TextBox 18"/>
+      <p:cxnSp>
+        <p:nvCxnSpPr>
+          <p:cNvPr id="25" name="Straight Arrow Connector 24"/>
+          <p:cNvCxnSpPr/>
+          <p:nvPr/>
+        </p:nvCxnSpPr>
+        <p:spPr>
+          <a:xfrm>
+            <a:off x="8172400" y="1124744"/>
+            <a:ext cx="288032" cy="0"/>
+          </a:xfrm>
+          <a:prstGeom prst="straightConnector1">
+            <a:avLst/>
+          </a:prstGeom>
+          <a:ln>
+            <a:headEnd type="arrow"/>
+            <a:tailEnd type="arrow"/>
+          </a:ln>
+        </p:spPr>
+        <p:style>
+          <a:lnRef idx="1">
+            <a:schemeClr val="accent1"/>
+          </a:lnRef>
+          <a:fillRef idx="0">
+            <a:schemeClr val="accent1"/>
+          </a:fillRef>
+          <a:effectRef idx="0">
+            <a:schemeClr val="accent1"/>
+          </a:effectRef>
+          <a:fontRef idx="minor">
+            <a:schemeClr val="tx1"/>
+          </a:fontRef>
+        </p:style>
+      </p:cxnSp>
+      <p:cxnSp>
+        <p:nvCxnSpPr>
+          <p:cNvPr id="28" name="Straight Arrow Connector 27"/>
+          <p:cNvCxnSpPr/>
+          <p:nvPr/>
+        </p:nvCxnSpPr>
+        <p:spPr>
+          <a:xfrm>
+            <a:off x="8172400" y="1988840"/>
+            <a:ext cx="360040" cy="0"/>
+          </a:xfrm>
+          <a:prstGeom prst="straightConnector1">
+            <a:avLst/>
+          </a:prstGeom>
+          <a:ln>
+            <a:headEnd type="arrow"/>
+            <a:tailEnd type="arrow"/>
+          </a:ln>
+        </p:spPr>
+        <p:style>
+          <a:lnRef idx="1">
+            <a:schemeClr val="accent1"/>
+          </a:lnRef>
+          <a:fillRef idx="0">
+            <a:schemeClr val="accent1"/>
+          </a:fillRef>
+          <a:effectRef idx="0">
+            <a:schemeClr val="accent1"/>
+          </a:effectRef>
+          <a:fontRef idx="minor">
+            <a:schemeClr val="tx1"/>
+          </a:fontRef>
+        </p:style>
+      </p:cxnSp>
+      <p:sp>
+        <p:nvSpPr>
+          <p:cNvPr id="30" name="TextBox 29"/>
           <p:cNvSpPr txBox="1"/>
           <p:nvPr/>
         </p:nvSpPr>
         <p:spPr>
           <a:xfrm>
-            <a:off x="1117071" y="1589614"/>
+            <a:off x="8079162" y="2050975"/>
             <a:ext cx="736099" cy="307777"/>
           </a:xfrm>
           <a:prstGeom prst="rect">
@@ -6694,7 +6724,7 @@
                   <a:schemeClr val="tx2"/>
                 </a:solidFill>
               </a:rPr>
-              <a:t>200 nm</a:t>
+              <a:t>500 nm</a:t>
             </a:r>
             <a:endParaRPr lang="en-AU" sz="1400" dirty="0">
               <a:solidFill>
@@ -6706,13 +6736,13 @@
       </p:sp>
       <p:sp>
         <p:nvSpPr>
-          <p:cNvPr id="20" name="TextBox 19"/>
+          <p:cNvPr id="31" name="TextBox 30"/>
           <p:cNvSpPr txBox="1"/>
           <p:nvPr/>
         </p:nvSpPr>
         <p:spPr>
           <a:xfrm>
-            <a:off x="1266215" y="1230522"/>
+            <a:off x="8100392" y="1128133"/>
             <a:ext cx="736099" cy="307777"/>
           </a:xfrm>
           <a:prstGeom prst="rect">
@@ -6727,20 +6757,12 @@
           <a:lstStyle/>
           <a:p>
             <a:r>
-              <a:rPr lang="en-AU" sz="1400" dirty="0">
+              <a:rPr lang="en-AU" sz="1400" dirty="0" smtClean="0">
                 <a:solidFill>
                   <a:schemeClr val="tx2"/>
                 </a:solidFill>
               </a:rPr>
-              <a:t>1</a:t>
-            </a:r>
-            <a:r>
-              <a:rPr lang="en-AU" sz="1400" dirty="0" smtClean="0">
-                <a:solidFill>
-                  <a:schemeClr val="tx2"/>
-                </a:solidFill>
-              </a:rPr>
-              <a:t>00 nm</a:t>
+              <a:t>300 nm</a:t>
             </a:r>
             <a:endParaRPr lang="en-AU" sz="1400" dirty="0">
               <a:solidFill>
@@ -6752,98 +6774,14 @@
       </p:sp>
       <p:sp>
         <p:nvSpPr>
-          <p:cNvPr id="24" name="Right Arrow 23"/>
-          <p:cNvSpPr/>
-          <p:nvPr/>
-        </p:nvSpPr>
-        <p:spPr>
-          <a:xfrm>
-            <a:off x="1926332" y="792530"/>
-            <a:ext cx="2217093" cy="437992"/>
-          </a:xfrm>
-          <a:prstGeom prst="rightArrow">
-            <a:avLst/>
-          </a:prstGeom>
-        </p:spPr>
-        <p:style>
-          <a:lnRef idx="1">
-            <a:schemeClr val="accent3"/>
-          </a:lnRef>
-          <a:fillRef idx="2">
-            <a:schemeClr val="accent3"/>
-          </a:fillRef>
-          <a:effectRef idx="1">
-            <a:schemeClr val="accent3"/>
-          </a:effectRef>
-          <a:fontRef idx="minor">
-            <a:schemeClr val="dk1"/>
-          </a:fontRef>
-        </p:style>
-        <p:txBody>
-          <a:bodyPr rtlCol="0" anchor="ctr"/>
-          <a:lstStyle/>
-          <a:p>
-            <a:pPr algn="ctr"/>
-            <a:r>
-              <a:rPr lang="en-AU" sz="1400" dirty="0" smtClean="0"/>
-              <a:t>Line DF: 0.6…4.4  (0.2)</a:t>
-            </a:r>
-            <a:endParaRPr lang="en-AU" sz="1400" dirty="0"/>
-          </a:p>
-        </p:txBody>
-      </p:sp>
-      <p:sp>
-        <p:nvSpPr>
-          <p:cNvPr id="25" name="Down Arrow 24"/>
-          <p:cNvSpPr/>
-          <p:nvPr/>
-        </p:nvSpPr>
-        <p:spPr>
-          <a:xfrm>
-            <a:off x="703734" y="1897390"/>
-            <a:ext cx="535732" cy="3547833"/>
-          </a:xfrm>
-          <a:prstGeom prst="downArrow">
-            <a:avLst/>
-          </a:prstGeom>
-        </p:spPr>
-        <p:style>
-          <a:lnRef idx="1">
-            <a:schemeClr val="accent3"/>
-          </a:lnRef>
-          <a:fillRef idx="2">
-            <a:schemeClr val="accent3"/>
-          </a:fillRef>
-          <a:effectRef idx="1">
-            <a:schemeClr val="accent3"/>
-          </a:effectRef>
-          <a:fontRef idx="minor">
-            <a:schemeClr val="dk1"/>
-          </a:fontRef>
-        </p:style>
-        <p:txBody>
-          <a:bodyPr vert="vert270" rtlCol="0" anchor="ctr"/>
-          <a:lstStyle/>
-          <a:p>
-            <a:pPr algn="ctr"/>
-            <a:r>
-              <a:rPr lang="en-AU" sz="1400" dirty="0" smtClean="0"/>
-              <a:t>Line DF: 4.4… 0.6 (0.2)</a:t>
-            </a:r>
-            <a:endParaRPr lang="en-AU" sz="1400" dirty="0"/>
-          </a:p>
-        </p:txBody>
-      </p:sp>
-      <p:sp>
-        <p:nvSpPr>
-          <p:cNvPr id="23" name="TextBox 22"/>
+          <p:cNvPr id="4096" name="TextBox 4095"/>
           <p:cNvSpPr txBox="1"/>
           <p:nvPr/>
         </p:nvSpPr>
         <p:spPr>
           <a:xfrm>
-            <a:off x="6395824" y="548680"/>
-            <a:ext cx="795411" cy="369332"/>
+            <a:off x="5242689" y="6332058"/>
+            <a:ext cx="2404954" cy="369332"/>
           </a:xfrm>
           <a:prstGeom prst="rect">
             <a:avLst/>
@@ -6857,17 +6795,17 @@
           <a:lstStyle/>
           <a:p>
             <a:r>
-              <a:rPr lang="en-AU" dirty="0" smtClean="0"/>
-              <a:t>design</a:t>
-            </a:r>
-            <a:endParaRPr lang="en-AU" dirty="0"/>
+              <a:rPr lang="en-AU" b="1" dirty="0" smtClean="0"/>
+              <a:t>Multiple fall best doses</a:t>
+            </a:r>
+            <a:endParaRPr lang="en-AU" b="1" dirty="0"/>
           </a:p>
         </p:txBody>
       </p:sp>
     </p:spTree>
     <p:extLst>
       <p:ext uri="{BB962C8B-B14F-4D97-AF65-F5344CB8AC3E}">
-        <p14:creationId xmlns:p14="http://schemas.microsoft.com/office/powerpoint/2010/main" val="1212997145"/>
+        <p14:creationId xmlns:p14="http://schemas.microsoft.com/office/powerpoint/2010/main" val="2955970339"/>
       </p:ext>
     </p:extLst>
   </p:cSld>
@@ -6896,7 +6834,7 @@
       </p:grpSpPr>
       <p:pic>
         <p:nvPicPr>
-          <p:cNvPr id="6146" name="Picture 2"/>
+          <p:cNvPr id="5122" name="Picture 2"/>
           <p:cNvPicPr>
             <a:picLocks noChangeAspect="1" noChangeArrowheads="1"/>
           </p:cNvPicPr>
@@ -6910,13 +6848,13 @@
               </a:ext>
             </a:extLst>
           </a:blip>
-          <a:srcRect l="12538" t="32318" r="58706" b="42209"/>
+          <a:srcRect l="2499" t="23111" r="51251" b="10222"/>
           <a:stretch/>
         </p:blipFill>
         <p:spPr bwMode="auto">
           <a:xfrm>
-            <a:off x="1719618" y="2770496"/>
-            <a:ext cx="3944203" cy="2183641"/>
+            <a:off x="971600" y="1165448"/>
+            <a:ext cx="6343650" cy="5715000"/>
           </a:xfrm>
           <a:prstGeom prst="rect">
             <a:avLst/>
@@ -6927,14 +6865,14 @@
           </a:ln>
           <a:effectLst/>
           <a:extLst>
-            <a:ext uri="{909E8E84-426E-40DD-AFC4-6F175D3DCCD1}">
+            <a:ext uri="{909E8E84-426E-40dd-AFC4-6F175D3DCCD1}">
               <a14:hiddenFill xmlns:a14="http://schemas.microsoft.com/office/drawing/2010/main">
                 <a:solidFill>
                   <a:schemeClr val="accent1"/>
                 </a:solidFill>
               </a14:hiddenFill>
             </a:ext>
-            <a:ext uri="{91240B29-F687-4F45-9708-019B960494DF}">
+            <a:ext uri="{91240B29-F687-4f45-9708-019B960494DF}">
               <a14:hiddenLine xmlns:a14="http://schemas.microsoft.com/office/drawing/2010/main" w="9525">
                 <a:solidFill>
                   <a:schemeClr val="tx1"/>
@@ -6944,7 +6882,7 @@
                 <a:tailEnd/>
               </a14:hiddenLine>
             </a:ext>
-            <a:ext uri="{AF507438-7753-43E0-B8FC-AC1667EBCBE1}">
+            <a:ext uri="{AF507438-7753-43e0-B8FC-AC1667EBCBE1}">
               <a14:hiddenEffects xmlns:a14="http://schemas.microsoft.com/office/drawing/2010/main">
                 <a:effectLst>
                   <a:outerShdw dist="35921" dir="2700000" algn="ctr" rotWithShape="0">
@@ -6958,14 +6896,14 @@
       </p:pic>
       <p:sp>
         <p:nvSpPr>
-          <p:cNvPr id="4" name="TextBox 3"/>
+          <p:cNvPr id="5" name="TextBox 4"/>
           <p:cNvSpPr txBox="1"/>
           <p:nvPr/>
         </p:nvSpPr>
         <p:spPr>
           <a:xfrm>
-            <a:off x="5436096" y="476672"/>
-            <a:ext cx="500650" cy="369332"/>
+            <a:off x="6305962" y="1713580"/>
+            <a:ext cx="546670" cy="227664"/>
           </a:xfrm>
           <a:prstGeom prst="rect">
             <a:avLst/>
@@ -6979,23 +6917,31 @@
           <a:lstStyle/>
           <a:p>
             <a:r>
-              <a:rPr lang="en-AU" dirty="0" smtClean="0"/>
-              <a:t>Fall</a:t>
-            </a:r>
-            <a:endParaRPr lang="en-AU" dirty="0"/>
-          </a:p>
-        </p:txBody>
-      </p:sp>
-      <p:sp>
-        <p:nvSpPr>
-          <p:cNvPr id="5" name="TextBox 4"/>
+              <a:rPr lang="en-AU" sz="1400" dirty="0" smtClean="0">
+                <a:solidFill>
+                  <a:schemeClr val="tx2"/>
+                </a:solidFill>
+              </a:rPr>
+              <a:t>100 nm</a:t>
+            </a:r>
+            <a:endParaRPr lang="en-AU" sz="1400" dirty="0">
+              <a:solidFill>
+                <a:schemeClr val="tx2"/>
+              </a:solidFill>
+            </a:endParaRPr>
+          </a:p>
+        </p:txBody>
+      </p:sp>
+      <p:sp>
+        <p:nvSpPr>
+          <p:cNvPr id="6" name="TextBox 5"/>
           <p:cNvSpPr txBox="1"/>
           <p:nvPr/>
         </p:nvSpPr>
         <p:spPr>
           <a:xfrm>
-            <a:off x="3491880" y="2401164"/>
-            <a:ext cx="1154675" cy="369332"/>
+            <a:off x="6300192" y="1897391"/>
+            <a:ext cx="546670" cy="227664"/>
           </a:xfrm>
           <a:prstGeom prst="rect">
             <a:avLst/>
@@ -7009,8 +6955,542 @@
           <a:lstStyle/>
           <a:p>
             <a:r>
+              <a:rPr lang="en-AU" sz="1400" dirty="0" smtClean="0">
+                <a:solidFill>
+                  <a:schemeClr val="tx2"/>
+                </a:solidFill>
+              </a:rPr>
+              <a:t>100 nm</a:t>
+            </a:r>
+            <a:endParaRPr lang="en-AU" sz="1400" dirty="0">
+              <a:solidFill>
+                <a:schemeClr val="tx2"/>
+              </a:solidFill>
+            </a:endParaRPr>
+          </a:p>
+        </p:txBody>
+      </p:sp>
+      <p:sp>
+        <p:nvSpPr>
+          <p:cNvPr id="7" name="TextBox 6"/>
+          <p:cNvSpPr txBox="1"/>
+          <p:nvPr/>
+        </p:nvSpPr>
+        <p:spPr>
+          <a:xfrm>
+            <a:off x="6365566" y="2095844"/>
+            <a:ext cx="478813" cy="227664"/>
+          </a:xfrm>
+          <a:prstGeom prst="rect">
+            <a:avLst/>
+          </a:prstGeom>
+          <a:noFill/>
+        </p:spPr>
+        <p:txBody>
+          <a:bodyPr wrap="none" rtlCol="0">
+            <a:spAutoFit/>
+          </a:bodyPr>
+          <a:lstStyle/>
+          <a:p>
+            <a:r>
+              <a:rPr lang="en-AU" sz="1400" dirty="0">
+                <a:solidFill>
+                  <a:schemeClr val="tx2"/>
+                </a:solidFill>
+              </a:rPr>
+              <a:t>8</a:t>
+            </a:r>
+            <a:r>
+              <a:rPr lang="en-AU" sz="1400" dirty="0" smtClean="0">
+                <a:solidFill>
+                  <a:schemeClr val="tx2"/>
+                </a:solidFill>
+              </a:rPr>
+              <a:t>0 nm</a:t>
+            </a:r>
+            <a:endParaRPr lang="en-AU" sz="1400" dirty="0">
+              <a:solidFill>
+                <a:schemeClr val="tx2"/>
+              </a:solidFill>
+            </a:endParaRPr>
+          </a:p>
+        </p:txBody>
+      </p:sp>
+      <p:sp>
+        <p:nvSpPr>
+          <p:cNvPr id="8" name="TextBox 7"/>
+          <p:cNvSpPr txBox="1"/>
+          <p:nvPr/>
+        </p:nvSpPr>
+        <p:spPr>
+          <a:xfrm>
+            <a:off x="6368049" y="2308902"/>
+            <a:ext cx="478813" cy="227664"/>
+          </a:xfrm>
+          <a:prstGeom prst="rect">
+            <a:avLst/>
+          </a:prstGeom>
+          <a:noFill/>
+        </p:spPr>
+        <p:txBody>
+          <a:bodyPr wrap="none" rtlCol="0">
+            <a:spAutoFit/>
+          </a:bodyPr>
+          <a:lstStyle/>
+          <a:p>
+            <a:r>
+              <a:rPr lang="en-AU" sz="1400" dirty="0">
+                <a:solidFill>
+                  <a:schemeClr val="tx2"/>
+                </a:solidFill>
+              </a:rPr>
+              <a:t>6</a:t>
+            </a:r>
+            <a:r>
+              <a:rPr lang="en-AU" sz="1400" dirty="0" smtClean="0">
+                <a:solidFill>
+                  <a:schemeClr val="tx2"/>
+                </a:solidFill>
+              </a:rPr>
+              <a:t>0 nm</a:t>
+            </a:r>
+            <a:endParaRPr lang="en-AU" sz="1400" dirty="0">
+              <a:solidFill>
+                <a:schemeClr val="tx2"/>
+              </a:solidFill>
+            </a:endParaRPr>
+          </a:p>
+        </p:txBody>
+      </p:sp>
+      <p:sp>
+        <p:nvSpPr>
+          <p:cNvPr id="9" name="TextBox 8"/>
+          <p:cNvSpPr txBox="1"/>
+          <p:nvPr/>
+        </p:nvSpPr>
+        <p:spPr>
+          <a:xfrm>
+            <a:off x="6365566" y="2735018"/>
+            <a:ext cx="478813" cy="227664"/>
+          </a:xfrm>
+          <a:prstGeom prst="rect">
+            <a:avLst/>
+          </a:prstGeom>
+          <a:noFill/>
+        </p:spPr>
+        <p:txBody>
+          <a:bodyPr wrap="none" rtlCol="0">
+            <a:spAutoFit/>
+          </a:bodyPr>
+          <a:lstStyle/>
+          <a:p>
+            <a:r>
+              <a:rPr lang="en-AU" sz="1400" dirty="0">
+                <a:solidFill>
+                  <a:schemeClr val="tx2"/>
+                </a:solidFill>
+              </a:rPr>
+              <a:t>2</a:t>
+            </a:r>
+            <a:r>
+              <a:rPr lang="en-AU" sz="1400" dirty="0" smtClean="0">
+                <a:solidFill>
+                  <a:schemeClr val="tx2"/>
+                </a:solidFill>
+              </a:rPr>
+              <a:t>0 nm</a:t>
+            </a:r>
+            <a:endParaRPr lang="en-AU" sz="1400" dirty="0">
+              <a:solidFill>
+                <a:schemeClr val="tx2"/>
+              </a:solidFill>
+            </a:endParaRPr>
+          </a:p>
+        </p:txBody>
+      </p:sp>
+      <p:sp>
+        <p:nvSpPr>
+          <p:cNvPr id="10" name="TextBox 9"/>
+          <p:cNvSpPr txBox="1"/>
+          <p:nvPr/>
+        </p:nvSpPr>
+        <p:spPr>
+          <a:xfrm>
+            <a:off x="6368049" y="2521960"/>
+            <a:ext cx="478813" cy="227664"/>
+          </a:xfrm>
+          <a:prstGeom prst="rect">
+            <a:avLst/>
+          </a:prstGeom>
+          <a:noFill/>
+        </p:spPr>
+        <p:txBody>
+          <a:bodyPr wrap="none" rtlCol="0">
+            <a:spAutoFit/>
+          </a:bodyPr>
+          <a:lstStyle/>
+          <a:p>
+            <a:r>
+              <a:rPr lang="en-AU" sz="1400" dirty="0">
+                <a:solidFill>
+                  <a:schemeClr val="tx2"/>
+                </a:solidFill>
+              </a:rPr>
+              <a:t>4</a:t>
+            </a:r>
+            <a:r>
+              <a:rPr lang="en-AU" sz="1400" dirty="0" smtClean="0">
+                <a:solidFill>
+                  <a:schemeClr val="tx2"/>
+                </a:solidFill>
+              </a:rPr>
+              <a:t>0 nm</a:t>
+            </a:r>
+            <a:endParaRPr lang="en-AU" sz="1400" dirty="0">
+              <a:solidFill>
+                <a:schemeClr val="tx2"/>
+              </a:solidFill>
+            </a:endParaRPr>
+          </a:p>
+        </p:txBody>
+      </p:sp>
+      <p:cxnSp>
+        <p:nvCxnSpPr>
+          <p:cNvPr id="11" name="Straight Arrow Connector 10"/>
+          <p:cNvCxnSpPr/>
+          <p:nvPr/>
+        </p:nvCxnSpPr>
+        <p:spPr>
+          <a:xfrm flipH="1">
+            <a:off x="6193811" y="1827411"/>
+            <a:ext cx="202013" cy="0"/>
+          </a:xfrm>
+          <a:prstGeom prst="straightConnector1">
+            <a:avLst/>
+          </a:prstGeom>
+          <a:ln>
+            <a:headEnd type="arrow"/>
+            <a:tailEnd type="arrow"/>
+          </a:ln>
+        </p:spPr>
+        <p:style>
+          <a:lnRef idx="1">
+            <a:schemeClr val="accent1"/>
+          </a:lnRef>
+          <a:fillRef idx="0">
+            <a:schemeClr val="accent1"/>
+          </a:fillRef>
+          <a:effectRef idx="0">
+            <a:schemeClr val="accent1"/>
+          </a:effectRef>
+          <a:fontRef idx="minor">
+            <a:schemeClr val="tx1"/>
+          </a:fontRef>
+        </p:style>
+      </p:cxnSp>
+      <p:sp>
+        <p:nvSpPr>
+          <p:cNvPr id="12" name="Right Arrow 11"/>
+          <p:cNvSpPr/>
+          <p:nvPr/>
+        </p:nvSpPr>
+        <p:spPr>
+          <a:xfrm>
+            <a:off x="4716016" y="1384411"/>
+            <a:ext cx="1797136" cy="348834"/>
+          </a:xfrm>
+          <a:prstGeom prst="rightArrow">
+            <a:avLst/>
+          </a:prstGeom>
+        </p:spPr>
+        <p:style>
+          <a:lnRef idx="1">
+            <a:schemeClr val="accent3"/>
+          </a:lnRef>
+          <a:fillRef idx="2">
+            <a:schemeClr val="accent3"/>
+          </a:fillRef>
+          <a:effectRef idx="1">
+            <a:schemeClr val="accent3"/>
+          </a:effectRef>
+          <a:fontRef idx="minor">
+            <a:schemeClr val="dk1"/>
+          </a:fontRef>
+        </p:style>
+        <p:txBody>
+          <a:bodyPr rtlCol="0" anchor="ctr"/>
+          <a:lstStyle/>
+          <a:p>
+            <a:pPr algn="ctr"/>
+            <a:r>
+              <a:rPr lang="en-AU" sz="1200" dirty="0" smtClean="0"/>
+              <a:t>Dot DF: 0.6…1.4  (0.2)</a:t>
+            </a:r>
+            <a:endParaRPr lang="en-AU" sz="1200" dirty="0"/>
+          </a:p>
+        </p:txBody>
+      </p:sp>
+      <p:cxnSp>
+        <p:nvCxnSpPr>
+          <p:cNvPr id="17" name="Straight Arrow Connector 16"/>
+          <p:cNvCxnSpPr/>
+          <p:nvPr/>
+        </p:nvCxnSpPr>
+        <p:spPr>
+          <a:xfrm>
+            <a:off x="1547664" y="1821690"/>
+            <a:ext cx="0" cy="311166"/>
+          </a:xfrm>
+          <a:prstGeom prst="straightConnector1">
+            <a:avLst/>
+          </a:prstGeom>
+          <a:ln>
+            <a:headEnd type="arrow"/>
+            <a:tailEnd type="arrow"/>
+          </a:ln>
+        </p:spPr>
+        <p:style>
+          <a:lnRef idx="1">
+            <a:schemeClr val="accent1"/>
+          </a:lnRef>
+          <a:fillRef idx="0">
+            <a:schemeClr val="accent1"/>
+          </a:fillRef>
+          <a:effectRef idx="0">
+            <a:schemeClr val="accent1"/>
+          </a:effectRef>
+          <a:fontRef idx="minor">
+            <a:schemeClr val="tx1"/>
+          </a:fontRef>
+        </p:style>
+      </p:cxnSp>
+      <p:cxnSp>
+        <p:nvCxnSpPr>
+          <p:cNvPr id="18" name="Straight Arrow Connector 17"/>
+          <p:cNvCxnSpPr/>
+          <p:nvPr/>
+        </p:nvCxnSpPr>
+        <p:spPr>
+          <a:xfrm>
+            <a:off x="2002314" y="1384411"/>
+            <a:ext cx="200005" cy="0"/>
+          </a:xfrm>
+          <a:prstGeom prst="straightConnector1">
+            <a:avLst/>
+          </a:prstGeom>
+          <a:ln>
+            <a:headEnd type="arrow" w="sm" len="sm"/>
+            <a:tailEnd type="arrow" w="sm" len="sm"/>
+          </a:ln>
+        </p:spPr>
+        <p:style>
+          <a:lnRef idx="1">
+            <a:schemeClr val="accent1"/>
+          </a:lnRef>
+          <a:fillRef idx="0">
+            <a:schemeClr val="accent1"/>
+          </a:fillRef>
+          <a:effectRef idx="0">
+            <a:schemeClr val="accent1"/>
+          </a:effectRef>
+          <a:fontRef idx="minor">
+            <a:schemeClr val="tx1"/>
+          </a:fontRef>
+        </p:style>
+      </p:cxnSp>
+      <p:sp>
+        <p:nvSpPr>
+          <p:cNvPr id="19" name="TextBox 18"/>
+          <p:cNvSpPr txBox="1"/>
+          <p:nvPr/>
+        </p:nvSpPr>
+        <p:spPr>
+          <a:xfrm>
+            <a:off x="1117071" y="1589614"/>
+            <a:ext cx="736099" cy="307777"/>
+          </a:xfrm>
+          <a:prstGeom prst="rect">
+            <a:avLst/>
+          </a:prstGeom>
+          <a:noFill/>
+        </p:spPr>
+        <p:txBody>
+          <a:bodyPr wrap="none" rtlCol="0">
+            <a:spAutoFit/>
+          </a:bodyPr>
+          <a:lstStyle/>
+          <a:p>
+            <a:r>
+              <a:rPr lang="en-AU" sz="1400" dirty="0" smtClean="0">
+                <a:solidFill>
+                  <a:schemeClr val="tx2"/>
+                </a:solidFill>
+              </a:rPr>
+              <a:t>200 nm</a:t>
+            </a:r>
+            <a:endParaRPr lang="en-AU" sz="1400" dirty="0">
+              <a:solidFill>
+                <a:schemeClr val="tx2"/>
+              </a:solidFill>
+            </a:endParaRPr>
+          </a:p>
+        </p:txBody>
+      </p:sp>
+      <p:sp>
+        <p:nvSpPr>
+          <p:cNvPr id="20" name="TextBox 19"/>
+          <p:cNvSpPr txBox="1"/>
+          <p:nvPr/>
+        </p:nvSpPr>
+        <p:spPr>
+          <a:xfrm>
+            <a:off x="1266215" y="1230522"/>
+            <a:ext cx="736099" cy="307777"/>
+          </a:xfrm>
+          <a:prstGeom prst="rect">
+            <a:avLst/>
+          </a:prstGeom>
+          <a:noFill/>
+        </p:spPr>
+        <p:txBody>
+          <a:bodyPr wrap="none" rtlCol="0">
+            <a:spAutoFit/>
+          </a:bodyPr>
+          <a:lstStyle/>
+          <a:p>
+            <a:r>
+              <a:rPr lang="en-AU" sz="1400" dirty="0">
+                <a:solidFill>
+                  <a:schemeClr val="tx2"/>
+                </a:solidFill>
+              </a:rPr>
+              <a:t>1</a:t>
+            </a:r>
+            <a:r>
+              <a:rPr lang="en-AU" sz="1400" dirty="0" smtClean="0">
+                <a:solidFill>
+                  <a:schemeClr val="tx2"/>
+                </a:solidFill>
+              </a:rPr>
+              <a:t>00 nm</a:t>
+            </a:r>
+            <a:endParaRPr lang="en-AU" sz="1400" dirty="0">
+              <a:solidFill>
+                <a:schemeClr val="tx2"/>
+              </a:solidFill>
+            </a:endParaRPr>
+          </a:p>
+        </p:txBody>
+      </p:sp>
+      <p:sp>
+        <p:nvSpPr>
+          <p:cNvPr id="24" name="Right Arrow 23"/>
+          <p:cNvSpPr/>
+          <p:nvPr/>
+        </p:nvSpPr>
+        <p:spPr>
+          <a:xfrm>
+            <a:off x="1926332" y="792530"/>
+            <a:ext cx="2217093" cy="437992"/>
+          </a:xfrm>
+          <a:prstGeom prst="rightArrow">
+            <a:avLst/>
+          </a:prstGeom>
+        </p:spPr>
+        <p:style>
+          <a:lnRef idx="1">
+            <a:schemeClr val="accent3"/>
+          </a:lnRef>
+          <a:fillRef idx="2">
+            <a:schemeClr val="accent3"/>
+          </a:fillRef>
+          <a:effectRef idx="1">
+            <a:schemeClr val="accent3"/>
+          </a:effectRef>
+          <a:fontRef idx="minor">
+            <a:schemeClr val="dk1"/>
+          </a:fontRef>
+        </p:style>
+        <p:txBody>
+          <a:bodyPr rtlCol="0" anchor="ctr"/>
+          <a:lstStyle/>
+          <a:p>
+            <a:pPr algn="ctr"/>
+            <a:r>
+              <a:rPr lang="en-AU" sz="1400" dirty="0" smtClean="0"/>
+              <a:t>Line DF: 0.6…4.4  (0.2)</a:t>
+            </a:r>
+            <a:endParaRPr lang="en-AU" sz="1400" dirty="0"/>
+          </a:p>
+        </p:txBody>
+      </p:sp>
+      <p:sp>
+        <p:nvSpPr>
+          <p:cNvPr id="25" name="Down Arrow 24"/>
+          <p:cNvSpPr/>
+          <p:nvPr/>
+        </p:nvSpPr>
+        <p:spPr>
+          <a:xfrm>
+            <a:off x="703734" y="1897390"/>
+            <a:ext cx="535732" cy="3547833"/>
+          </a:xfrm>
+          <a:prstGeom prst="downArrow">
+            <a:avLst/>
+          </a:prstGeom>
+        </p:spPr>
+        <p:style>
+          <a:lnRef idx="1">
+            <a:schemeClr val="accent3"/>
+          </a:lnRef>
+          <a:fillRef idx="2">
+            <a:schemeClr val="accent3"/>
+          </a:fillRef>
+          <a:effectRef idx="1">
+            <a:schemeClr val="accent3"/>
+          </a:effectRef>
+          <a:fontRef idx="minor">
+            <a:schemeClr val="dk1"/>
+          </a:fontRef>
+        </p:style>
+        <p:txBody>
+          <a:bodyPr vert="vert270" rtlCol="0" anchor="ctr"/>
+          <a:lstStyle/>
+          <a:p>
+            <a:pPr algn="ctr"/>
+            <a:r>
+              <a:rPr lang="en-AU" sz="1400" dirty="0" smtClean="0"/>
+              <a:t>Line DF: 4.4… 0.6 (0.2)</a:t>
+            </a:r>
+            <a:endParaRPr lang="en-AU" sz="1400" dirty="0"/>
+          </a:p>
+        </p:txBody>
+      </p:sp>
+      <p:sp>
+        <p:nvSpPr>
+          <p:cNvPr id="23" name="TextBox 22"/>
+          <p:cNvSpPr txBox="1"/>
+          <p:nvPr/>
+        </p:nvSpPr>
+        <p:spPr>
+          <a:xfrm>
+            <a:off x="6395824" y="548680"/>
+            <a:ext cx="795411" cy="369332"/>
+          </a:xfrm>
+          <a:prstGeom prst="rect">
+            <a:avLst/>
+          </a:prstGeom>
+          <a:noFill/>
+        </p:spPr>
+        <p:txBody>
+          <a:bodyPr wrap="none" rtlCol="0">
+            <a:spAutoFit/>
+          </a:bodyPr>
+          <a:lstStyle/>
+          <a:p>
+            <a:r>
               <a:rPr lang="en-AU" dirty="0" smtClean="0"/>
-              <a:t>Area DF: 6</a:t>
+              <a:t>design</a:t>
             </a:r>
             <a:endParaRPr lang="en-AU" dirty="0"/>
           </a:p>
@@ -7019,7 +7499,7 @@
     </p:spTree>
     <p:extLst>
       <p:ext uri="{BB962C8B-B14F-4D97-AF65-F5344CB8AC3E}">
-        <p14:creationId xmlns:p14="http://schemas.microsoft.com/office/powerpoint/2010/main" val="3168065169"/>
+        <p14:creationId xmlns:p14="http://schemas.microsoft.com/office/powerpoint/2010/main" val="1212997145"/>
       </p:ext>
     </p:extLst>
   </p:cSld>
@@ -7048,6 +7528,158 @@
       </p:grpSpPr>
       <p:pic>
         <p:nvPicPr>
+          <p:cNvPr id="6146" name="Picture 2"/>
+          <p:cNvPicPr>
+            <a:picLocks noChangeAspect="1" noChangeArrowheads="1"/>
+          </p:cNvPicPr>
+          <p:nvPr/>
+        </p:nvPicPr>
+        <p:blipFill rotWithShape="1">
+          <a:blip r:embed="rId2">
+            <a:extLst>
+              <a:ext uri="{28A0092B-C50C-407E-A947-70E740481C1C}">
+                <a14:useLocalDpi xmlns:a14="http://schemas.microsoft.com/office/drawing/2010/main" val="0"/>
+              </a:ext>
+            </a:extLst>
+          </a:blip>
+          <a:srcRect l="12538" t="32318" r="58706" b="42209"/>
+          <a:stretch/>
+        </p:blipFill>
+        <p:spPr bwMode="auto">
+          <a:xfrm>
+            <a:off x="1719618" y="2770496"/>
+            <a:ext cx="3944203" cy="2183641"/>
+          </a:xfrm>
+          <a:prstGeom prst="rect">
+            <a:avLst/>
+          </a:prstGeom>
+          <a:noFill/>
+          <a:ln>
+            <a:noFill/>
+          </a:ln>
+          <a:effectLst/>
+          <a:extLst>
+            <a:ext uri="{909E8E84-426E-40dd-AFC4-6F175D3DCCD1}">
+              <a14:hiddenFill xmlns:a14="http://schemas.microsoft.com/office/drawing/2010/main">
+                <a:solidFill>
+                  <a:schemeClr val="accent1"/>
+                </a:solidFill>
+              </a14:hiddenFill>
+            </a:ext>
+            <a:ext uri="{91240B29-F687-4f45-9708-019B960494DF}">
+              <a14:hiddenLine xmlns:a14="http://schemas.microsoft.com/office/drawing/2010/main" w="9525">
+                <a:solidFill>
+                  <a:schemeClr val="tx1"/>
+                </a:solidFill>
+                <a:miter lim="800000"/>
+                <a:headEnd/>
+                <a:tailEnd/>
+              </a14:hiddenLine>
+            </a:ext>
+            <a:ext uri="{AF507438-7753-43e0-B8FC-AC1667EBCBE1}">
+              <a14:hiddenEffects xmlns:a14="http://schemas.microsoft.com/office/drawing/2010/main">
+                <a:effectLst>
+                  <a:outerShdw dist="35921" dir="2700000" algn="ctr" rotWithShape="0">
+                    <a:schemeClr val="bg2"/>
+                  </a:outerShdw>
+                </a:effectLst>
+              </a14:hiddenEffects>
+            </a:ext>
+          </a:extLst>
+        </p:spPr>
+      </p:pic>
+      <p:sp>
+        <p:nvSpPr>
+          <p:cNvPr id="4" name="TextBox 3"/>
+          <p:cNvSpPr txBox="1"/>
+          <p:nvPr/>
+        </p:nvSpPr>
+        <p:spPr>
+          <a:xfrm>
+            <a:off x="5436096" y="476672"/>
+            <a:ext cx="500650" cy="369332"/>
+          </a:xfrm>
+          <a:prstGeom prst="rect">
+            <a:avLst/>
+          </a:prstGeom>
+          <a:noFill/>
+        </p:spPr>
+        <p:txBody>
+          <a:bodyPr wrap="none" rtlCol="0">
+            <a:spAutoFit/>
+          </a:bodyPr>
+          <a:lstStyle/>
+          <a:p>
+            <a:r>
+              <a:rPr lang="en-AU" dirty="0" smtClean="0"/>
+              <a:t>Fall</a:t>
+            </a:r>
+            <a:endParaRPr lang="en-AU" dirty="0"/>
+          </a:p>
+        </p:txBody>
+      </p:sp>
+      <p:sp>
+        <p:nvSpPr>
+          <p:cNvPr id="5" name="TextBox 4"/>
+          <p:cNvSpPr txBox="1"/>
+          <p:nvPr/>
+        </p:nvSpPr>
+        <p:spPr>
+          <a:xfrm>
+            <a:off x="3491880" y="2401164"/>
+            <a:ext cx="1154675" cy="369332"/>
+          </a:xfrm>
+          <a:prstGeom prst="rect">
+            <a:avLst/>
+          </a:prstGeom>
+          <a:noFill/>
+        </p:spPr>
+        <p:txBody>
+          <a:bodyPr wrap="none" rtlCol="0">
+            <a:spAutoFit/>
+          </a:bodyPr>
+          <a:lstStyle/>
+          <a:p>
+            <a:r>
+              <a:rPr lang="en-AU" dirty="0" smtClean="0"/>
+              <a:t>Area DF: 6</a:t>
+            </a:r>
+            <a:endParaRPr lang="en-AU" dirty="0"/>
+          </a:p>
+        </p:txBody>
+      </p:sp>
+    </p:spTree>
+    <p:extLst>
+      <p:ext uri="{BB962C8B-B14F-4D97-AF65-F5344CB8AC3E}">
+        <p14:creationId xmlns:p14="http://schemas.microsoft.com/office/powerpoint/2010/main" val="3168065169"/>
+      </p:ext>
+    </p:extLst>
+  </p:cSld>
+  <p:clrMapOvr>
+    <a:masterClrMapping/>
+  </p:clrMapOvr>
+</p:sld>
+</file>
+
+<file path=ppt/slides/slide8.xml><?xml version="1.0" encoding="utf-8"?>
+<p:sld xmlns:a="http://schemas.openxmlformats.org/drawingml/2006/main" xmlns:r="http://schemas.openxmlformats.org/officeDocument/2006/relationships" xmlns:p="http://schemas.openxmlformats.org/presentationml/2006/main">
+  <p:cSld>
+    <p:spTree>
+      <p:nvGrpSpPr>
+        <p:cNvPr id="1" name=""/>
+        <p:cNvGrpSpPr/>
+        <p:nvPr/>
+      </p:nvGrpSpPr>
+      <p:grpSpPr>
+        <a:xfrm>
+          <a:off x="0" y="0"/>
+          <a:ext cx="0" cy="0"/>
+          <a:chOff x="0" y="0"/>
+          <a:chExt cx="0" cy="0"/>
+        </a:xfrm>
+      </p:grpSpPr>
+      <p:pic>
+        <p:nvPicPr>
           <p:cNvPr id="7170" name="Picture 2"/>
           <p:cNvPicPr>
             <a:picLocks noChangeAspect="1" noChangeArrowheads="1"/>
@@ -7079,14 +7711,14 @@
           </a:ln>
           <a:effectLst/>
           <a:extLst>
-            <a:ext uri="{909E8E84-426E-40DD-AFC4-6F175D3DCCD1}">
+            <a:ext uri="{909E8E84-426E-40dd-AFC4-6F175D3DCCD1}">
               <a14:hiddenFill xmlns:a14="http://schemas.microsoft.com/office/drawing/2010/main">
                 <a:solidFill>
                   <a:schemeClr val="accent1"/>
                 </a:solidFill>
               </a14:hiddenFill>
             </a:ext>
-            <a:ext uri="{91240B29-F687-4F45-9708-019B960494DF}">
+            <a:ext uri="{91240B29-F687-4f45-9708-019B960494DF}">
               <a14:hiddenLine xmlns:a14="http://schemas.microsoft.com/office/drawing/2010/main" w="9525">
                 <a:solidFill>
                   <a:schemeClr val="tx1"/>
@@ -7096,7 +7728,7 @@
                 <a:tailEnd/>
               </a14:hiddenLine>
             </a:ext>
-            <a:ext uri="{AF507438-7753-43E0-B8FC-AC1667EBCBE1}">
+            <a:ext uri="{AF507438-7753-43e0-B8FC-AC1667EBCBE1}">
               <a14:hiddenEffects xmlns:a14="http://schemas.microsoft.com/office/drawing/2010/main">
                 <a:effectLst>
                   <a:outerShdw dist="35921" dir="2700000" algn="ctr" rotWithShape="0">
@@ -7622,7 +8254,7 @@
 </p:sld>
 </file>
 
-<file path=ppt/slides/slide8.xml><?xml version="1.0" encoding="utf-8"?>
+<file path=ppt/slides/slide9.xml><?xml version="1.0" encoding="utf-8"?>
 <p:sld xmlns:a="http://schemas.openxmlformats.org/drawingml/2006/main" xmlns:r="http://schemas.openxmlformats.org/officeDocument/2006/relationships" xmlns:p="http://schemas.openxmlformats.org/presentationml/2006/main">
   <p:cSld>
     <p:spTree>
@@ -7672,14 +8304,14 @@
           </a:ln>
           <a:effectLst/>
           <a:extLst>
-            <a:ext uri="{909E8E84-426E-40DD-AFC4-6F175D3DCCD1}">
+            <a:ext uri="{909E8E84-426E-40dd-AFC4-6F175D3DCCD1}">
               <a14:hiddenFill xmlns:a14="http://schemas.microsoft.com/office/drawing/2010/main">
                 <a:solidFill>
                   <a:schemeClr val="accent1"/>
                 </a:solidFill>
               </a14:hiddenFill>
             </a:ext>
-            <a:ext uri="{91240B29-F687-4F45-9708-019B960494DF}">
+            <a:ext uri="{91240B29-F687-4f45-9708-019B960494DF}">
               <a14:hiddenLine xmlns:a14="http://schemas.microsoft.com/office/drawing/2010/main" w="9525">
                 <a:solidFill>
                   <a:schemeClr val="tx1"/>
@@ -7689,7 +8321,7 @@
                 <a:tailEnd/>
               </a14:hiddenLine>
             </a:ext>
-            <a:ext uri="{AF507438-7753-43E0-B8FC-AC1667EBCBE1}">
+            <a:ext uri="{AF507438-7753-43e0-B8FC-AC1667EBCBE1}">
               <a14:hiddenEffects xmlns:a14="http://schemas.microsoft.com/office/drawing/2010/main">
                 <a:effectLst>
                   <a:outerShdw dist="35921" dir="2700000" algn="ctr" rotWithShape="0">

</xml_diff>

<commit_message>
Revert "Ajout de multiple falls et modify excel"
This reverts commit 5cee282d5942fa7478af26c6dbd5085b18218cbc.
</commit_message>
<xml_diff>
--- a/Design/designs.pptx
+++ b/Design/designs.pptx
@@ -8,12 +8,11 @@
     <p:sldId id="256" r:id="rId2"/>
     <p:sldId id="257" r:id="rId3"/>
     <p:sldId id="258" r:id="rId4"/>
-    <p:sldId id="264" r:id="rId5"/>
-    <p:sldId id="259" r:id="rId6"/>
-    <p:sldId id="260" r:id="rId7"/>
-    <p:sldId id="261" r:id="rId8"/>
-    <p:sldId id="262" r:id="rId9"/>
-    <p:sldId id="263" r:id="rId10"/>
+    <p:sldId id="259" r:id="rId5"/>
+    <p:sldId id="260" r:id="rId6"/>
+    <p:sldId id="261" r:id="rId7"/>
+    <p:sldId id="262" r:id="rId8"/>
+    <p:sldId id="263" r:id="rId9"/>
   </p:sldIdLst>
   <p:sldSz cx="9144000" cy="6858000" type="screen4x3"/>
   <p:notesSz cx="6858000" cy="9144000"/>
@@ -296,7 +295,7 @@
           <a:p>
             <a:fld id="{413F1F3B-E996-4BC2-9DDB-E8032D8CD442}" type="datetimeFigureOut">
               <a:rPr lang="en-AU" smtClean="0"/>
-              <a:t>04/07/16</a:t>
+              <a:t>4/07/2016</a:t>
             </a:fld>
             <a:endParaRPr lang="en-AU"/>
           </a:p>
@@ -338,7 +337,7 @@
           <a:p>
             <a:fld id="{65ECEF50-5677-4203-A235-5BEB76343BDA}" type="slidenum">
               <a:rPr lang="en-AU" smtClean="0"/>
-              <a:t>‹#›</a:t>
+              <a:t>‹N°›</a:t>
             </a:fld>
             <a:endParaRPr lang="en-AU"/>
           </a:p>
@@ -466,7 +465,7 @@
           <a:p>
             <a:fld id="{413F1F3B-E996-4BC2-9DDB-E8032D8CD442}" type="datetimeFigureOut">
               <a:rPr lang="en-AU" smtClean="0"/>
-              <a:t>04/07/16</a:t>
+              <a:t>4/07/2016</a:t>
             </a:fld>
             <a:endParaRPr lang="en-AU"/>
           </a:p>
@@ -508,7 +507,7 @@
           <a:p>
             <a:fld id="{65ECEF50-5677-4203-A235-5BEB76343BDA}" type="slidenum">
               <a:rPr lang="en-AU" smtClean="0"/>
-              <a:t>‹#›</a:t>
+              <a:t>‹N°›</a:t>
             </a:fld>
             <a:endParaRPr lang="en-AU"/>
           </a:p>
@@ -646,7 +645,7 @@
           <a:p>
             <a:fld id="{413F1F3B-E996-4BC2-9DDB-E8032D8CD442}" type="datetimeFigureOut">
               <a:rPr lang="en-AU" smtClean="0"/>
-              <a:t>04/07/16</a:t>
+              <a:t>4/07/2016</a:t>
             </a:fld>
             <a:endParaRPr lang="en-AU"/>
           </a:p>
@@ -688,7 +687,7 @@
           <a:p>
             <a:fld id="{65ECEF50-5677-4203-A235-5BEB76343BDA}" type="slidenum">
               <a:rPr lang="en-AU" smtClean="0"/>
-              <a:t>‹#›</a:t>
+              <a:t>‹N°›</a:t>
             </a:fld>
             <a:endParaRPr lang="en-AU"/>
           </a:p>
@@ -816,7 +815,7 @@
           <a:p>
             <a:fld id="{413F1F3B-E996-4BC2-9DDB-E8032D8CD442}" type="datetimeFigureOut">
               <a:rPr lang="en-AU" smtClean="0"/>
-              <a:t>04/07/16</a:t>
+              <a:t>4/07/2016</a:t>
             </a:fld>
             <a:endParaRPr lang="en-AU"/>
           </a:p>
@@ -858,7 +857,7 @@
           <a:p>
             <a:fld id="{65ECEF50-5677-4203-A235-5BEB76343BDA}" type="slidenum">
               <a:rPr lang="en-AU" smtClean="0"/>
-              <a:t>‹#›</a:t>
+              <a:t>‹N°›</a:t>
             </a:fld>
             <a:endParaRPr lang="en-AU"/>
           </a:p>
@@ -1062,7 +1061,7 @@
           <a:p>
             <a:fld id="{413F1F3B-E996-4BC2-9DDB-E8032D8CD442}" type="datetimeFigureOut">
               <a:rPr lang="en-AU" smtClean="0"/>
-              <a:t>04/07/16</a:t>
+              <a:t>4/07/2016</a:t>
             </a:fld>
             <a:endParaRPr lang="en-AU"/>
           </a:p>
@@ -1104,7 +1103,7 @@
           <a:p>
             <a:fld id="{65ECEF50-5677-4203-A235-5BEB76343BDA}" type="slidenum">
               <a:rPr lang="en-AU" smtClean="0"/>
-              <a:t>‹#›</a:t>
+              <a:t>‹N°›</a:t>
             </a:fld>
             <a:endParaRPr lang="en-AU"/>
           </a:p>
@@ -1350,7 +1349,7 @@
           <a:p>
             <a:fld id="{413F1F3B-E996-4BC2-9DDB-E8032D8CD442}" type="datetimeFigureOut">
               <a:rPr lang="en-AU" smtClean="0"/>
-              <a:t>04/07/16</a:t>
+              <a:t>4/07/2016</a:t>
             </a:fld>
             <a:endParaRPr lang="en-AU"/>
           </a:p>
@@ -1392,7 +1391,7 @@
           <a:p>
             <a:fld id="{65ECEF50-5677-4203-A235-5BEB76343BDA}" type="slidenum">
               <a:rPr lang="en-AU" smtClean="0"/>
-              <a:t>‹#›</a:t>
+              <a:t>‹N°›</a:t>
             </a:fld>
             <a:endParaRPr lang="en-AU"/>
           </a:p>
@@ -1772,7 +1771,7 @@
           <a:p>
             <a:fld id="{413F1F3B-E996-4BC2-9DDB-E8032D8CD442}" type="datetimeFigureOut">
               <a:rPr lang="en-AU" smtClean="0"/>
-              <a:t>04/07/16</a:t>
+              <a:t>4/07/2016</a:t>
             </a:fld>
             <a:endParaRPr lang="en-AU"/>
           </a:p>
@@ -1814,7 +1813,7 @@
           <a:p>
             <a:fld id="{65ECEF50-5677-4203-A235-5BEB76343BDA}" type="slidenum">
               <a:rPr lang="en-AU" smtClean="0"/>
-              <a:t>‹#›</a:t>
+              <a:t>‹N°›</a:t>
             </a:fld>
             <a:endParaRPr lang="en-AU"/>
           </a:p>
@@ -1890,7 +1889,7 @@
           <a:p>
             <a:fld id="{413F1F3B-E996-4BC2-9DDB-E8032D8CD442}" type="datetimeFigureOut">
               <a:rPr lang="en-AU" smtClean="0"/>
-              <a:t>04/07/16</a:t>
+              <a:t>4/07/2016</a:t>
             </a:fld>
             <a:endParaRPr lang="en-AU"/>
           </a:p>
@@ -1932,7 +1931,7 @@
           <a:p>
             <a:fld id="{65ECEF50-5677-4203-A235-5BEB76343BDA}" type="slidenum">
               <a:rPr lang="en-AU" smtClean="0"/>
-              <a:t>‹#›</a:t>
+              <a:t>‹N°›</a:t>
             </a:fld>
             <a:endParaRPr lang="en-AU"/>
           </a:p>
@@ -1985,7 +1984,7 @@
           <a:p>
             <a:fld id="{413F1F3B-E996-4BC2-9DDB-E8032D8CD442}" type="datetimeFigureOut">
               <a:rPr lang="en-AU" smtClean="0"/>
-              <a:t>04/07/16</a:t>
+              <a:t>4/07/2016</a:t>
             </a:fld>
             <a:endParaRPr lang="en-AU"/>
           </a:p>
@@ -2027,7 +2026,7 @@
           <a:p>
             <a:fld id="{65ECEF50-5677-4203-A235-5BEB76343BDA}" type="slidenum">
               <a:rPr lang="en-AU" smtClean="0"/>
-              <a:t>‹#›</a:t>
+              <a:t>‹N°›</a:t>
             </a:fld>
             <a:endParaRPr lang="en-AU"/>
           </a:p>
@@ -2262,7 +2261,7 @@
           <a:p>
             <a:fld id="{413F1F3B-E996-4BC2-9DDB-E8032D8CD442}" type="datetimeFigureOut">
               <a:rPr lang="en-AU" smtClean="0"/>
-              <a:t>04/07/16</a:t>
+              <a:t>4/07/2016</a:t>
             </a:fld>
             <a:endParaRPr lang="en-AU"/>
           </a:p>
@@ -2304,7 +2303,7 @@
           <a:p>
             <a:fld id="{65ECEF50-5677-4203-A235-5BEB76343BDA}" type="slidenum">
               <a:rPr lang="en-AU" smtClean="0"/>
-              <a:t>‹#›</a:t>
+              <a:t>‹N°›</a:t>
             </a:fld>
             <a:endParaRPr lang="en-AU"/>
           </a:p>
@@ -2515,7 +2514,7 @@
           <a:p>
             <a:fld id="{413F1F3B-E996-4BC2-9DDB-E8032D8CD442}" type="datetimeFigureOut">
               <a:rPr lang="en-AU" smtClean="0"/>
-              <a:t>04/07/16</a:t>
+              <a:t>4/07/2016</a:t>
             </a:fld>
             <a:endParaRPr lang="en-AU"/>
           </a:p>
@@ -2557,7 +2556,7 @@
           <a:p>
             <a:fld id="{65ECEF50-5677-4203-A235-5BEB76343BDA}" type="slidenum">
               <a:rPr lang="en-AU" smtClean="0"/>
-              <a:t>‹#›</a:t>
+              <a:t>‹N°›</a:t>
             </a:fld>
             <a:endParaRPr lang="en-AU"/>
           </a:p>
@@ -2728,7 +2727,7 @@
           <a:p>
             <a:fld id="{413F1F3B-E996-4BC2-9DDB-E8032D8CD442}" type="datetimeFigureOut">
               <a:rPr lang="en-AU" smtClean="0"/>
-              <a:t>04/07/16</a:t>
+              <a:t>4/07/2016</a:t>
             </a:fld>
             <a:endParaRPr lang="en-AU"/>
           </a:p>
@@ -2806,7 +2805,7 @@
           <a:p>
             <a:fld id="{65ECEF50-5677-4203-A235-5BEB76343BDA}" type="slidenum">
               <a:rPr lang="en-AU" smtClean="0"/>
-              <a:t>‹#›</a:t>
+              <a:t>‹N°›</a:t>
             </a:fld>
             <a:endParaRPr lang="en-AU"/>
           </a:p>
@@ -3136,14 +3135,14 @@
           </a:ln>
           <a:effectLst/>
           <a:extLst>
-            <a:ext uri="{909E8E84-426E-40dd-AFC4-6F175D3DCCD1}">
+            <a:ext uri="{909E8E84-426E-40DD-AFC4-6F175D3DCCD1}">
               <a14:hiddenFill xmlns:a14="http://schemas.microsoft.com/office/drawing/2010/main">
                 <a:solidFill>
                   <a:schemeClr val="accent1"/>
                 </a:solidFill>
               </a14:hiddenFill>
             </a:ext>
-            <a:ext uri="{91240B29-F687-4f45-9708-019B960494DF}">
+            <a:ext uri="{91240B29-F687-4F45-9708-019B960494DF}">
               <a14:hiddenLine xmlns:a14="http://schemas.microsoft.com/office/drawing/2010/main" w="9525">
                 <a:solidFill>
                   <a:schemeClr val="tx1"/>
@@ -3153,7 +3152,7 @@
                 <a:tailEnd/>
               </a14:hiddenLine>
             </a:ext>
-            <a:ext uri="{AF507438-7753-43e0-B8FC-AC1667EBCBE1}">
+            <a:ext uri="{AF507438-7753-43E0-B8FC-AC1667EBCBE1}">
               <a14:hiddenEffects xmlns:a14="http://schemas.microsoft.com/office/drawing/2010/main">
                 <a:effectLst>
                   <a:outerShdw dist="35921" dir="2700000" algn="ctr" rotWithShape="0">
@@ -3818,14 +3817,14 @@
           </a:ln>
           <a:effectLst/>
           <a:extLst>
-            <a:ext uri="{909E8E84-426E-40dd-AFC4-6F175D3DCCD1}">
+            <a:ext uri="{909E8E84-426E-40DD-AFC4-6F175D3DCCD1}">
               <a14:hiddenFill xmlns:a14="http://schemas.microsoft.com/office/drawing/2010/main">
                 <a:solidFill>
                   <a:schemeClr val="accent1"/>
                 </a:solidFill>
               </a14:hiddenFill>
             </a:ext>
-            <a:ext uri="{91240B29-F687-4f45-9708-019B960494DF}">
+            <a:ext uri="{91240B29-F687-4F45-9708-019B960494DF}">
               <a14:hiddenLine xmlns:a14="http://schemas.microsoft.com/office/drawing/2010/main" w="9525">
                 <a:solidFill>
                   <a:schemeClr val="tx1"/>
@@ -3835,7 +3834,7 @@
                 <a:tailEnd/>
               </a14:hiddenLine>
             </a:ext>
-            <a:ext uri="{AF507438-7753-43e0-B8FC-AC1667EBCBE1}">
+            <a:ext uri="{AF507438-7753-43E0-B8FC-AC1667EBCBE1}">
               <a14:hiddenEffects xmlns:a14="http://schemas.microsoft.com/office/drawing/2010/main">
                 <a:effectLst>
                   <a:outerShdw dist="35921" dir="2700000" algn="ctr" rotWithShape="0">
@@ -4583,14 +4582,14 @@
           </a:ln>
           <a:effectLst/>
           <a:extLst>
-            <a:ext uri="{909E8E84-426E-40dd-AFC4-6F175D3DCCD1}">
+            <a:ext uri="{909E8E84-426E-40DD-AFC4-6F175D3DCCD1}">
               <a14:hiddenFill xmlns:a14="http://schemas.microsoft.com/office/drawing/2010/main">
                 <a:solidFill>
                   <a:schemeClr val="accent1"/>
                 </a:solidFill>
               </a14:hiddenFill>
             </a:ext>
-            <a:ext uri="{91240B29-F687-4f45-9708-019B960494DF}">
+            <a:ext uri="{91240B29-F687-4F45-9708-019B960494DF}">
               <a14:hiddenLine xmlns:a14="http://schemas.microsoft.com/office/drawing/2010/main" w="9525">
                 <a:solidFill>
                   <a:schemeClr val="tx1"/>
@@ -4600,7 +4599,7 @@
                 <a:tailEnd/>
               </a14:hiddenLine>
             </a:ext>
-            <a:ext uri="{AF507438-7753-43e0-B8FC-AC1667EBCBE1}">
+            <a:ext uri="{AF507438-7753-43E0-B8FC-AC1667EBCBE1}">
               <a14:hiddenEffects xmlns:a14="http://schemas.microsoft.com/office/drawing/2010/main">
                 <a:effectLst>
                   <a:outerShdw dist="35921" dir="2700000" algn="ctr" rotWithShape="0">
@@ -5343,13 +5342,13 @@
               </a:ext>
             </a:extLst>
           </a:blip>
-          <a:srcRect l="1494" t="52369" r="57885" b="13931"/>
+          <a:srcRect l="1494" t="22805" r="51035" b="13931"/>
           <a:stretch/>
         </p:blipFill>
         <p:spPr bwMode="auto">
           <a:xfrm>
-            <a:off x="1187624" y="1484784"/>
-            <a:ext cx="5571598" cy="2888947"/>
+            <a:off x="1115616" y="908720"/>
+            <a:ext cx="6511158" cy="5423338"/>
           </a:xfrm>
           <a:prstGeom prst="rect">
             <a:avLst/>
@@ -5360,14 +5359,14 @@
           </a:ln>
           <a:effectLst/>
           <a:extLst>
-            <a:ext uri="{909E8E84-426E-40dd-AFC4-6F175D3DCCD1}">
+            <a:ext uri="{909E8E84-426E-40DD-AFC4-6F175D3DCCD1}">
               <a14:hiddenFill xmlns:a14="http://schemas.microsoft.com/office/drawing/2010/main">
                 <a:solidFill>
                   <a:schemeClr val="accent1"/>
                 </a:solidFill>
               </a14:hiddenFill>
             </a:ext>
-            <a:ext uri="{91240B29-F687-4f45-9708-019B960494DF}">
+            <a:ext uri="{91240B29-F687-4F45-9708-019B960494DF}">
               <a14:hiddenLine xmlns:a14="http://schemas.microsoft.com/office/drawing/2010/main" w="9525">
                 <a:solidFill>
                   <a:schemeClr val="tx1"/>
@@ -5377,7 +5376,7 @@
                 <a:tailEnd/>
               </a14:hiddenLine>
             </a:ext>
-            <a:ext uri="{AF507438-7753-43e0-B8FC-AC1667EBCBE1}">
+            <a:ext uri="{AF507438-7753-43E0-B8FC-AC1667EBCBE1}">
               <a14:hiddenEffects xmlns:a14="http://schemas.microsoft.com/office/drawing/2010/main">
                 <a:effectLst>
                   <a:outerShdw dist="35921" dir="2700000" algn="ctr" rotWithShape="0">
@@ -5391,13 +5390,13 @@
       </p:pic>
       <p:sp>
         <p:nvSpPr>
-          <p:cNvPr id="13" name="TextBox 12"/>
+          <p:cNvPr id="5" name="TextBox 4"/>
           <p:cNvSpPr txBox="1"/>
           <p:nvPr/>
         </p:nvSpPr>
         <p:spPr>
           <a:xfrm>
-            <a:off x="251520" y="1477397"/>
+            <a:off x="214568" y="692696"/>
             <a:ext cx="3877985" cy="369332"/>
           </a:xfrm>
           <a:prstGeom prst="rect">
@@ -5419,27 +5418,7 @@
                   </a:schemeClr>
                 </a:solidFill>
               </a:rPr>
-              <a:t>Dots/Line DF:       </a:t>
-            </a:r>
-            <a:r>
-              <a:rPr lang="en-AU" dirty="0" smtClean="0">
-                <a:solidFill>
-                  <a:schemeClr val="accent3">
-                    <a:lumMod val="50000"/>
-                  </a:schemeClr>
-                </a:solidFill>
-              </a:rPr>
-              <a:t>1</a:t>
-            </a:r>
-            <a:r>
-              <a:rPr lang="en-AU" dirty="0" smtClean="0">
-                <a:solidFill>
-                  <a:schemeClr val="accent3">
-                    <a:lumMod val="50000"/>
-                  </a:schemeClr>
-                </a:solidFill>
-              </a:rPr>
-              <a:t>			</a:t>
+              <a:t>Dots/Line DF:     0.1			</a:t>
             </a:r>
             <a:endParaRPr lang="en-AU" dirty="0">
               <a:solidFill>
@@ -5453,14 +5432,14 @@
       </p:sp>
       <p:sp>
         <p:nvSpPr>
-          <p:cNvPr id="14" name="TextBox 13"/>
+          <p:cNvPr id="7" name="TextBox 6"/>
           <p:cNvSpPr txBox="1"/>
           <p:nvPr/>
         </p:nvSpPr>
         <p:spPr>
           <a:xfrm>
-            <a:off x="2880760" y="1477397"/>
-            <a:ext cx="528435" cy="369332"/>
+            <a:off x="2843808" y="692696"/>
+            <a:ext cx="476412" cy="369332"/>
           </a:xfrm>
           <a:prstGeom prst="rect">
             <a:avLst/>
@@ -5474,24 +5453,14 @@
           <a:lstStyle/>
           <a:p>
             <a:r>
-              <a:rPr lang="en-AU" dirty="0">
+              <a:rPr lang="en-AU" dirty="0" smtClean="0">
                 <a:solidFill>
                   <a:schemeClr val="accent3">
                     <a:lumMod val="50000"/>
                   </a:schemeClr>
                 </a:solidFill>
               </a:rPr>
-              <a:t> </a:t>
-            </a:r>
-            <a:r>
-              <a:rPr lang="en-AU" dirty="0" smtClean="0">
-                <a:solidFill>
-                  <a:schemeClr val="accent3">
-                    <a:lumMod val="50000"/>
-                  </a:schemeClr>
-                </a:solidFill>
-              </a:rPr>
-              <a:t>1,2</a:t>
+              <a:t>0.2</a:t>
             </a:r>
             <a:endParaRPr lang="en-AU" dirty="0">
               <a:solidFill>
@@ -5505,14 +5474,14 @@
       </p:sp>
       <p:sp>
         <p:nvSpPr>
-          <p:cNvPr id="15" name="TextBox 14"/>
+          <p:cNvPr id="8" name="TextBox 7"/>
           <p:cNvSpPr txBox="1"/>
           <p:nvPr/>
         </p:nvSpPr>
         <p:spPr>
           <a:xfrm>
-            <a:off x="3891299" y="1477397"/>
-            <a:ext cx="582211" cy="369332"/>
+            <a:off x="3854347" y="692696"/>
+            <a:ext cx="476412" cy="369332"/>
           </a:xfrm>
           <a:prstGeom prst="rect">
             <a:avLst/>
@@ -5526,89 +5495,14 @@
           <a:lstStyle/>
           <a:p>
             <a:r>
-              <a:rPr lang="en-AU" dirty="0">
+              <a:rPr lang="en-AU" dirty="0" smtClean="0">
                 <a:solidFill>
                   <a:schemeClr val="accent3">
                     <a:lumMod val="50000"/>
                   </a:schemeClr>
                 </a:solidFill>
               </a:rPr>
-              <a:t> </a:t>
-            </a:r>
-            <a:r>
-              <a:rPr lang="en-AU" dirty="0" smtClean="0">
-                <a:solidFill>
-                  <a:schemeClr val="accent3">
-                    <a:lumMod val="50000"/>
-                  </a:schemeClr>
-                </a:solidFill>
-              </a:rPr>
-              <a:t> </a:t>
-            </a:r>
-            <a:r>
-              <a:rPr lang="en-AU" dirty="0" smtClean="0">
-                <a:solidFill>
-                  <a:schemeClr val="accent3">
-                    <a:lumMod val="50000"/>
-                  </a:schemeClr>
-                </a:solidFill>
-              </a:rPr>
-              <a:t>1,4</a:t>
-            </a:r>
-          </a:p>
-        </p:txBody>
-      </p:sp>
-      <p:sp>
-        <p:nvSpPr>
-          <p:cNvPr id="16" name="TextBox 15"/>
-          <p:cNvSpPr txBox="1"/>
-          <p:nvPr/>
-        </p:nvSpPr>
-        <p:spPr>
-          <a:xfrm>
-            <a:off x="4907213" y="1471890"/>
-            <a:ext cx="580620" cy="369332"/>
-          </a:xfrm>
-          <a:prstGeom prst="rect">
-            <a:avLst/>
-          </a:prstGeom>
-          <a:noFill/>
-        </p:spPr>
-        <p:txBody>
-          <a:bodyPr wrap="none" rtlCol="0">
-            <a:spAutoFit/>
-          </a:bodyPr>
-          <a:lstStyle/>
-          <a:p>
-            <a:r>
-              <a:rPr lang="en-AU" dirty="0">
-                <a:solidFill>
-                  <a:schemeClr val="accent3">
-                    <a:lumMod val="50000"/>
-                  </a:schemeClr>
-                </a:solidFill>
-              </a:rPr>
-              <a:t> </a:t>
-            </a:r>
-            <a:r>
-              <a:rPr lang="en-AU" dirty="0" smtClean="0">
-                <a:solidFill>
-                  <a:schemeClr val="accent3">
-                    <a:lumMod val="50000"/>
-                  </a:schemeClr>
-                </a:solidFill>
-              </a:rPr>
-              <a:t> </a:t>
-            </a:r>
-            <a:r>
-              <a:rPr lang="en-AU" dirty="0" smtClean="0">
-                <a:solidFill>
-                  <a:schemeClr val="accent3">
-                    <a:lumMod val="50000"/>
-                  </a:schemeClr>
-                </a:solidFill>
-              </a:rPr>
-              <a:t>1,6</a:t>
+              <a:t>0.3</a:t>
             </a:r>
             <a:endParaRPr lang="en-AU" dirty="0">
               <a:solidFill>
@@ -5622,14 +5516,14 @@
       </p:sp>
       <p:sp>
         <p:nvSpPr>
-          <p:cNvPr id="17" name="TextBox 16"/>
+          <p:cNvPr id="9" name="TextBox 8"/>
           <p:cNvSpPr txBox="1"/>
           <p:nvPr/>
         </p:nvSpPr>
         <p:spPr>
           <a:xfrm>
-            <a:off x="6004748" y="1471890"/>
-            <a:ext cx="582211" cy="369332"/>
+            <a:off x="4870261" y="687189"/>
+            <a:ext cx="476412" cy="369332"/>
           </a:xfrm>
           <a:prstGeom prst="rect">
             <a:avLst/>
@@ -5643,36 +5537,16 @@
           <a:lstStyle/>
           <a:p>
             <a:r>
-              <a:rPr lang="en-AU" dirty="0">
+              <a:rPr lang="en-AU" dirty="0" smtClean="0">
                 <a:solidFill>
                   <a:schemeClr val="accent3">
                     <a:lumMod val="50000"/>
                   </a:schemeClr>
                 </a:solidFill>
               </a:rPr>
-              <a:t> </a:t>
-            </a:r>
-            <a:r>
-              <a:rPr lang="en-AU" dirty="0" smtClean="0">
-                <a:solidFill>
-                  <a:schemeClr val="accent3">
-                    <a:lumMod val="50000"/>
-                  </a:schemeClr>
-                </a:solidFill>
-              </a:rPr>
-              <a:t> </a:t>
-            </a:r>
-            <a:r>
-              <a:rPr lang="en-AU" dirty="0" smtClean="0">
-                <a:solidFill>
-                  <a:schemeClr val="accent3">
-                    <a:lumMod val="50000"/>
-                  </a:schemeClr>
-                </a:solidFill>
-              </a:rPr>
-              <a:t>1,8</a:t>
-            </a:r>
-            <a:endParaRPr lang="en-AU" dirty="0" smtClean="0">
+              <a:t>0.4</a:t>
+            </a:r>
+            <a:endParaRPr lang="en-AU" dirty="0">
               <a:solidFill>
                 <a:schemeClr val="accent3">
                   <a:lumMod val="50000"/>
@@ -5684,14 +5558,14 @@
       </p:sp>
       <p:sp>
         <p:nvSpPr>
-          <p:cNvPr id="4096" name="TextBox 4095"/>
+          <p:cNvPr id="10" name="TextBox 9"/>
           <p:cNvSpPr txBox="1"/>
           <p:nvPr/>
         </p:nvSpPr>
         <p:spPr>
           <a:xfrm>
-            <a:off x="5314697" y="4373732"/>
-            <a:ext cx="1351452" cy="369332"/>
+            <a:off x="5967796" y="687189"/>
+            <a:ext cx="476412" cy="369332"/>
           </a:xfrm>
           <a:prstGeom prst="rect">
             <a:avLst/>
@@ -5705,26 +5579,364 @@
           <a:lstStyle/>
           <a:p>
             <a:r>
-              <a:rPr lang="en-AU" b="1" dirty="0" smtClean="0"/>
-              <a:t>Multiple </a:t>
-            </a:r>
-            <a:r>
-              <a:rPr lang="en-AU" b="1" dirty="0" smtClean="0"/>
-              <a:t>fall</a:t>
-            </a:r>
-            <a:endParaRPr lang="en-AU" b="1" dirty="0"/>
+              <a:rPr lang="en-AU" dirty="0" smtClean="0">
+                <a:solidFill>
+                  <a:schemeClr val="accent3">
+                    <a:lumMod val="50000"/>
+                  </a:schemeClr>
+                </a:solidFill>
+              </a:rPr>
+              <a:t>0.6</a:t>
+            </a:r>
+          </a:p>
+        </p:txBody>
+      </p:sp>
+      <p:sp>
+        <p:nvSpPr>
+          <p:cNvPr id="11" name="TextBox 10"/>
+          <p:cNvSpPr txBox="1"/>
+          <p:nvPr/>
+        </p:nvSpPr>
+        <p:spPr>
+          <a:xfrm>
+            <a:off x="7020272" y="687189"/>
+            <a:ext cx="476412" cy="369332"/>
+          </a:xfrm>
+          <a:prstGeom prst="rect">
+            <a:avLst/>
+          </a:prstGeom>
+          <a:noFill/>
+        </p:spPr>
+        <p:txBody>
+          <a:bodyPr wrap="none" rtlCol="0">
+            <a:spAutoFit/>
+          </a:bodyPr>
+          <a:lstStyle/>
+          <a:p>
+            <a:r>
+              <a:rPr lang="en-AU" dirty="0" smtClean="0">
+                <a:solidFill>
+                  <a:schemeClr val="accent3">
+                    <a:lumMod val="50000"/>
+                  </a:schemeClr>
+                </a:solidFill>
+              </a:rPr>
+              <a:t>0.8</a:t>
+            </a:r>
+            <a:endParaRPr lang="en-AU" dirty="0">
+              <a:solidFill>
+                <a:schemeClr val="accent3">
+                  <a:lumMod val="50000"/>
+                </a:schemeClr>
+              </a:solidFill>
+            </a:endParaRPr>
+          </a:p>
+        </p:txBody>
+      </p:sp>
+      <p:sp>
+        <p:nvSpPr>
+          <p:cNvPr id="13" name="TextBox 12"/>
+          <p:cNvSpPr txBox="1"/>
+          <p:nvPr/>
+        </p:nvSpPr>
+        <p:spPr>
+          <a:xfrm>
+            <a:off x="179512" y="3435723"/>
+            <a:ext cx="3877985" cy="369332"/>
+          </a:xfrm>
+          <a:prstGeom prst="rect">
+            <a:avLst/>
+          </a:prstGeom>
+          <a:noFill/>
+        </p:spPr>
+        <p:txBody>
+          <a:bodyPr wrap="none" rtlCol="0">
+            <a:spAutoFit/>
+          </a:bodyPr>
+          <a:lstStyle/>
+          <a:p>
+            <a:r>
+              <a:rPr lang="en-AU" dirty="0" smtClean="0">
+                <a:solidFill>
+                  <a:schemeClr val="accent3">
+                    <a:lumMod val="50000"/>
+                  </a:schemeClr>
+                </a:solidFill>
+              </a:rPr>
+              <a:t>Dots/Line DF:       1			</a:t>
+            </a:r>
+            <a:endParaRPr lang="en-AU" dirty="0">
+              <a:solidFill>
+                <a:schemeClr val="accent3">
+                  <a:lumMod val="50000"/>
+                </a:schemeClr>
+              </a:solidFill>
+            </a:endParaRPr>
+          </a:p>
+        </p:txBody>
+      </p:sp>
+      <p:sp>
+        <p:nvSpPr>
+          <p:cNvPr id="14" name="TextBox 13"/>
+          <p:cNvSpPr txBox="1"/>
+          <p:nvPr/>
+        </p:nvSpPr>
+        <p:spPr>
+          <a:xfrm>
+            <a:off x="2808752" y="3435723"/>
+            <a:ext cx="354584" cy="369332"/>
+          </a:xfrm>
+          <a:prstGeom prst="rect">
+            <a:avLst/>
+          </a:prstGeom>
+          <a:noFill/>
+        </p:spPr>
+        <p:txBody>
+          <a:bodyPr wrap="none" rtlCol="0">
+            <a:spAutoFit/>
+          </a:bodyPr>
+          <a:lstStyle/>
+          <a:p>
+            <a:r>
+              <a:rPr lang="en-AU" dirty="0">
+                <a:solidFill>
+                  <a:schemeClr val="accent3">
+                    <a:lumMod val="50000"/>
+                  </a:schemeClr>
+                </a:solidFill>
+              </a:rPr>
+              <a:t> </a:t>
+            </a:r>
+            <a:r>
+              <a:rPr lang="en-AU" dirty="0" smtClean="0">
+                <a:solidFill>
+                  <a:schemeClr val="accent3">
+                    <a:lumMod val="50000"/>
+                  </a:schemeClr>
+                </a:solidFill>
+              </a:rPr>
+              <a:t>2</a:t>
+            </a:r>
+            <a:endParaRPr lang="en-AU" dirty="0">
+              <a:solidFill>
+                <a:schemeClr val="accent3">
+                  <a:lumMod val="50000"/>
+                </a:schemeClr>
+              </a:solidFill>
+            </a:endParaRPr>
+          </a:p>
+        </p:txBody>
+      </p:sp>
+      <p:sp>
+        <p:nvSpPr>
+          <p:cNvPr id="15" name="TextBox 14"/>
+          <p:cNvSpPr txBox="1"/>
+          <p:nvPr/>
+        </p:nvSpPr>
+        <p:spPr>
+          <a:xfrm>
+            <a:off x="3819291" y="3435723"/>
+            <a:ext cx="407484" cy="369332"/>
+          </a:xfrm>
+          <a:prstGeom prst="rect">
+            <a:avLst/>
+          </a:prstGeom>
+          <a:noFill/>
+        </p:spPr>
+        <p:txBody>
+          <a:bodyPr wrap="none" rtlCol="0">
+            <a:spAutoFit/>
+          </a:bodyPr>
+          <a:lstStyle/>
+          <a:p>
+            <a:r>
+              <a:rPr lang="en-AU" dirty="0">
+                <a:solidFill>
+                  <a:schemeClr val="accent3">
+                    <a:lumMod val="50000"/>
+                  </a:schemeClr>
+                </a:solidFill>
+              </a:rPr>
+              <a:t> </a:t>
+            </a:r>
+            <a:r>
+              <a:rPr lang="en-AU" dirty="0" smtClean="0">
+                <a:solidFill>
+                  <a:schemeClr val="accent3">
+                    <a:lumMod val="50000"/>
+                  </a:schemeClr>
+                </a:solidFill>
+              </a:rPr>
+              <a:t> 3</a:t>
+            </a:r>
+            <a:endParaRPr lang="en-AU" dirty="0">
+              <a:solidFill>
+                <a:schemeClr val="accent3">
+                  <a:lumMod val="50000"/>
+                </a:schemeClr>
+              </a:solidFill>
+            </a:endParaRPr>
+          </a:p>
+        </p:txBody>
+      </p:sp>
+      <p:sp>
+        <p:nvSpPr>
+          <p:cNvPr id="16" name="TextBox 15"/>
+          <p:cNvSpPr txBox="1"/>
+          <p:nvPr/>
+        </p:nvSpPr>
+        <p:spPr>
+          <a:xfrm>
+            <a:off x="4835205" y="3430216"/>
+            <a:ext cx="407484" cy="369332"/>
+          </a:xfrm>
+          <a:prstGeom prst="rect">
+            <a:avLst/>
+          </a:prstGeom>
+          <a:noFill/>
+        </p:spPr>
+        <p:txBody>
+          <a:bodyPr wrap="none" rtlCol="0">
+            <a:spAutoFit/>
+          </a:bodyPr>
+          <a:lstStyle/>
+          <a:p>
+            <a:r>
+              <a:rPr lang="en-AU" dirty="0">
+                <a:solidFill>
+                  <a:schemeClr val="accent3">
+                    <a:lumMod val="50000"/>
+                  </a:schemeClr>
+                </a:solidFill>
+              </a:rPr>
+              <a:t> </a:t>
+            </a:r>
+            <a:r>
+              <a:rPr lang="en-AU" dirty="0" smtClean="0">
+                <a:solidFill>
+                  <a:schemeClr val="accent3">
+                    <a:lumMod val="50000"/>
+                  </a:schemeClr>
+                </a:solidFill>
+              </a:rPr>
+              <a:t> 4</a:t>
+            </a:r>
+            <a:endParaRPr lang="en-AU" dirty="0">
+              <a:solidFill>
+                <a:schemeClr val="accent3">
+                  <a:lumMod val="50000"/>
+                </a:schemeClr>
+              </a:solidFill>
+            </a:endParaRPr>
+          </a:p>
+        </p:txBody>
+      </p:sp>
+      <p:sp>
+        <p:nvSpPr>
+          <p:cNvPr id="17" name="TextBox 16"/>
+          <p:cNvSpPr txBox="1"/>
+          <p:nvPr/>
+        </p:nvSpPr>
+        <p:spPr>
+          <a:xfrm>
+            <a:off x="5932740" y="3430216"/>
+            <a:ext cx="407484" cy="369332"/>
+          </a:xfrm>
+          <a:prstGeom prst="rect">
+            <a:avLst/>
+          </a:prstGeom>
+          <a:noFill/>
+        </p:spPr>
+        <p:txBody>
+          <a:bodyPr wrap="none" rtlCol="0">
+            <a:spAutoFit/>
+          </a:bodyPr>
+          <a:lstStyle/>
+          <a:p>
+            <a:r>
+              <a:rPr lang="en-AU" dirty="0">
+                <a:solidFill>
+                  <a:schemeClr val="accent3">
+                    <a:lumMod val="50000"/>
+                  </a:schemeClr>
+                </a:solidFill>
+              </a:rPr>
+              <a:t> </a:t>
+            </a:r>
+            <a:r>
+              <a:rPr lang="en-AU" dirty="0" smtClean="0">
+                <a:solidFill>
+                  <a:schemeClr val="accent3">
+                    <a:lumMod val="50000"/>
+                  </a:schemeClr>
+                </a:solidFill>
+              </a:rPr>
+              <a:t> 5</a:t>
+            </a:r>
+          </a:p>
+        </p:txBody>
+      </p:sp>
+      <p:sp>
+        <p:nvSpPr>
+          <p:cNvPr id="18" name="TextBox 17"/>
+          <p:cNvSpPr txBox="1"/>
+          <p:nvPr/>
+        </p:nvSpPr>
+        <p:spPr>
+          <a:xfrm>
+            <a:off x="6985216" y="3430216"/>
+            <a:ext cx="407484" cy="369332"/>
+          </a:xfrm>
+          <a:prstGeom prst="rect">
+            <a:avLst/>
+          </a:prstGeom>
+          <a:noFill/>
+        </p:spPr>
+        <p:txBody>
+          <a:bodyPr wrap="none" rtlCol="0">
+            <a:spAutoFit/>
+          </a:bodyPr>
+          <a:lstStyle/>
+          <a:p>
+            <a:r>
+              <a:rPr lang="en-AU" dirty="0">
+                <a:solidFill>
+                  <a:schemeClr val="accent3">
+                    <a:lumMod val="50000"/>
+                  </a:schemeClr>
+                </a:solidFill>
+              </a:rPr>
+              <a:t> </a:t>
+            </a:r>
+            <a:r>
+              <a:rPr lang="en-AU" dirty="0" smtClean="0">
+                <a:solidFill>
+                  <a:schemeClr val="accent3">
+                    <a:lumMod val="50000"/>
+                  </a:schemeClr>
+                </a:solidFill>
+              </a:rPr>
+              <a:t> 6</a:t>
+            </a:r>
+            <a:endParaRPr lang="en-AU" dirty="0">
+              <a:solidFill>
+                <a:schemeClr val="accent3">
+                  <a:lumMod val="50000"/>
+                </a:schemeClr>
+              </a:solidFill>
+            </a:endParaRPr>
           </a:p>
         </p:txBody>
       </p:sp>
       <p:cxnSp>
         <p:nvCxnSpPr>
-          <p:cNvPr id="22" name="Straight Arrow Connector 18"/>
+          <p:cNvPr id="19" name="Straight Arrow Connector 18"/>
           <p:cNvCxnSpPr/>
           <p:nvPr/>
         </p:nvCxnSpPr>
         <p:spPr>
           <a:xfrm>
-            <a:off x="6609454" y="2708920"/>
+            <a:off x="8100392" y="1988840"/>
             <a:ext cx="0" cy="432048"/>
           </a:xfrm>
           <a:prstGeom prst="straightConnector1">
@@ -5752,13 +5964,13 @@
       </p:cxnSp>
       <p:cxnSp>
         <p:nvCxnSpPr>
-          <p:cNvPr id="23" name="Straight Arrow Connector 20"/>
+          <p:cNvPr id="21" name="Straight Arrow Connector 20"/>
           <p:cNvCxnSpPr/>
           <p:nvPr/>
         </p:nvCxnSpPr>
         <p:spPr>
           <a:xfrm>
-            <a:off x="6609454" y="1844824"/>
+            <a:off x="8100392" y="1124744"/>
             <a:ext cx="0" cy="311166"/>
           </a:xfrm>
           <a:prstGeom prst="straightConnector1">
@@ -5786,13 +5998,13 @@
       </p:cxnSp>
       <p:cxnSp>
         <p:nvCxnSpPr>
-          <p:cNvPr id="24" name="Straight Arrow Connector 24"/>
+          <p:cNvPr id="25" name="Straight Arrow Connector 24"/>
           <p:cNvCxnSpPr/>
           <p:nvPr/>
         </p:nvCxnSpPr>
         <p:spPr>
           <a:xfrm>
-            <a:off x="6681462" y="1844824"/>
+            <a:off x="8172400" y="1124744"/>
             <a:ext cx="288032" cy="0"/>
           </a:xfrm>
           <a:prstGeom prst="straightConnector1">
@@ -5820,13 +6032,13 @@
       </p:cxnSp>
       <p:cxnSp>
         <p:nvCxnSpPr>
-          <p:cNvPr id="26" name="Straight Arrow Connector 27"/>
+          <p:cNvPr id="28" name="Straight Arrow Connector 27"/>
           <p:cNvCxnSpPr/>
           <p:nvPr/>
         </p:nvCxnSpPr>
         <p:spPr>
           <a:xfrm>
-            <a:off x="6681462" y="2708920"/>
+            <a:off x="8172400" y="1988840"/>
             <a:ext cx="360040" cy="0"/>
           </a:xfrm>
           <a:prstGeom prst="straightConnector1">
@@ -5854,13 +6066,13 @@
       </p:cxnSp>
       <p:sp>
         <p:nvSpPr>
-          <p:cNvPr id="27" name="TextBox 29"/>
+          <p:cNvPr id="30" name="TextBox 29"/>
           <p:cNvSpPr txBox="1"/>
           <p:nvPr/>
         </p:nvSpPr>
         <p:spPr>
           <a:xfrm>
-            <a:off x="6588224" y="2771055"/>
+            <a:off x="8079162" y="2050975"/>
             <a:ext cx="736099" cy="307777"/>
           </a:xfrm>
           <a:prstGeom prst="rect">
@@ -5892,13 +6104,13 @@
       </p:sp>
       <p:sp>
         <p:nvSpPr>
-          <p:cNvPr id="29" name="TextBox 30"/>
+          <p:cNvPr id="31" name="TextBox 30"/>
           <p:cNvSpPr txBox="1"/>
           <p:nvPr/>
         </p:nvSpPr>
         <p:spPr>
           <a:xfrm>
-            <a:off x="6609454" y="1848213"/>
+            <a:off x="8100392" y="1128133"/>
             <a:ext cx="736099" cy="307777"/>
           </a:xfrm>
           <a:prstGeom prst="rect">
@@ -5928,10 +6140,40 @@
           </a:p>
         </p:txBody>
       </p:sp>
+      <p:sp>
+        <p:nvSpPr>
+          <p:cNvPr id="4096" name="TextBox 4095"/>
+          <p:cNvSpPr txBox="1"/>
+          <p:nvPr/>
+        </p:nvSpPr>
+        <p:spPr>
+          <a:xfrm>
+            <a:off x="5242689" y="6332058"/>
+            <a:ext cx="2404954" cy="369332"/>
+          </a:xfrm>
+          <a:prstGeom prst="rect">
+            <a:avLst/>
+          </a:prstGeom>
+          <a:noFill/>
+        </p:spPr>
+        <p:txBody>
+          <a:bodyPr wrap="none" rtlCol="0">
+            <a:spAutoFit/>
+          </a:bodyPr>
+          <a:lstStyle/>
+          <a:p>
+            <a:r>
+              <a:rPr lang="en-AU" b="1" dirty="0" smtClean="0"/>
+              <a:t>Multiple fall best doses</a:t>
+            </a:r>
+            <a:endParaRPr lang="en-AU" b="1" dirty="0"/>
+          </a:p>
+        </p:txBody>
+      </p:sp>
     </p:spTree>
     <p:extLst>
       <p:ext uri="{BB962C8B-B14F-4D97-AF65-F5344CB8AC3E}">
-        <p14:creationId xmlns:p14="http://schemas.microsoft.com/office/powerpoint/2010/main" val="3384583430"/>
+        <p14:creationId xmlns:p14="http://schemas.microsoft.com/office/powerpoint/2010/main" val="2955970339"/>
       </p:ext>
     </p:extLst>
   </p:cSld>
@@ -5960,7 +6202,7 @@
       </p:grpSpPr>
       <p:pic>
         <p:nvPicPr>
-          <p:cNvPr id="4098" name="Picture 2"/>
+          <p:cNvPr id="5122" name="Picture 2"/>
           <p:cNvPicPr>
             <a:picLocks noChangeAspect="1" noChangeArrowheads="1"/>
           </p:cNvPicPr>
@@ -5974,13 +6216,13 @@
               </a:ext>
             </a:extLst>
           </a:blip>
-          <a:srcRect l="1494" t="22805" r="51035" b="13931"/>
+          <a:srcRect l="2499" t="23111" r="51251" b="10222"/>
           <a:stretch/>
         </p:blipFill>
         <p:spPr bwMode="auto">
           <a:xfrm>
-            <a:off x="1115616" y="908720"/>
-            <a:ext cx="6511158" cy="5423338"/>
+            <a:off x="971600" y="1165448"/>
+            <a:ext cx="6343650" cy="5715000"/>
           </a:xfrm>
           <a:prstGeom prst="rect">
             <a:avLst/>
@@ -5991,14 +6233,14 @@
           </a:ln>
           <a:effectLst/>
           <a:extLst>
-            <a:ext uri="{909E8E84-426E-40dd-AFC4-6F175D3DCCD1}">
+            <a:ext uri="{909E8E84-426E-40DD-AFC4-6F175D3DCCD1}">
               <a14:hiddenFill xmlns:a14="http://schemas.microsoft.com/office/drawing/2010/main">
                 <a:solidFill>
                   <a:schemeClr val="accent1"/>
                 </a:solidFill>
               </a14:hiddenFill>
             </a:ext>
-            <a:ext uri="{91240B29-F687-4f45-9708-019B960494DF}">
+            <a:ext uri="{91240B29-F687-4F45-9708-019B960494DF}">
               <a14:hiddenLine xmlns:a14="http://schemas.microsoft.com/office/drawing/2010/main" w="9525">
                 <a:solidFill>
                   <a:schemeClr val="tx1"/>
@@ -6008,7 +6250,7 @@
                 <a:tailEnd/>
               </a14:hiddenLine>
             </a:ext>
-            <a:ext uri="{AF507438-7753-43e0-B8FC-AC1667EBCBE1}">
+            <a:ext uri="{AF507438-7753-43E0-B8FC-AC1667EBCBE1}">
               <a14:hiddenEffects xmlns:a14="http://schemas.microsoft.com/office/drawing/2010/main">
                 <a:effectLst>
                   <a:outerShdw dist="35921" dir="2700000" algn="ctr" rotWithShape="0">
@@ -6028,8 +6270,8 @@
         </p:nvSpPr>
         <p:spPr>
           <a:xfrm>
-            <a:off x="214568" y="692696"/>
-            <a:ext cx="3877985" cy="369332"/>
+            <a:off x="6305962" y="1713580"/>
+            <a:ext cx="546670" cy="227664"/>
           </a:xfrm>
           <a:prstGeom prst="rect">
             <a:avLst/>
@@ -6043,20 +6285,16 @@
           <a:lstStyle/>
           <a:p>
             <a:r>
-              <a:rPr lang="en-AU" dirty="0" smtClean="0">
-                <a:solidFill>
-                  <a:schemeClr val="accent3">
-                    <a:lumMod val="50000"/>
-                  </a:schemeClr>
+              <a:rPr lang="en-AU" sz="1400" dirty="0" smtClean="0">
+                <a:solidFill>
+                  <a:schemeClr val="tx2"/>
                 </a:solidFill>
               </a:rPr>
-              <a:t>Dots/Line DF:     0.1			</a:t>
-            </a:r>
-            <a:endParaRPr lang="en-AU" dirty="0">
+              <a:t>100 nm</a:t>
+            </a:r>
+            <a:endParaRPr lang="en-AU" sz="1400" dirty="0">
               <a:solidFill>
-                <a:schemeClr val="accent3">
-                  <a:lumMod val="50000"/>
-                </a:schemeClr>
+                <a:schemeClr val="tx2"/>
               </a:solidFill>
             </a:endParaRPr>
           </a:p>
@@ -6064,14 +6302,14 @@
       </p:sp>
       <p:sp>
         <p:nvSpPr>
-          <p:cNvPr id="7" name="TextBox 6"/>
+          <p:cNvPr id="6" name="TextBox 5"/>
           <p:cNvSpPr txBox="1"/>
           <p:nvPr/>
         </p:nvSpPr>
         <p:spPr>
           <a:xfrm>
-            <a:off x="2843808" y="692696"/>
-            <a:ext cx="476412" cy="369332"/>
+            <a:off x="6300192" y="1897391"/>
+            <a:ext cx="546670" cy="227664"/>
           </a:xfrm>
           <a:prstGeom prst="rect">
             <a:avLst/>
@@ -6085,20 +6323,16 @@
           <a:lstStyle/>
           <a:p>
             <a:r>
-              <a:rPr lang="en-AU" dirty="0" smtClean="0">
-                <a:solidFill>
-                  <a:schemeClr val="accent3">
-                    <a:lumMod val="50000"/>
-                  </a:schemeClr>
+              <a:rPr lang="en-AU" sz="1400" dirty="0" smtClean="0">
+                <a:solidFill>
+                  <a:schemeClr val="tx2"/>
                 </a:solidFill>
               </a:rPr>
-              <a:t>0.2</a:t>
-            </a:r>
-            <a:endParaRPr lang="en-AU" dirty="0">
+              <a:t>100 nm</a:t>
+            </a:r>
+            <a:endParaRPr lang="en-AU" sz="1400" dirty="0">
               <a:solidFill>
-                <a:schemeClr val="accent3">
-                  <a:lumMod val="50000"/>
-                </a:schemeClr>
+                <a:schemeClr val="tx2"/>
               </a:solidFill>
             </a:endParaRPr>
           </a:p>
@@ -6106,14 +6340,14 @@
       </p:sp>
       <p:sp>
         <p:nvSpPr>
-          <p:cNvPr id="8" name="TextBox 7"/>
+          <p:cNvPr id="7" name="TextBox 6"/>
           <p:cNvSpPr txBox="1"/>
           <p:nvPr/>
         </p:nvSpPr>
         <p:spPr>
           <a:xfrm>
-            <a:off x="3854347" y="692696"/>
-            <a:ext cx="476412" cy="369332"/>
+            <a:off x="6365566" y="2095844"/>
+            <a:ext cx="478813" cy="227664"/>
           </a:xfrm>
           <a:prstGeom prst="rect">
             <a:avLst/>
@@ -6127,20 +6361,24 @@
           <a:lstStyle/>
           <a:p>
             <a:r>
-              <a:rPr lang="en-AU" dirty="0" smtClean="0">
-                <a:solidFill>
-                  <a:schemeClr val="accent3">
-                    <a:lumMod val="50000"/>
-                  </a:schemeClr>
+              <a:rPr lang="en-AU" sz="1400" dirty="0">
+                <a:solidFill>
+                  <a:schemeClr val="tx2"/>
                 </a:solidFill>
               </a:rPr>
-              <a:t>0.3</a:t>
-            </a:r>
-            <a:endParaRPr lang="en-AU" dirty="0">
+              <a:t>8</a:t>
+            </a:r>
+            <a:r>
+              <a:rPr lang="en-AU" sz="1400" dirty="0" smtClean="0">
+                <a:solidFill>
+                  <a:schemeClr val="tx2"/>
+                </a:solidFill>
+              </a:rPr>
+              <a:t>0 nm</a:t>
+            </a:r>
+            <a:endParaRPr lang="en-AU" sz="1400" dirty="0">
               <a:solidFill>
-                <a:schemeClr val="accent3">
-                  <a:lumMod val="50000"/>
-                </a:schemeClr>
+                <a:schemeClr val="tx2"/>
               </a:solidFill>
             </a:endParaRPr>
           </a:p>
@@ -6148,14 +6386,14 @@
       </p:sp>
       <p:sp>
         <p:nvSpPr>
-          <p:cNvPr id="9" name="TextBox 8"/>
+          <p:cNvPr id="8" name="TextBox 7"/>
           <p:cNvSpPr txBox="1"/>
           <p:nvPr/>
         </p:nvSpPr>
         <p:spPr>
           <a:xfrm>
-            <a:off x="4870261" y="687189"/>
-            <a:ext cx="476412" cy="369332"/>
+            <a:off x="6368049" y="2308902"/>
+            <a:ext cx="478813" cy="227664"/>
           </a:xfrm>
           <a:prstGeom prst="rect">
             <a:avLst/>
@@ -6169,20 +6407,24 @@
           <a:lstStyle/>
           <a:p>
             <a:r>
-              <a:rPr lang="en-AU" dirty="0" smtClean="0">
-                <a:solidFill>
-                  <a:schemeClr val="accent3">
-                    <a:lumMod val="50000"/>
-                  </a:schemeClr>
+              <a:rPr lang="en-AU" sz="1400" dirty="0">
+                <a:solidFill>
+                  <a:schemeClr val="tx2"/>
                 </a:solidFill>
               </a:rPr>
-              <a:t>0.4</a:t>
-            </a:r>
-            <a:endParaRPr lang="en-AU" dirty="0">
+              <a:t>6</a:t>
+            </a:r>
+            <a:r>
+              <a:rPr lang="en-AU" sz="1400" dirty="0" smtClean="0">
+                <a:solidFill>
+                  <a:schemeClr val="tx2"/>
+                </a:solidFill>
+              </a:rPr>
+              <a:t>0 nm</a:t>
+            </a:r>
+            <a:endParaRPr lang="en-AU" sz="1400" dirty="0">
               <a:solidFill>
-                <a:schemeClr val="accent3">
-                  <a:lumMod val="50000"/>
-                </a:schemeClr>
+                <a:schemeClr val="tx2"/>
               </a:solidFill>
             </a:endParaRPr>
           </a:p>
@@ -6190,14 +6432,14 @@
       </p:sp>
       <p:sp>
         <p:nvSpPr>
-          <p:cNvPr id="10" name="TextBox 9"/>
+          <p:cNvPr id="9" name="TextBox 8"/>
           <p:cNvSpPr txBox="1"/>
           <p:nvPr/>
         </p:nvSpPr>
         <p:spPr>
           <a:xfrm>
-            <a:off x="5967796" y="687189"/>
-            <a:ext cx="476412" cy="369332"/>
+            <a:off x="6365566" y="2735018"/>
+            <a:ext cx="478813" cy="227664"/>
           </a:xfrm>
           <a:prstGeom prst="rect">
             <a:avLst/>
@@ -6211,28 +6453,39 @@
           <a:lstStyle/>
           <a:p>
             <a:r>
-              <a:rPr lang="en-AU" dirty="0" smtClean="0">
-                <a:solidFill>
-                  <a:schemeClr val="accent3">
-                    <a:lumMod val="50000"/>
-                  </a:schemeClr>
+              <a:rPr lang="en-AU" sz="1400" dirty="0">
+                <a:solidFill>
+                  <a:schemeClr val="tx2"/>
                 </a:solidFill>
               </a:rPr>
-              <a:t>0.6</a:t>
-            </a:r>
-          </a:p>
-        </p:txBody>
-      </p:sp>
-      <p:sp>
-        <p:nvSpPr>
-          <p:cNvPr id="11" name="TextBox 10"/>
+              <a:t>2</a:t>
+            </a:r>
+            <a:r>
+              <a:rPr lang="en-AU" sz="1400" dirty="0" smtClean="0">
+                <a:solidFill>
+                  <a:schemeClr val="tx2"/>
+                </a:solidFill>
+              </a:rPr>
+              <a:t>0 nm</a:t>
+            </a:r>
+            <a:endParaRPr lang="en-AU" sz="1400" dirty="0">
+              <a:solidFill>
+                <a:schemeClr val="tx2"/>
+              </a:solidFill>
+            </a:endParaRPr>
+          </a:p>
+        </p:txBody>
+      </p:sp>
+      <p:sp>
+        <p:nvSpPr>
+          <p:cNvPr id="10" name="TextBox 9"/>
           <p:cNvSpPr txBox="1"/>
           <p:nvPr/>
         </p:nvSpPr>
         <p:spPr>
           <a:xfrm>
-            <a:off x="7020272" y="687189"/>
-            <a:ext cx="476412" cy="369332"/>
+            <a:off x="6368049" y="2521960"/>
+            <a:ext cx="478813" cy="227664"/>
           </a:xfrm>
           <a:prstGeom prst="rect">
             <a:avLst/>
@@ -6246,330 +6499,115 @@
           <a:lstStyle/>
           <a:p>
             <a:r>
-              <a:rPr lang="en-AU" dirty="0" smtClean="0">
-                <a:solidFill>
-                  <a:schemeClr val="accent3">
-                    <a:lumMod val="50000"/>
-                  </a:schemeClr>
+              <a:rPr lang="en-AU" sz="1400" dirty="0">
+                <a:solidFill>
+                  <a:schemeClr val="tx2"/>
                 </a:solidFill>
               </a:rPr>
-              <a:t>0.8</a:t>
-            </a:r>
-            <a:endParaRPr lang="en-AU" dirty="0">
+              <a:t>4</a:t>
+            </a:r>
+            <a:r>
+              <a:rPr lang="en-AU" sz="1400" dirty="0" smtClean="0">
+                <a:solidFill>
+                  <a:schemeClr val="tx2"/>
+                </a:solidFill>
+              </a:rPr>
+              <a:t>0 nm</a:t>
+            </a:r>
+            <a:endParaRPr lang="en-AU" sz="1400" dirty="0">
               <a:solidFill>
-                <a:schemeClr val="accent3">
-                  <a:lumMod val="50000"/>
-                </a:schemeClr>
+                <a:schemeClr val="tx2"/>
               </a:solidFill>
             </a:endParaRPr>
           </a:p>
         </p:txBody>
       </p:sp>
-      <p:sp>
-        <p:nvSpPr>
-          <p:cNvPr id="13" name="TextBox 12"/>
-          <p:cNvSpPr txBox="1"/>
-          <p:nvPr/>
-        </p:nvSpPr>
-        <p:spPr>
-          <a:xfrm>
-            <a:off x="179512" y="3435723"/>
-            <a:ext cx="3877985" cy="369332"/>
-          </a:xfrm>
-          <a:prstGeom prst="rect">
-            <a:avLst/>
-          </a:prstGeom>
-          <a:noFill/>
-        </p:spPr>
-        <p:txBody>
-          <a:bodyPr wrap="none" rtlCol="0">
-            <a:spAutoFit/>
-          </a:bodyPr>
-          <a:lstStyle/>
-          <a:p>
-            <a:r>
-              <a:rPr lang="en-AU" dirty="0" smtClean="0">
-                <a:solidFill>
-                  <a:schemeClr val="accent3">
-                    <a:lumMod val="50000"/>
-                  </a:schemeClr>
-                </a:solidFill>
-              </a:rPr>
-              <a:t>Dots/Line DF:       1			</a:t>
-            </a:r>
-            <a:endParaRPr lang="en-AU" dirty="0">
-              <a:solidFill>
-                <a:schemeClr val="accent3">
-                  <a:lumMod val="50000"/>
-                </a:schemeClr>
-              </a:solidFill>
-            </a:endParaRPr>
-          </a:p>
-        </p:txBody>
-      </p:sp>
-      <p:sp>
-        <p:nvSpPr>
-          <p:cNvPr id="14" name="TextBox 13"/>
-          <p:cNvSpPr txBox="1"/>
-          <p:nvPr/>
-        </p:nvSpPr>
-        <p:spPr>
-          <a:xfrm>
-            <a:off x="2808752" y="3435723"/>
-            <a:ext cx="354584" cy="369332"/>
-          </a:xfrm>
-          <a:prstGeom prst="rect">
-            <a:avLst/>
-          </a:prstGeom>
-          <a:noFill/>
-        </p:spPr>
-        <p:txBody>
-          <a:bodyPr wrap="none" rtlCol="0">
-            <a:spAutoFit/>
-          </a:bodyPr>
-          <a:lstStyle/>
-          <a:p>
-            <a:r>
-              <a:rPr lang="en-AU" dirty="0">
-                <a:solidFill>
-                  <a:schemeClr val="accent3">
-                    <a:lumMod val="50000"/>
-                  </a:schemeClr>
-                </a:solidFill>
-              </a:rPr>
-              <a:t> </a:t>
-            </a:r>
-            <a:r>
-              <a:rPr lang="en-AU" dirty="0" smtClean="0">
-                <a:solidFill>
-                  <a:schemeClr val="accent3">
-                    <a:lumMod val="50000"/>
-                  </a:schemeClr>
-                </a:solidFill>
-              </a:rPr>
-              <a:t>2</a:t>
-            </a:r>
-            <a:endParaRPr lang="en-AU" dirty="0">
-              <a:solidFill>
-                <a:schemeClr val="accent3">
-                  <a:lumMod val="50000"/>
-                </a:schemeClr>
-              </a:solidFill>
-            </a:endParaRPr>
-          </a:p>
-        </p:txBody>
-      </p:sp>
-      <p:sp>
-        <p:nvSpPr>
-          <p:cNvPr id="15" name="TextBox 14"/>
-          <p:cNvSpPr txBox="1"/>
-          <p:nvPr/>
-        </p:nvSpPr>
-        <p:spPr>
-          <a:xfrm>
-            <a:off x="3819291" y="3435723"/>
-            <a:ext cx="407484" cy="369332"/>
-          </a:xfrm>
-          <a:prstGeom prst="rect">
-            <a:avLst/>
-          </a:prstGeom>
-          <a:noFill/>
-        </p:spPr>
-        <p:txBody>
-          <a:bodyPr wrap="none" rtlCol="0">
-            <a:spAutoFit/>
-          </a:bodyPr>
-          <a:lstStyle/>
-          <a:p>
-            <a:r>
-              <a:rPr lang="en-AU" dirty="0">
-                <a:solidFill>
-                  <a:schemeClr val="accent3">
-                    <a:lumMod val="50000"/>
-                  </a:schemeClr>
-                </a:solidFill>
-              </a:rPr>
-              <a:t> </a:t>
-            </a:r>
-            <a:r>
-              <a:rPr lang="en-AU" dirty="0" smtClean="0">
-                <a:solidFill>
-                  <a:schemeClr val="accent3">
-                    <a:lumMod val="50000"/>
-                  </a:schemeClr>
-                </a:solidFill>
-              </a:rPr>
-              <a:t> 3</a:t>
-            </a:r>
-            <a:endParaRPr lang="en-AU" dirty="0">
-              <a:solidFill>
-                <a:schemeClr val="accent3">
-                  <a:lumMod val="50000"/>
-                </a:schemeClr>
-              </a:solidFill>
-            </a:endParaRPr>
-          </a:p>
-        </p:txBody>
-      </p:sp>
-      <p:sp>
-        <p:nvSpPr>
-          <p:cNvPr id="16" name="TextBox 15"/>
-          <p:cNvSpPr txBox="1"/>
-          <p:nvPr/>
-        </p:nvSpPr>
-        <p:spPr>
-          <a:xfrm>
-            <a:off x="4835205" y="3430216"/>
-            <a:ext cx="407484" cy="369332"/>
-          </a:xfrm>
-          <a:prstGeom prst="rect">
-            <a:avLst/>
-          </a:prstGeom>
-          <a:noFill/>
-        </p:spPr>
-        <p:txBody>
-          <a:bodyPr wrap="none" rtlCol="0">
-            <a:spAutoFit/>
-          </a:bodyPr>
-          <a:lstStyle/>
-          <a:p>
-            <a:r>
-              <a:rPr lang="en-AU" dirty="0">
-                <a:solidFill>
-                  <a:schemeClr val="accent3">
-                    <a:lumMod val="50000"/>
-                  </a:schemeClr>
-                </a:solidFill>
-              </a:rPr>
-              <a:t> </a:t>
-            </a:r>
-            <a:r>
-              <a:rPr lang="en-AU" dirty="0" smtClean="0">
-                <a:solidFill>
-                  <a:schemeClr val="accent3">
-                    <a:lumMod val="50000"/>
-                  </a:schemeClr>
-                </a:solidFill>
-              </a:rPr>
-              <a:t> 4</a:t>
-            </a:r>
-            <a:endParaRPr lang="en-AU" dirty="0">
-              <a:solidFill>
-                <a:schemeClr val="accent3">
-                  <a:lumMod val="50000"/>
-                </a:schemeClr>
-              </a:solidFill>
-            </a:endParaRPr>
-          </a:p>
-        </p:txBody>
-      </p:sp>
-      <p:sp>
-        <p:nvSpPr>
-          <p:cNvPr id="17" name="TextBox 16"/>
-          <p:cNvSpPr txBox="1"/>
-          <p:nvPr/>
-        </p:nvSpPr>
-        <p:spPr>
-          <a:xfrm>
-            <a:off x="5932740" y="3430216"/>
-            <a:ext cx="407484" cy="369332"/>
-          </a:xfrm>
-          <a:prstGeom prst="rect">
-            <a:avLst/>
-          </a:prstGeom>
-          <a:noFill/>
-        </p:spPr>
-        <p:txBody>
-          <a:bodyPr wrap="none" rtlCol="0">
-            <a:spAutoFit/>
-          </a:bodyPr>
-          <a:lstStyle/>
-          <a:p>
-            <a:r>
-              <a:rPr lang="en-AU" dirty="0">
-                <a:solidFill>
-                  <a:schemeClr val="accent3">
-                    <a:lumMod val="50000"/>
-                  </a:schemeClr>
-                </a:solidFill>
-              </a:rPr>
-              <a:t> </a:t>
-            </a:r>
-            <a:r>
-              <a:rPr lang="en-AU" dirty="0" smtClean="0">
-                <a:solidFill>
-                  <a:schemeClr val="accent3">
-                    <a:lumMod val="50000"/>
-                  </a:schemeClr>
-                </a:solidFill>
-              </a:rPr>
-              <a:t> 5</a:t>
-            </a:r>
-          </a:p>
-        </p:txBody>
-      </p:sp>
-      <p:sp>
-        <p:nvSpPr>
-          <p:cNvPr id="18" name="TextBox 17"/>
-          <p:cNvSpPr txBox="1"/>
-          <p:nvPr/>
-        </p:nvSpPr>
-        <p:spPr>
-          <a:xfrm>
-            <a:off x="6985216" y="3430216"/>
-            <a:ext cx="407484" cy="369332"/>
-          </a:xfrm>
-          <a:prstGeom prst="rect">
-            <a:avLst/>
-          </a:prstGeom>
-          <a:noFill/>
-        </p:spPr>
-        <p:txBody>
-          <a:bodyPr wrap="none" rtlCol="0">
-            <a:spAutoFit/>
-          </a:bodyPr>
-          <a:lstStyle/>
-          <a:p>
-            <a:r>
-              <a:rPr lang="en-AU" dirty="0">
-                <a:solidFill>
-                  <a:schemeClr val="accent3">
-                    <a:lumMod val="50000"/>
-                  </a:schemeClr>
-                </a:solidFill>
-              </a:rPr>
-              <a:t> </a:t>
-            </a:r>
-            <a:r>
-              <a:rPr lang="en-AU" dirty="0" smtClean="0">
-                <a:solidFill>
-                  <a:schemeClr val="accent3">
-                    <a:lumMod val="50000"/>
-                  </a:schemeClr>
-                </a:solidFill>
-              </a:rPr>
-              <a:t> 6</a:t>
-            </a:r>
-            <a:endParaRPr lang="en-AU" dirty="0">
-              <a:solidFill>
-                <a:schemeClr val="accent3">
-                  <a:lumMod val="50000"/>
-                </a:schemeClr>
-              </a:solidFill>
-            </a:endParaRPr>
-          </a:p>
-        </p:txBody>
-      </p:sp>
       <p:cxnSp>
         <p:nvCxnSpPr>
-          <p:cNvPr id="19" name="Straight Arrow Connector 18"/>
+          <p:cNvPr id="11" name="Straight Arrow Connector 10"/>
           <p:cNvCxnSpPr/>
           <p:nvPr/>
         </p:nvCxnSpPr>
         <p:spPr>
-          <a:xfrm>
-            <a:off x="8100392" y="1988840"/>
-            <a:ext cx="0" cy="432048"/>
+          <a:xfrm flipH="1">
+            <a:off x="6193811" y="1827411"/>
+            <a:ext cx="202013" cy="0"/>
+          </a:xfrm>
+          <a:prstGeom prst="straightConnector1">
+            <a:avLst/>
+          </a:prstGeom>
+          <a:ln>
+            <a:headEnd type="arrow"/>
+            <a:tailEnd type="arrow"/>
+          </a:ln>
+        </p:spPr>
+        <p:style>
+          <a:lnRef idx="1">
+            <a:schemeClr val="accent1"/>
+          </a:lnRef>
+          <a:fillRef idx="0">
+            <a:schemeClr val="accent1"/>
+          </a:fillRef>
+          <a:effectRef idx="0">
+            <a:schemeClr val="accent1"/>
+          </a:effectRef>
+          <a:fontRef idx="minor">
+            <a:schemeClr val="tx1"/>
+          </a:fontRef>
+        </p:style>
+      </p:cxnSp>
+      <p:sp>
+        <p:nvSpPr>
+          <p:cNvPr id="12" name="Right Arrow 11"/>
+          <p:cNvSpPr/>
+          <p:nvPr/>
+        </p:nvSpPr>
+        <p:spPr>
+          <a:xfrm>
+            <a:off x="4716016" y="1384411"/>
+            <a:ext cx="1797136" cy="348834"/>
+          </a:xfrm>
+          <a:prstGeom prst="rightArrow">
+            <a:avLst/>
+          </a:prstGeom>
+        </p:spPr>
+        <p:style>
+          <a:lnRef idx="1">
+            <a:schemeClr val="accent3"/>
+          </a:lnRef>
+          <a:fillRef idx="2">
+            <a:schemeClr val="accent3"/>
+          </a:fillRef>
+          <a:effectRef idx="1">
+            <a:schemeClr val="accent3"/>
+          </a:effectRef>
+          <a:fontRef idx="minor">
+            <a:schemeClr val="dk1"/>
+          </a:fontRef>
+        </p:style>
+        <p:txBody>
+          <a:bodyPr rtlCol="0" anchor="ctr"/>
+          <a:lstStyle/>
+          <a:p>
+            <a:pPr algn="ctr"/>
+            <a:r>
+              <a:rPr lang="en-AU" sz="1200" dirty="0" smtClean="0"/>
+              <a:t>Dot DF: 0.6…1.4  (0.2)</a:t>
+            </a:r>
+            <a:endParaRPr lang="en-AU" sz="1200" dirty="0"/>
+          </a:p>
+        </p:txBody>
+      </p:sp>
+      <p:cxnSp>
+        <p:nvCxnSpPr>
+          <p:cNvPr id="17" name="Straight Arrow Connector 16"/>
+          <p:cNvCxnSpPr/>
+          <p:nvPr/>
+        </p:nvCxnSpPr>
+        <p:spPr>
+          <a:xfrm>
+            <a:off x="1547664" y="1821690"/>
+            <a:ext cx="0" cy="311166"/>
           </a:xfrm>
           <a:prstGeom prst="straightConnector1">
             <a:avLst/>
@@ -6596,21 +6634,21 @@
       </p:cxnSp>
       <p:cxnSp>
         <p:nvCxnSpPr>
-          <p:cNvPr id="21" name="Straight Arrow Connector 20"/>
+          <p:cNvPr id="18" name="Straight Arrow Connector 17"/>
           <p:cNvCxnSpPr/>
           <p:nvPr/>
         </p:nvCxnSpPr>
         <p:spPr>
           <a:xfrm>
-            <a:off x="8100392" y="1124744"/>
-            <a:ext cx="0" cy="311166"/>
+            <a:off x="2002314" y="1384411"/>
+            <a:ext cx="200005" cy="0"/>
           </a:xfrm>
           <a:prstGeom prst="straightConnector1">
             <a:avLst/>
           </a:prstGeom>
           <a:ln>
-            <a:headEnd type="arrow"/>
-            <a:tailEnd type="arrow"/>
+            <a:headEnd type="arrow" w="sm" len="sm"/>
+            <a:tailEnd type="arrow" w="sm" len="sm"/>
           </a:ln>
         </p:spPr>
         <p:style>
@@ -6628,83 +6666,15 @@
           </a:fontRef>
         </p:style>
       </p:cxnSp>
-      <p:cxnSp>
-        <p:nvCxnSpPr>
-          <p:cNvPr id="25" name="Straight Arrow Connector 24"/>
-          <p:cNvCxnSpPr/>
-          <p:nvPr/>
-        </p:nvCxnSpPr>
-        <p:spPr>
-          <a:xfrm>
-            <a:off x="8172400" y="1124744"/>
-            <a:ext cx="288032" cy="0"/>
-          </a:xfrm>
-          <a:prstGeom prst="straightConnector1">
-            <a:avLst/>
-          </a:prstGeom>
-          <a:ln>
-            <a:headEnd type="arrow"/>
-            <a:tailEnd type="arrow"/>
-          </a:ln>
-        </p:spPr>
-        <p:style>
-          <a:lnRef idx="1">
-            <a:schemeClr val="accent1"/>
-          </a:lnRef>
-          <a:fillRef idx="0">
-            <a:schemeClr val="accent1"/>
-          </a:fillRef>
-          <a:effectRef idx="0">
-            <a:schemeClr val="accent1"/>
-          </a:effectRef>
-          <a:fontRef idx="minor">
-            <a:schemeClr val="tx1"/>
-          </a:fontRef>
-        </p:style>
-      </p:cxnSp>
-      <p:cxnSp>
-        <p:nvCxnSpPr>
-          <p:cNvPr id="28" name="Straight Arrow Connector 27"/>
-          <p:cNvCxnSpPr/>
-          <p:nvPr/>
-        </p:nvCxnSpPr>
-        <p:spPr>
-          <a:xfrm>
-            <a:off x="8172400" y="1988840"/>
-            <a:ext cx="360040" cy="0"/>
-          </a:xfrm>
-          <a:prstGeom prst="straightConnector1">
-            <a:avLst/>
-          </a:prstGeom>
-          <a:ln>
-            <a:headEnd type="arrow"/>
-            <a:tailEnd type="arrow"/>
-          </a:ln>
-        </p:spPr>
-        <p:style>
-          <a:lnRef idx="1">
-            <a:schemeClr val="accent1"/>
-          </a:lnRef>
-          <a:fillRef idx="0">
-            <a:schemeClr val="accent1"/>
-          </a:fillRef>
-          <a:effectRef idx="0">
-            <a:schemeClr val="accent1"/>
-          </a:effectRef>
-          <a:fontRef idx="minor">
-            <a:schemeClr val="tx1"/>
-          </a:fontRef>
-        </p:style>
-      </p:cxnSp>
-      <p:sp>
-        <p:nvSpPr>
-          <p:cNvPr id="30" name="TextBox 29"/>
+      <p:sp>
+        <p:nvSpPr>
+          <p:cNvPr id="19" name="TextBox 18"/>
           <p:cNvSpPr txBox="1"/>
           <p:nvPr/>
         </p:nvSpPr>
         <p:spPr>
           <a:xfrm>
-            <a:off x="8079162" y="2050975"/>
+            <a:off x="1117071" y="1589614"/>
             <a:ext cx="736099" cy="307777"/>
           </a:xfrm>
           <a:prstGeom prst="rect">
@@ -6724,7 +6694,7 @@
                   <a:schemeClr val="tx2"/>
                 </a:solidFill>
               </a:rPr>
-              <a:t>500 nm</a:t>
+              <a:t>200 nm</a:t>
             </a:r>
             <a:endParaRPr lang="en-AU" sz="1400" dirty="0">
               <a:solidFill>
@@ -6736,13 +6706,13 @@
       </p:sp>
       <p:sp>
         <p:nvSpPr>
-          <p:cNvPr id="31" name="TextBox 30"/>
+          <p:cNvPr id="20" name="TextBox 19"/>
           <p:cNvSpPr txBox="1"/>
           <p:nvPr/>
         </p:nvSpPr>
         <p:spPr>
           <a:xfrm>
-            <a:off x="8100392" y="1128133"/>
+            <a:off x="1266215" y="1230522"/>
             <a:ext cx="736099" cy="307777"/>
           </a:xfrm>
           <a:prstGeom prst="rect">
@@ -6757,12 +6727,20 @@
           <a:lstStyle/>
           <a:p>
             <a:r>
+              <a:rPr lang="en-AU" sz="1400" dirty="0">
+                <a:solidFill>
+                  <a:schemeClr val="tx2"/>
+                </a:solidFill>
+              </a:rPr>
+              <a:t>1</a:t>
+            </a:r>
+            <a:r>
               <a:rPr lang="en-AU" sz="1400" dirty="0" smtClean="0">
                 <a:solidFill>
                   <a:schemeClr val="tx2"/>
                 </a:solidFill>
               </a:rPr>
-              <a:t>300 nm</a:t>
+              <a:t>00 nm</a:t>
             </a:r>
             <a:endParaRPr lang="en-AU" sz="1400" dirty="0">
               <a:solidFill>
@@ -6774,14 +6752,98 @@
       </p:sp>
       <p:sp>
         <p:nvSpPr>
-          <p:cNvPr id="4096" name="TextBox 4095"/>
+          <p:cNvPr id="24" name="Right Arrow 23"/>
+          <p:cNvSpPr/>
+          <p:nvPr/>
+        </p:nvSpPr>
+        <p:spPr>
+          <a:xfrm>
+            <a:off x="1926332" y="792530"/>
+            <a:ext cx="2217093" cy="437992"/>
+          </a:xfrm>
+          <a:prstGeom prst="rightArrow">
+            <a:avLst/>
+          </a:prstGeom>
+        </p:spPr>
+        <p:style>
+          <a:lnRef idx="1">
+            <a:schemeClr val="accent3"/>
+          </a:lnRef>
+          <a:fillRef idx="2">
+            <a:schemeClr val="accent3"/>
+          </a:fillRef>
+          <a:effectRef idx="1">
+            <a:schemeClr val="accent3"/>
+          </a:effectRef>
+          <a:fontRef idx="minor">
+            <a:schemeClr val="dk1"/>
+          </a:fontRef>
+        </p:style>
+        <p:txBody>
+          <a:bodyPr rtlCol="0" anchor="ctr"/>
+          <a:lstStyle/>
+          <a:p>
+            <a:pPr algn="ctr"/>
+            <a:r>
+              <a:rPr lang="en-AU" sz="1400" dirty="0" smtClean="0"/>
+              <a:t>Line DF: 0.6…4.4  (0.2)</a:t>
+            </a:r>
+            <a:endParaRPr lang="en-AU" sz="1400" dirty="0"/>
+          </a:p>
+        </p:txBody>
+      </p:sp>
+      <p:sp>
+        <p:nvSpPr>
+          <p:cNvPr id="25" name="Down Arrow 24"/>
+          <p:cNvSpPr/>
+          <p:nvPr/>
+        </p:nvSpPr>
+        <p:spPr>
+          <a:xfrm>
+            <a:off x="703734" y="1897390"/>
+            <a:ext cx="535732" cy="3547833"/>
+          </a:xfrm>
+          <a:prstGeom prst="downArrow">
+            <a:avLst/>
+          </a:prstGeom>
+        </p:spPr>
+        <p:style>
+          <a:lnRef idx="1">
+            <a:schemeClr val="accent3"/>
+          </a:lnRef>
+          <a:fillRef idx="2">
+            <a:schemeClr val="accent3"/>
+          </a:fillRef>
+          <a:effectRef idx="1">
+            <a:schemeClr val="accent3"/>
+          </a:effectRef>
+          <a:fontRef idx="minor">
+            <a:schemeClr val="dk1"/>
+          </a:fontRef>
+        </p:style>
+        <p:txBody>
+          <a:bodyPr vert="vert270" rtlCol="0" anchor="ctr"/>
+          <a:lstStyle/>
+          <a:p>
+            <a:pPr algn="ctr"/>
+            <a:r>
+              <a:rPr lang="en-AU" sz="1400" dirty="0" smtClean="0"/>
+              <a:t>Line DF: 4.4… 0.6 (0.2)</a:t>
+            </a:r>
+            <a:endParaRPr lang="en-AU" sz="1400" dirty="0"/>
+          </a:p>
+        </p:txBody>
+      </p:sp>
+      <p:sp>
+        <p:nvSpPr>
+          <p:cNvPr id="23" name="TextBox 22"/>
           <p:cNvSpPr txBox="1"/>
           <p:nvPr/>
         </p:nvSpPr>
         <p:spPr>
           <a:xfrm>
-            <a:off x="5242689" y="6332058"/>
-            <a:ext cx="2404954" cy="369332"/>
+            <a:off x="6395824" y="548680"/>
+            <a:ext cx="795411" cy="369332"/>
           </a:xfrm>
           <a:prstGeom prst="rect">
             <a:avLst/>
@@ -6795,17 +6857,17 @@
           <a:lstStyle/>
           <a:p>
             <a:r>
-              <a:rPr lang="en-AU" b="1" dirty="0" smtClean="0"/>
-              <a:t>Multiple fall best doses</a:t>
-            </a:r>
-            <a:endParaRPr lang="en-AU" b="1" dirty="0"/>
+              <a:rPr lang="en-AU" dirty="0" smtClean="0"/>
+              <a:t>design</a:t>
+            </a:r>
+            <a:endParaRPr lang="en-AU" dirty="0"/>
           </a:p>
         </p:txBody>
       </p:sp>
     </p:spTree>
     <p:extLst>
       <p:ext uri="{BB962C8B-B14F-4D97-AF65-F5344CB8AC3E}">
-        <p14:creationId xmlns:p14="http://schemas.microsoft.com/office/powerpoint/2010/main" val="2955970339"/>
+        <p14:creationId xmlns:p14="http://schemas.microsoft.com/office/powerpoint/2010/main" val="1212997145"/>
       </p:ext>
     </p:extLst>
   </p:cSld>
@@ -6834,7 +6896,7 @@
       </p:grpSpPr>
       <p:pic>
         <p:nvPicPr>
-          <p:cNvPr id="5122" name="Picture 2"/>
+          <p:cNvPr id="6146" name="Picture 2"/>
           <p:cNvPicPr>
             <a:picLocks noChangeAspect="1" noChangeArrowheads="1"/>
           </p:cNvPicPr>
@@ -6848,13 +6910,13 @@
               </a:ext>
             </a:extLst>
           </a:blip>
-          <a:srcRect l="2499" t="23111" r="51251" b="10222"/>
+          <a:srcRect l="12538" t="32318" r="58706" b="42209"/>
           <a:stretch/>
         </p:blipFill>
         <p:spPr bwMode="auto">
           <a:xfrm>
-            <a:off x="971600" y="1165448"/>
-            <a:ext cx="6343650" cy="5715000"/>
+            <a:off x="1719618" y="2770496"/>
+            <a:ext cx="3944203" cy="2183641"/>
           </a:xfrm>
           <a:prstGeom prst="rect">
             <a:avLst/>
@@ -6865,14 +6927,14 @@
           </a:ln>
           <a:effectLst/>
           <a:extLst>
-            <a:ext uri="{909E8E84-426E-40dd-AFC4-6F175D3DCCD1}">
+            <a:ext uri="{909E8E84-426E-40DD-AFC4-6F175D3DCCD1}">
               <a14:hiddenFill xmlns:a14="http://schemas.microsoft.com/office/drawing/2010/main">
                 <a:solidFill>
                   <a:schemeClr val="accent1"/>
                 </a:solidFill>
               </a14:hiddenFill>
             </a:ext>
-            <a:ext uri="{91240B29-F687-4f45-9708-019B960494DF}">
+            <a:ext uri="{91240B29-F687-4F45-9708-019B960494DF}">
               <a14:hiddenLine xmlns:a14="http://schemas.microsoft.com/office/drawing/2010/main" w="9525">
                 <a:solidFill>
                   <a:schemeClr val="tx1"/>
@@ -6882,7 +6944,7 @@
                 <a:tailEnd/>
               </a14:hiddenLine>
             </a:ext>
-            <a:ext uri="{AF507438-7753-43e0-B8FC-AC1667EBCBE1}">
+            <a:ext uri="{AF507438-7753-43E0-B8FC-AC1667EBCBE1}">
               <a14:hiddenEffects xmlns:a14="http://schemas.microsoft.com/office/drawing/2010/main">
                 <a:effectLst>
                   <a:outerShdw dist="35921" dir="2700000" algn="ctr" rotWithShape="0">
@@ -6896,14 +6958,14 @@
       </p:pic>
       <p:sp>
         <p:nvSpPr>
-          <p:cNvPr id="5" name="TextBox 4"/>
+          <p:cNvPr id="4" name="TextBox 3"/>
           <p:cNvSpPr txBox="1"/>
           <p:nvPr/>
         </p:nvSpPr>
         <p:spPr>
           <a:xfrm>
-            <a:off x="6305962" y="1713580"/>
-            <a:ext cx="546670" cy="227664"/>
+            <a:off x="5436096" y="476672"/>
+            <a:ext cx="500650" cy="369332"/>
           </a:xfrm>
           <a:prstGeom prst="rect">
             <a:avLst/>
@@ -6917,31 +6979,23 @@
           <a:lstStyle/>
           <a:p>
             <a:r>
-              <a:rPr lang="en-AU" sz="1400" dirty="0" smtClean="0">
-                <a:solidFill>
-                  <a:schemeClr val="tx2"/>
-                </a:solidFill>
-              </a:rPr>
-              <a:t>100 nm</a:t>
-            </a:r>
-            <a:endParaRPr lang="en-AU" sz="1400" dirty="0">
-              <a:solidFill>
-                <a:schemeClr val="tx2"/>
-              </a:solidFill>
-            </a:endParaRPr>
-          </a:p>
-        </p:txBody>
-      </p:sp>
-      <p:sp>
-        <p:nvSpPr>
-          <p:cNvPr id="6" name="TextBox 5"/>
+              <a:rPr lang="en-AU" dirty="0" smtClean="0"/>
+              <a:t>Fall</a:t>
+            </a:r>
+            <a:endParaRPr lang="en-AU" dirty="0"/>
+          </a:p>
+        </p:txBody>
+      </p:sp>
+      <p:sp>
+        <p:nvSpPr>
+          <p:cNvPr id="5" name="TextBox 4"/>
           <p:cNvSpPr txBox="1"/>
           <p:nvPr/>
         </p:nvSpPr>
         <p:spPr>
           <a:xfrm>
-            <a:off x="6300192" y="1897391"/>
-            <a:ext cx="546670" cy="227664"/>
+            <a:off x="3491880" y="2401164"/>
+            <a:ext cx="1154675" cy="369332"/>
           </a:xfrm>
           <a:prstGeom prst="rect">
             <a:avLst/>
@@ -6955,542 +7009,8 @@
           <a:lstStyle/>
           <a:p>
             <a:r>
-              <a:rPr lang="en-AU" sz="1400" dirty="0" smtClean="0">
-                <a:solidFill>
-                  <a:schemeClr val="tx2"/>
-                </a:solidFill>
-              </a:rPr>
-              <a:t>100 nm</a:t>
-            </a:r>
-            <a:endParaRPr lang="en-AU" sz="1400" dirty="0">
-              <a:solidFill>
-                <a:schemeClr val="tx2"/>
-              </a:solidFill>
-            </a:endParaRPr>
-          </a:p>
-        </p:txBody>
-      </p:sp>
-      <p:sp>
-        <p:nvSpPr>
-          <p:cNvPr id="7" name="TextBox 6"/>
-          <p:cNvSpPr txBox="1"/>
-          <p:nvPr/>
-        </p:nvSpPr>
-        <p:spPr>
-          <a:xfrm>
-            <a:off x="6365566" y="2095844"/>
-            <a:ext cx="478813" cy="227664"/>
-          </a:xfrm>
-          <a:prstGeom prst="rect">
-            <a:avLst/>
-          </a:prstGeom>
-          <a:noFill/>
-        </p:spPr>
-        <p:txBody>
-          <a:bodyPr wrap="none" rtlCol="0">
-            <a:spAutoFit/>
-          </a:bodyPr>
-          <a:lstStyle/>
-          <a:p>
-            <a:r>
-              <a:rPr lang="en-AU" sz="1400" dirty="0">
-                <a:solidFill>
-                  <a:schemeClr val="tx2"/>
-                </a:solidFill>
-              </a:rPr>
-              <a:t>8</a:t>
-            </a:r>
-            <a:r>
-              <a:rPr lang="en-AU" sz="1400" dirty="0" smtClean="0">
-                <a:solidFill>
-                  <a:schemeClr val="tx2"/>
-                </a:solidFill>
-              </a:rPr>
-              <a:t>0 nm</a:t>
-            </a:r>
-            <a:endParaRPr lang="en-AU" sz="1400" dirty="0">
-              <a:solidFill>
-                <a:schemeClr val="tx2"/>
-              </a:solidFill>
-            </a:endParaRPr>
-          </a:p>
-        </p:txBody>
-      </p:sp>
-      <p:sp>
-        <p:nvSpPr>
-          <p:cNvPr id="8" name="TextBox 7"/>
-          <p:cNvSpPr txBox="1"/>
-          <p:nvPr/>
-        </p:nvSpPr>
-        <p:spPr>
-          <a:xfrm>
-            <a:off x="6368049" y="2308902"/>
-            <a:ext cx="478813" cy="227664"/>
-          </a:xfrm>
-          <a:prstGeom prst="rect">
-            <a:avLst/>
-          </a:prstGeom>
-          <a:noFill/>
-        </p:spPr>
-        <p:txBody>
-          <a:bodyPr wrap="none" rtlCol="0">
-            <a:spAutoFit/>
-          </a:bodyPr>
-          <a:lstStyle/>
-          <a:p>
-            <a:r>
-              <a:rPr lang="en-AU" sz="1400" dirty="0">
-                <a:solidFill>
-                  <a:schemeClr val="tx2"/>
-                </a:solidFill>
-              </a:rPr>
-              <a:t>6</a:t>
-            </a:r>
-            <a:r>
-              <a:rPr lang="en-AU" sz="1400" dirty="0" smtClean="0">
-                <a:solidFill>
-                  <a:schemeClr val="tx2"/>
-                </a:solidFill>
-              </a:rPr>
-              <a:t>0 nm</a:t>
-            </a:r>
-            <a:endParaRPr lang="en-AU" sz="1400" dirty="0">
-              <a:solidFill>
-                <a:schemeClr val="tx2"/>
-              </a:solidFill>
-            </a:endParaRPr>
-          </a:p>
-        </p:txBody>
-      </p:sp>
-      <p:sp>
-        <p:nvSpPr>
-          <p:cNvPr id="9" name="TextBox 8"/>
-          <p:cNvSpPr txBox="1"/>
-          <p:nvPr/>
-        </p:nvSpPr>
-        <p:spPr>
-          <a:xfrm>
-            <a:off x="6365566" y="2735018"/>
-            <a:ext cx="478813" cy="227664"/>
-          </a:xfrm>
-          <a:prstGeom prst="rect">
-            <a:avLst/>
-          </a:prstGeom>
-          <a:noFill/>
-        </p:spPr>
-        <p:txBody>
-          <a:bodyPr wrap="none" rtlCol="0">
-            <a:spAutoFit/>
-          </a:bodyPr>
-          <a:lstStyle/>
-          <a:p>
-            <a:r>
-              <a:rPr lang="en-AU" sz="1400" dirty="0">
-                <a:solidFill>
-                  <a:schemeClr val="tx2"/>
-                </a:solidFill>
-              </a:rPr>
-              <a:t>2</a:t>
-            </a:r>
-            <a:r>
-              <a:rPr lang="en-AU" sz="1400" dirty="0" smtClean="0">
-                <a:solidFill>
-                  <a:schemeClr val="tx2"/>
-                </a:solidFill>
-              </a:rPr>
-              <a:t>0 nm</a:t>
-            </a:r>
-            <a:endParaRPr lang="en-AU" sz="1400" dirty="0">
-              <a:solidFill>
-                <a:schemeClr val="tx2"/>
-              </a:solidFill>
-            </a:endParaRPr>
-          </a:p>
-        </p:txBody>
-      </p:sp>
-      <p:sp>
-        <p:nvSpPr>
-          <p:cNvPr id="10" name="TextBox 9"/>
-          <p:cNvSpPr txBox="1"/>
-          <p:nvPr/>
-        </p:nvSpPr>
-        <p:spPr>
-          <a:xfrm>
-            <a:off x="6368049" y="2521960"/>
-            <a:ext cx="478813" cy="227664"/>
-          </a:xfrm>
-          <a:prstGeom prst="rect">
-            <a:avLst/>
-          </a:prstGeom>
-          <a:noFill/>
-        </p:spPr>
-        <p:txBody>
-          <a:bodyPr wrap="none" rtlCol="0">
-            <a:spAutoFit/>
-          </a:bodyPr>
-          <a:lstStyle/>
-          <a:p>
-            <a:r>
-              <a:rPr lang="en-AU" sz="1400" dirty="0">
-                <a:solidFill>
-                  <a:schemeClr val="tx2"/>
-                </a:solidFill>
-              </a:rPr>
-              <a:t>4</a:t>
-            </a:r>
-            <a:r>
-              <a:rPr lang="en-AU" sz="1400" dirty="0" smtClean="0">
-                <a:solidFill>
-                  <a:schemeClr val="tx2"/>
-                </a:solidFill>
-              </a:rPr>
-              <a:t>0 nm</a:t>
-            </a:r>
-            <a:endParaRPr lang="en-AU" sz="1400" dirty="0">
-              <a:solidFill>
-                <a:schemeClr val="tx2"/>
-              </a:solidFill>
-            </a:endParaRPr>
-          </a:p>
-        </p:txBody>
-      </p:sp>
-      <p:cxnSp>
-        <p:nvCxnSpPr>
-          <p:cNvPr id="11" name="Straight Arrow Connector 10"/>
-          <p:cNvCxnSpPr/>
-          <p:nvPr/>
-        </p:nvCxnSpPr>
-        <p:spPr>
-          <a:xfrm flipH="1">
-            <a:off x="6193811" y="1827411"/>
-            <a:ext cx="202013" cy="0"/>
-          </a:xfrm>
-          <a:prstGeom prst="straightConnector1">
-            <a:avLst/>
-          </a:prstGeom>
-          <a:ln>
-            <a:headEnd type="arrow"/>
-            <a:tailEnd type="arrow"/>
-          </a:ln>
-        </p:spPr>
-        <p:style>
-          <a:lnRef idx="1">
-            <a:schemeClr val="accent1"/>
-          </a:lnRef>
-          <a:fillRef idx="0">
-            <a:schemeClr val="accent1"/>
-          </a:fillRef>
-          <a:effectRef idx="0">
-            <a:schemeClr val="accent1"/>
-          </a:effectRef>
-          <a:fontRef idx="minor">
-            <a:schemeClr val="tx1"/>
-          </a:fontRef>
-        </p:style>
-      </p:cxnSp>
-      <p:sp>
-        <p:nvSpPr>
-          <p:cNvPr id="12" name="Right Arrow 11"/>
-          <p:cNvSpPr/>
-          <p:nvPr/>
-        </p:nvSpPr>
-        <p:spPr>
-          <a:xfrm>
-            <a:off x="4716016" y="1384411"/>
-            <a:ext cx="1797136" cy="348834"/>
-          </a:xfrm>
-          <a:prstGeom prst="rightArrow">
-            <a:avLst/>
-          </a:prstGeom>
-        </p:spPr>
-        <p:style>
-          <a:lnRef idx="1">
-            <a:schemeClr val="accent3"/>
-          </a:lnRef>
-          <a:fillRef idx="2">
-            <a:schemeClr val="accent3"/>
-          </a:fillRef>
-          <a:effectRef idx="1">
-            <a:schemeClr val="accent3"/>
-          </a:effectRef>
-          <a:fontRef idx="minor">
-            <a:schemeClr val="dk1"/>
-          </a:fontRef>
-        </p:style>
-        <p:txBody>
-          <a:bodyPr rtlCol="0" anchor="ctr"/>
-          <a:lstStyle/>
-          <a:p>
-            <a:pPr algn="ctr"/>
-            <a:r>
-              <a:rPr lang="en-AU" sz="1200" dirty="0" smtClean="0"/>
-              <a:t>Dot DF: 0.6…1.4  (0.2)</a:t>
-            </a:r>
-            <a:endParaRPr lang="en-AU" sz="1200" dirty="0"/>
-          </a:p>
-        </p:txBody>
-      </p:sp>
-      <p:cxnSp>
-        <p:nvCxnSpPr>
-          <p:cNvPr id="17" name="Straight Arrow Connector 16"/>
-          <p:cNvCxnSpPr/>
-          <p:nvPr/>
-        </p:nvCxnSpPr>
-        <p:spPr>
-          <a:xfrm>
-            <a:off x="1547664" y="1821690"/>
-            <a:ext cx="0" cy="311166"/>
-          </a:xfrm>
-          <a:prstGeom prst="straightConnector1">
-            <a:avLst/>
-          </a:prstGeom>
-          <a:ln>
-            <a:headEnd type="arrow"/>
-            <a:tailEnd type="arrow"/>
-          </a:ln>
-        </p:spPr>
-        <p:style>
-          <a:lnRef idx="1">
-            <a:schemeClr val="accent1"/>
-          </a:lnRef>
-          <a:fillRef idx="0">
-            <a:schemeClr val="accent1"/>
-          </a:fillRef>
-          <a:effectRef idx="0">
-            <a:schemeClr val="accent1"/>
-          </a:effectRef>
-          <a:fontRef idx="minor">
-            <a:schemeClr val="tx1"/>
-          </a:fontRef>
-        </p:style>
-      </p:cxnSp>
-      <p:cxnSp>
-        <p:nvCxnSpPr>
-          <p:cNvPr id="18" name="Straight Arrow Connector 17"/>
-          <p:cNvCxnSpPr/>
-          <p:nvPr/>
-        </p:nvCxnSpPr>
-        <p:spPr>
-          <a:xfrm>
-            <a:off x="2002314" y="1384411"/>
-            <a:ext cx="200005" cy="0"/>
-          </a:xfrm>
-          <a:prstGeom prst="straightConnector1">
-            <a:avLst/>
-          </a:prstGeom>
-          <a:ln>
-            <a:headEnd type="arrow" w="sm" len="sm"/>
-            <a:tailEnd type="arrow" w="sm" len="sm"/>
-          </a:ln>
-        </p:spPr>
-        <p:style>
-          <a:lnRef idx="1">
-            <a:schemeClr val="accent1"/>
-          </a:lnRef>
-          <a:fillRef idx="0">
-            <a:schemeClr val="accent1"/>
-          </a:fillRef>
-          <a:effectRef idx="0">
-            <a:schemeClr val="accent1"/>
-          </a:effectRef>
-          <a:fontRef idx="minor">
-            <a:schemeClr val="tx1"/>
-          </a:fontRef>
-        </p:style>
-      </p:cxnSp>
-      <p:sp>
-        <p:nvSpPr>
-          <p:cNvPr id="19" name="TextBox 18"/>
-          <p:cNvSpPr txBox="1"/>
-          <p:nvPr/>
-        </p:nvSpPr>
-        <p:spPr>
-          <a:xfrm>
-            <a:off x="1117071" y="1589614"/>
-            <a:ext cx="736099" cy="307777"/>
-          </a:xfrm>
-          <a:prstGeom prst="rect">
-            <a:avLst/>
-          </a:prstGeom>
-          <a:noFill/>
-        </p:spPr>
-        <p:txBody>
-          <a:bodyPr wrap="none" rtlCol="0">
-            <a:spAutoFit/>
-          </a:bodyPr>
-          <a:lstStyle/>
-          <a:p>
-            <a:r>
-              <a:rPr lang="en-AU" sz="1400" dirty="0" smtClean="0">
-                <a:solidFill>
-                  <a:schemeClr val="tx2"/>
-                </a:solidFill>
-              </a:rPr>
-              <a:t>200 nm</a:t>
-            </a:r>
-            <a:endParaRPr lang="en-AU" sz="1400" dirty="0">
-              <a:solidFill>
-                <a:schemeClr val="tx2"/>
-              </a:solidFill>
-            </a:endParaRPr>
-          </a:p>
-        </p:txBody>
-      </p:sp>
-      <p:sp>
-        <p:nvSpPr>
-          <p:cNvPr id="20" name="TextBox 19"/>
-          <p:cNvSpPr txBox="1"/>
-          <p:nvPr/>
-        </p:nvSpPr>
-        <p:spPr>
-          <a:xfrm>
-            <a:off x="1266215" y="1230522"/>
-            <a:ext cx="736099" cy="307777"/>
-          </a:xfrm>
-          <a:prstGeom prst="rect">
-            <a:avLst/>
-          </a:prstGeom>
-          <a:noFill/>
-        </p:spPr>
-        <p:txBody>
-          <a:bodyPr wrap="none" rtlCol="0">
-            <a:spAutoFit/>
-          </a:bodyPr>
-          <a:lstStyle/>
-          <a:p>
-            <a:r>
-              <a:rPr lang="en-AU" sz="1400" dirty="0">
-                <a:solidFill>
-                  <a:schemeClr val="tx2"/>
-                </a:solidFill>
-              </a:rPr>
-              <a:t>1</a:t>
-            </a:r>
-            <a:r>
-              <a:rPr lang="en-AU" sz="1400" dirty="0" smtClean="0">
-                <a:solidFill>
-                  <a:schemeClr val="tx2"/>
-                </a:solidFill>
-              </a:rPr>
-              <a:t>00 nm</a:t>
-            </a:r>
-            <a:endParaRPr lang="en-AU" sz="1400" dirty="0">
-              <a:solidFill>
-                <a:schemeClr val="tx2"/>
-              </a:solidFill>
-            </a:endParaRPr>
-          </a:p>
-        </p:txBody>
-      </p:sp>
-      <p:sp>
-        <p:nvSpPr>
-          <p:cNvPr id="24" name="Right Arrow 23"/>
-          <p:cNvSpPr/>
-          <p:nvPr/>
-        </p:nvSpPr>
-        <p:spPr>
-          <a:xfrm>
-            <a:off x="1926332" y="792530"/>
-            <a:ext cx="2217093" cy="437992"/>
-          </a:xfrm>
-          <a:prstGeom prst="rightArrow">
-            <a:avLst/>
-          </a:prstGeom>
-        </p:spPr>
-        <p:style>
-          <a:lnRef idx="1">
-            <a:schemeClr val="accent3"/>
-          </a:lnRef>
-          <a:fillRef idx="2">
-            <a:schemeClr val="accent3"/>
-          </a:fillRef>
-          <a:effectRef idx="1">
-            <a:schemeClr val="accent3"/>
-          </a:effectRef>
-          <a:fontRef idx="minor">
-            <a:schemeClr val="dk1"/>
-          </a:fontRef>
-        </p:style>
-        <p:txBody>
-          <a:bodyPr rtlCol="0" anchor="ctr"/>
-          <a:lstStyle/>
-          <a:p>
-            <a:pPr algn="ctr"/>
-            <a:r>
-              <a:rPr lang="en-AU" sz="1400" dirty="0" smtClean="0"/>
-              <a:t>Line DF: 0.6…4.4  (0.2)</a:t>
-            </a:r>
-            <a:endParaRPr lang="en-AU" sz="1400" dirty="0"/>
-          </a:p>
-        </p:txBody>
-      </p:sp>
-      <p:sp>
-        <p:nvSpPr>
-          <p:cNvPr id="25" name="Down Arrow 24"/>
-          <p:cNvSpPr/>
-          <p:nvPr/>
-        </p:nvSpPr>
-        <p:spPr>
-          <a:xfrm>
-            <a:off x="703734" y="1897390"/>
-            <a:ext cx="535732" cy="3547833"/>
-          </a:xfrm>
-          <a:prstGeom prst="downArrow">
-            <a:avLst/>
-          </a:prstGeom>
-        </p:spPr>
-        <p:style>
-          <a:lnRef idx="1">
-            <a:schemeClr val="accent3"/>
-          </a:lnRef>
-          <a:fillRef idx="2">
-            <a:schemeClr val="accent3"/>
-          </a:fillRef>
-          <a:effectRef idx="1">
-            <a:schemeClr val="accent3"/>
-          </a:effectRef>
-          <a:fontRef idx="minor">
-            <a:schemeClr val="dk1"/>
-          </a:fontRef>
-        </p:style>
-        <p:txBody>
-          <a:bodyPr vert="vert270" rtlCol="0" anchor="ctr"/>
-          <a:lstStyle/>
-          <a:p>
-            <a:pPr algn="ctr"/>
-            <a:r>
-              <a:rPr lang="en-AU" sz="1400" dirty="0" smtClean="0"/>
-              <a:t>Line DF: 4.4… 0.6 (0.2)</a:t>
-            </a:r>
-            <a:endParaRPr lang="en-AU" sz="1400" dirty="0"/>
-          </a:p>
-        </p:txBody>
-      </p:sp>
-      <p:sp>
-        <p:nvSpPr>
-          <p:cNvPr id="23" name="TextBox 22"/>
-          <p:cNvSpPr txBox="1"/>
-          <p:nvPr/>
-        </p:nvSpPr>
-        <p:spPr>
-          <a:xfrm>
-            <a:off x="6395824" y="548680"/>
-            <a:ext cx="795411" cy="369332"/>
-          </a:xfrm>
-          <a:prstGeom prst="rect">
-            <a:avLst/>
-          </a:prstGeom>
-          <a:noFill/>
-        </p:spPr>
-        <p:txBody>
-          <a:bodyPr wrap="none" rtlCol="0">
-            <a:spAutoFit/>
-          </a:bodyPr>
-          <a:lstStyle/>
-          <a:p>
-            <a:r>
               <a:rPr lang="en-AU" dirty="0" smtClean="0"/>
-              <a:t>design</a:t>
+              <a:t>Area DF: 6</a:t>
             </a:r>
             <a:endParaRPr lang="en-AU" dirty="0"/>
           </a:p>
@@ -7499,7 +7019,7 @@
     </p:spTree>
     <p:extLst>
       <p:ext uri="{BB962C8B-B14F-4D97-AF65-F5344CB8AC3E}">
-        <p14:creationId xmlns:p14="http://schemas.microsoft.com/office/powerpoint/2010/main" val="1212997145"/>
+        <p14:creationId xmlns:p14="http://schemas.microsoft.com/office/powerpoint/2010/main" val="3168065169"/>
       </p:ext>
     </p:extLst>
   </p:cSld>
@@ -7528,158 +7048,6 @@
       </p:grpSpPr>
       <p:pic>
         <p:nvPicPr>
-          <p:cNvPr id="6146" name="Picture 2"/>
-          <p:cNvPicPr>
-            <a:picLocks noChangeAspect="1" noChangeArrowheads="1"/>
-          </p:cNvPicPr>
-          <p:nvPr/>
-        </p:nvPicPr>
-        <p:blipFill rotWithShape="1">
-          <a:blip r:embed="rId2">
-            <a:extLst>
-              <a:ext uri="{28A0092B-C50C-407E-A947-70E740481C1C}">
-                <a14:useLocalDpi xmlns:a14="http://schemas.microsoft.com/office/drawing/2010/main" val="0"/>
-              </a:ext>
-            </a:extLst>
-          </a:blip>
-          <a:srcRect l="12538" t="32318" r="58706" b="42209"/>
-          <a:stretch/>
-        </p:blipFill>
-        <p:spPr bwMode="auto">
-          <a:xfrm>
-            <a:off x="1719618" y="2770496"/>
-            <a:ext cx="3944203" cy="2183641"/>
-          </a:xfrm>
-          <a:prstGeom prst="rect">
-            <a:avLst/>
-          </a:prstGeom>
-          <a:noFill/>
-          <a:ln>
-            <a:noFill/>
-          </a:ln>
-          <a:effectLst/>
-          <a:extLst>
-            <a:ext uri="{909E8E84-426E-40dd-AFC4-6F175D3DCCD1}">
-              <a14:hiddenFill xmlns:a14="http://schemas.microsoft.com/office/drawing/2010/main">
-                <a:solidFill>
-                  <a:schemeClr val="accent1"/>
-                </a:solidFill>
-              </a14:hiddenFill>
-            </a:ext>
-            <a:ext uri="{91240B29-F687-4f45-9708-019B960494DF}">
-              <a14:hiddenLine xmlns:a14="http://schemas.microsoft.com/office/drawing/2010/main" w="9525">
-                <a:solidFill>
-                  <a:schemeClr val="tx1"/>
-                </a:solidFill>
-                <a:miter lim="800000"/>
-                <a:headEnd/>
-                <a:tailEnd/>
-              </a14:hiddenLine>
-            </a:ext>
-            <a:ext uri="{AF507438-7753-43e0-B8FC-AC1667EBCBE1}">
-              <a14:hiddenEffects xmlns:a14="http://schemas.microsoft.com/office/drawing/2010/main">
-                <a:effectLst>
-                  <a:outerShdw dist="35921" dir="2700000" algn="ctr" rotWithShape="0">
-                    <a:schemeClr val="bg2"/>
-                  </a:outerShdw>
-                </a:effectLst>
-              </a14:hiddenEffects>
-            </a:ext>
-          </a:extLst>
-        </p:spPr>
-      </p:pic>
-      <p:sp>
-        <p:nvSpPr>
-          <p:cNvPr id="4" name="TextBox 3"/>
-          <p:cNvSpPr txBox="1"/>
-          <p:nvPr/>
-        </p:nvSpPr>
-        <p:spPr>
-          <a:xfrm>
-            <a:off x="5436096" y="476672"/>
-            <a:ext cx="500650" cy="369332"/>
-          </a:xfrm>
-          <a:prstGeom prst="rect">
-            <a:avLst/>
-          </a:prstGeom>
-          <a:noFill/>
-        </p:spPr>
-        <p:txBody>
-          <a:bodyPr wrap="none" rtlCol="0">
-            <a:spAutoFit/>
-          </a:bodyPr>
-          <a:lstStyle/>
-          <a:p>
-            <a:r>
-              <a:rPr lang="en-AU" dirty="0" smtClean="0"/>
-              <a:t>Fall</a:t>
-            </a:r>
-            <a:endParaRPr lang="en-AU" dirty="0"/>
-          </a:p>
-        </p:txBody>
-      </p:sp>
-      <p:sp>
-        <p:nvSpPr>
-          <p:cNvPr id="5" name="TextBox 4"/>
-          <p:cNvSpPr txBox="1"/>
-          <p:nvPr/>
-        </p:nvSpPr>
-        <p:spPr>
-          <a:xfrm>
-            <a:off x="3491880" y="2401164"/>
-            <a:ext cx="1154675" cy="369332"/>
-          </a:xfrm>
-          <a:prstGeom prst="rect">
-            <a:avLst/>
-          </a:prstGeom>
-          <a:noFill/>
-        </p:spPr>
-        <p:txBody>
-          <a:bodyPr wrap="none" rtlCol="0">
-            <a:spAutoFit/>
-          </a:bodyPr>
-          <a:lstStyle/>
-          <a:p>
-            <a:r>
-              <a:rPr lang="en-AU" dirty="0" smtClean="0"/>
-              <a:t>Area DF: 6</a:t>
-            </a:r>
-            <a:endParaRPr lang="en-AU" dirty="0"/>
-          </a:p>
-        </p:txBody>
-      </p:sp>
-    </p:spTree>
-    <p:extLst>
-      <p:ext uri="{BB962C8B-B14F-4D97-AF65-F5344CB8AC3E}">
-        <p14:creationId xmlns:p14="http://schemas.microsoft.com/office/powerpoint/2010/main" val="3168065169"/>
-      </p:ext>
-    </p:extLst>
-  </p:cSld>
-  <p:clrMapOvr>
-    <a:masterClrMapping/>
-  </p:clrMapOvr>
-</p:sld>
-</file>
-
-<file path=ppt/slides/slide8.xml><?xml version="1.0" encoding="utf-8"?>
-<p:sld xmlns:a="http://schemas.openxmlformats.org/drawingml/2006/main" xmlns:r="http://schemas.openxmlformats.org/officeDocument/2006/relationships" xmlns:p="http://schemas.openxmlformats.org/presentationml/2006/main">
-  <p:cSld>
-    <p:spTree>
-      <p:nvGrpSpPr>
-        <p:cNvPr id="1" name=""/>
-        <p:cNvGrpSpPr/>
-        <p:nvPr/>
-      </p:nvGrpSpPr>
-      <p:grpSpPr>
-        <a:xfrm>
-          <a:off x="0" y="0"/>
-          <a:ext cx="0" cy="0"/>
-          <a:chOff x="0" y="0"/>
-          <a:chExt cx="0" cy="0"/>
-        </a:xfrm>
-      </p:grpSpPr>
-      <p:pic>
-        <p:nvPicPr>
           <p:cNvPr id="7170" name="Picture 2"/>
           <p:cNvPicPr>
             <a:picLocks noChangeAspect="1" noChangeArrowheads="1"/>
@@ -7711,14 +7079,14 @@
           </a:ln>
           <a:effectLst/>
           <a:extLst>
-            <a:ext uri="{909E8E84-426E-40dd-AFC4-6F175D3DCCD1}">
+            <a:ext uri="{909E8E84-426E-40DD-AFC4-6F175D3DCCD1}">
               <a14:hiddenFill xmlns:a14="http://schemas.microsoft.com/office/drawing/2010/main">
                 <a:solidFill>
                   <a:schemeClr val="accent1"/>
                 </a:solidFill>
               </a14:hiddenFill>
             </a:ext>
-            <a:ext uri="{91240B29-F687-4f45-9708-019B960494DF}">
+            <a:ext uri="{91240B29-F687-4F45-9708-019B960494DF}">
               <a14:hiddenLine xmlns:a14="http://schemas.microsoft.com/office/drawing/2010/main" w="9525">
                 <a:solidFill>
                   <a:schemeClr val="tx1"/>
@@ -7728,7 +7096,7 @@
                 <a:tailEnd/>
               </a14:hiddenLine>
             </a:ext>
-            <a:ext uri="{AF507438-7753-43e0-B8FC-AC1667EBCBE1}">
+            <a:ext uri="{AF507438-7753-43E0-B8FC-AC1667EBCBE1}">
               <a14:hiddenEffects xmlns:a14="http://schemas.microsoft.com/office/drawing/2010/main">
                 <a:effectLst>
                   <a:outerShdw dist="35921" dir="2700000" algn="ctr" rotWithShape="0">
@@ -8254,7 +7622,7 @@
 </p:sld>
 </file>
 
-<file path=ppt/slides/slide9.xml><?xml version="1.0" encoding="utf-8"?>
+<file path=ppt/slides/slide8.xml><?xml version="1.0" encoding="utf-8"?>
 <p:sld xmlns:a="http://schemas.openxmlformats.org/drawingml/2006/main" xmlns:r="http://schemas.openxmlformats.org/officeDocument/2006/relationships" xmlns:p="http://schemas.openxmlformats.org/presentationml/2006/main">
   <p:cSld>
     <p:spTree>
@@ -8304,14 +7672,14 @@
           </a:ln>
           <a:effectLst/>
           <a:extLst>
-            <a:ext uri="{909E8E84-426E-40dd-AFC4-6F175D3DCCD1}">
+            <a:ext uri="{909E8E84-426E-40DD-AFC4-6F175D3DCCD1}">
               <a14:hiddenFill xmlns:a14="http://schemas.microsoft.com/office/drawing/2010/main">
                 <a:solidFill>
                   <a:schemeClr val="accent1"/>
                 </a:solidFill>
               </a14:hiddenFill>
             </a:ext>
-            <a:ext uri="{91240B29-F687-4f45-9708-019B960494DF}">
+            <a:ext uri="{91240B29-F687-4F45-9708-019B960494DF}">
               <a14:hiddenLine xmlns:a14="http://schemas.microsoft.com/office/drawing/2010/main" w="9525">
                 <a:solidFill>
                   <a:schemeClr val="tx1"/>
@@ -8321,7 +7689,7 @@
                 <a:tailEnd/>
               </a14:hiddenLine>
             </a:ext>
-            <a:ext uri="{AF507438-7753-43e0-B8FC-AC1667EBCBE1}">
+            <a:ext uri="{AF507438-7753-43E0-B8FC-AC1667EBCBE1}">
               <a14:hiddenEffects xmlns:a14="http://schemas.microsoft.com/office/drawing/2010/main">
                 <a:effectLst>
                   <a:outerShdw dist="35921" dir="2700000" algn="ctr" rotWithShape="0">

</xml_diff>